<commit_message>
Added the structure of my_usb and the device table.
</commit_message>
<xml_diff>
--- a/progress_report.pptx
+++ b/progress_report.pptx
@@ -12,11 +12,13 @@
     <p:sldId id="261" r:id="rId6"/>
     <p:sldId id="262" r:id="rId7"/>
     <p:sldId id="266" r:id="rId8"/>
-    <p:sldId id="267" r:id="rId9"/>
-    <p:sldId id="268" r:id="rId10"/>
-    <p:sldId id="264" r:id="rId11"/>
-    <p:sldId id="265" r:id="rId12"/>
-    <p:sldId id="263" r:id="rId13"/>
+    <p:sldId id="269" r:id="rId9"/>
+    <p:sldId id="270" r:id="rId10"/>
+    <p:sldId id="267" r:id="rId11"/>
+    <p:sldId id="268" r:id="rId12"/>
+    <p:sldId id="264" r:id="rId13"/>
+    <p:sldId id="265" r:id="rId14"/>
+    <p:sldId id="263" r:id="rId15"/>
   </p:sldIdLst>
   <p:sldSz cx="12192000" cy="6858000"/>
   <p:notesSz cx="6858000" cy="9144000"/>
@@ -6829,6 +6831,662 @@
 <file path=ppt/slides/slide10.xml><?xml version="1.0" encoding="utf-8"?>
 <p:sld xmlns:a="http://schemas.openxmlformats.org/drawingml/2006/main" xmlns:r="http://schemas.openxmlformats.org/officeDocument/2006/relationships" xmlns:p="http://schemas.openxmlformats.org/presentationml/2006/main">
   <p:cSld>
+    <p:spTree>
+      <p:nvGrpSpPr>
+        <p:cNvPr id="1" name=""/>
+        <p:cNvGrpSpPr/>
+        <p:nvPr/>
+      </p:nvGrpSpPr>
+      <p:grpSpPr>
+        <a:xfrm>
+          <a:off x="0" y="0"/>
+          <a:ext cx="0" cy="0"/>
+          <a:chOff x="0" y="0"/>
+          <a:chExt cx="0" cy="0"/>
+        </a:xfrm>
+      </p:grpSpPr>
+      <p:pic>
+        <p:nvPicPr>
+          <p:cNvPr id="5" name="Resim 4">
+            <a:extLst>
+              <a:ext uri="{FF2B5EF4-FFF2-40B4-BE49-F238E27FC236}">
+                <a16:creationId xmlns:a16="http://schemas.microsoft.com/office/drawing/2014/main" id="{DE098F4E-8303-489E-BC3F-B5F5F058A0A7}"/>
+              </a:ext>
+            </a:extLst>
+          </p:cNvPr>
+          <p:cNvPicPr>
+            <a:picLocks noChangeAspect="1"/>
+          </p:cNvPicPr>
+          <p:nvPr/>
+        </p:nvPicPr>
+        <p:blipFill>
+          <a:blip r:embed="rId2"/>
+          <a:stretch>
+            <a:fillRect/>
+          </a:stretch>
+        </p:blipFill>
+        <p:spPr>
+          <a:xfrm>
+            <a:off x="8658821" y="4154905"/>
+            <a:ext cx="3533179" cy="2703095"/>
+          </a:xfrm>
+          <a:prstGeom prst="rect">
+            <a:avLst/>
+          </a:prstGeom>
+        </p:spPr>
+      </p:pic>
+      <p:sp>
+        <p:nvSpPr>
+          <p:cNvPr id="3" name="Content Placeholder 2">
+            <a:extLst>
+              <a:ext uri="{FF2B5EF4-FFF2-40B4-BE49-F238E27FC236}">
+                <a16:creationId xmlns:a16="http://schemas.microsoft.com/office/drawing/2014/main" id="{7B2D110B-817E-4BD8-8B5F-37900368E924}"/>
+              </a:ext>
+            </a:extLst>
+          </p:cNvPr>
+          <p:cNvSpPr>
+            <a:spLocks noGrp="1"/>
+          </p:cNvSpPr>
+          <p:nvPr>
+            <p:ph idx="1"/>
+          </p:nvPr>
+        </p:nvSpPr>
+        <p:spPr/>
+        <p:txBody>
+          <a:bodyPr/>
+          <a:lstStyle/>
+          <a:p>
+            <a:r>
+              <a:rPr lang="en-GB" dirty="0"/>
+              <a:t> Static method </a:t>
+            </a:r>
+            <a:r>
+              <a:rPr lang="en-GB" dirty="0" err="1"/>
+              <a:t>init</a:t>
+            </a:r>
+            <a:r>
+              <a:rPr lang="en-GB" dirty="0"/>
+              <a:t> stands for initialize and contains the functionality that we want to execute when the device is connected such as registering our device etc. . Takes no parameter.</a:t>
+            </a:r>
+          </a:p>
+          <a:p>
+            <a:r>
+              <a:rPr lang="en-GB" dirty="0"/>
+              <a:t>Static method exit is used for the computation that we want our kernel to do when the device is disconnected. In our case we may disable some features of system or enable them.</a:t>
+            </a:r>
+          </a:p>
+          <a:p>
+            <a:endParaRPr lang="en-GB" dirty="0"/>
+          </a:p>
+        </p:txBody>
+      </p:sp>
+      <p:sp>
+        <p:nvSpPr>
+          <p:cNvPr id="4" name="Title 1">
+            <a:extLst>
+              <a:ext uri="{FF2B5EF4-FFF2-40B4-BE49-F238E27FC236}">
+                <a16:creationId xmlns:a16="http://schemas.microsoft.com/office/drawing/2014/main" id="{E858737E-E6A5-432E-A130-750C366E12AB}"/>
+              </a:ext>
+            </a:extLst>
+          </p:cNvPr>
+          <p:cNvSpPr>
+            <a:spLocks noGrp="1"/>
+          </p:cNvSpPr>
+          <p:nvPr>
+            <p:ph type="title"/>
+          </p:nvPr>
+        </p:nvSpPr>
+        <p:spPr>
+          <a:xfrm>
+            <a:off x="838200" y="365125"/>
+            <a:ext cx="10515600" cy="1325563"/>
+          </a:xfrm>
+        </p:spPr>
+        <p:txBody>
+          <a:bodyPr/>
+          <a:lstStyle/>
+          <a:p>
+            <a:r>
+              <a:rPr lang="en-GB" dirty="0"/>
+              <a:t>“__</a:t>
+            </a:r>
+            <a:r>
+              <a:rPr lang="en-GB" dirty="0" err="1"/>
+              <a:t>init</a:t>
+            </a:r>
+            <a:r>
+              <a:rPr lang="en-GB" dirty="0"/>
+              <a:t>” and “__exit” methods</a:t>
+            </a:r>
+          </a:p>
+        </p:txBody>
+      </p:sp>
+    </p:spTree>
+    <p:extLst>
+      <p:ext uri="{BB962C8B-B14F-4D97-AF65-F5344CB8AC3E}">
+        <p14:creationId xmlns:p14="http://schemas.microsoft.com/office/powerpoint/2010/main" val="4135456617"/>
+      </p:ext>
+    </p:extLst>
+  </p:cSld>
+  <p:clrMapOvr>
+    <a:masterClrMapping/>
+  </p:clrMapOvr>
+</p:sld>
+</file>
+
+<file path=ppt/slides/slide11.xml><?xml version="1.0" encoding="utf-8"?>
+<p:sld xmlns:a="http://schemas.openxmlformats.org/drawingml/2006/main" xmlns:r="http://schemas.openxmlformats.org/officeDocument/2006/relationships" xmlns:p="http://schemas.openxmlformats.org/presentationml/2006/main">
+  <p:cSld>
+    <p:bg>
+      <p:bgPr>
+        <a:solidFill>
+          <a:schemeClr val="bg1"/>
+        </a:solidFill>
+        <a:effectLst/>
+      </p:bgPr>
+    </p:bg>
+    <p:spTree>
+      <p:nvGrpSpPr>
+        <p:cNvPr id="1" name=""/>
+        <p:cNvGrpSpPr/>
+        <p:nvPr/>
+      </p:nvGrpSpPr>
+      <p:grpSpPr>
+        <a:xfrm>
+          <a:off x="0" y="0"/>
+          <a:ext cx="0" cy="0"/>
+          <a:chOff x="0" y="0"/>
+          <a:chExt cx="0" cy="0"/>
+        </a:xfrm>
+      </p:grpSpPr>
+      <p:sp useBgFill="1">
+        <p:nvSpPr>
+          <p:cNvPr id="17" name="Rectangle 16">
+            <a:extLst>
+              <a:ext uri="{FF2B5EF4-FFF2-40B4-BE49-F238E27FC236}">
+                <a16:creationId xmlns:a16="http://schemas.microsoft.com/office/drawing/2014/main" id="{907EF6B7-1338-4443-8C46-6A318D952DFD}"/>
+              </a:ext>
+              <a:ext uri="{C183D7F6-B498-43B3-948B-1728B52AA6E4}">
+                <adec:decorative xmlns:adec="http://schemas.microsoft.com/office/drawing/2017/decorative" val="1"/>
+              </a:ext>
+            </a:extLst>
+          </p:cNvPr>
+          <p:cNvSpPr>
+            <a:spLocks noGrp="1" noRot="1" noChangeAspect="1" noMove="1" noResize="1" noEditPoints="1" noAdjustHandles="1" noChangeArrowheads="1" noChangeShapeType="1" noTextEdit="1"/>
+          </p:cNvSpPr>
+          <p:nvPr>
+            <p:extLst>
+              <p:ext uri="{386F3935-93C4-4BCD-93E2-E3B085C9AB24}">
+                <p16:designElem xmlns:p16="http://schemas.microsoft.com/office/powerpoint/2015/main" val="1"/>
+              </p:ext>
+            </p:extLst>
+          </p:nvPr>
+        </p:nvSpPr>
+        <p:spPr>
+          <a:xfrm>
+            <a:off x="3048" y="0"/>
+            <a:ext cx="12188952" cy="6858000"/>
+          </a:xfrm>
+          <a:prstGeom prst="rect">
+            <a:avLst/>
+          </a:prstGeom>
+          <a:ln>
+            <a:noFill/>
+          </a:ln>
+        </p:spPr>
+        <p:style>
+          <a:lnRef idx="2">
+            <a:schemeClr val="accent1">
+              <a:shade val="50000"/>
+            </a:schemeClr>
+          </a:lnRef>
+          <a:fillRef idx="1">
+            <a:schemeClr val="accent1"/>
+          </a:fillRef>
+          <a:effectRef idx="0">
+            <a:schemeClr val="accent1"/>
+          </a:effectRef>
+          <a:fontRef idx="minor">
+            <a:schemeClr val="lt1"/>
+          </a:fontRef>
+        </p:style>
+        <p:txBody>
+          <a:bodyPr rtlCol="0" anchor="ctr"/>
+          <a:lstStyle/>
+          <a:p>
+            <a:pPr algn="ctr"/>
+            <a:endParaRPr lang="en-US"/>
+          </a:p>
+        </p:txBody>
+      </p:sp>
+      <p:sp>
+        <p:nvSpPr>
+          <p:cNvPr id="19" name="Freeform: Shape 18">
+            <a:extLst>
+              <a:ext uri="{FF2B5EF4-FFF2-40B4-BE49-F238E27FC236}">
+                <a16:creationId xmlns:a16="http://schemas.microsoft.com/office/drawing/2014/main" id="{DAAE4CDD-124C-4DCF-9584-B6033B545DD5}"/>
+              </a:ext>
+              <a:ext uri="{C183D7F6-B498-43B3-948B-1728B52AA6E4}">
+                <adec:decorative xmlns:adec="http://schemas.microsoft.com/office/drawing/2017/decorative" val="1"/>
+              </a:ext>
+            </a:extLst>
+          </p:cNvPr>
+          <p:cNvSpPr>
+            <a:spLocks noGrp="1" noRot="1" noChangeAspect="1" noMove="1" noResize="1" noEditPoints="1" noAdjustHandles="1" noChangeArrowheads="1" noChangeShapeType="1" noTextEdit="1"/>
+          </p:cNvSpPr>
+          <p:nvPr>
+            <p:extLst>
+              <p:ext uri="{386F3935-93C4-4BCD-93E2-E3B085C9AB24}">
+                <p16:designElem xmlns:p16="http://schemas.microsoft.com/office/powerpoint/2015/main" val="1"/>
+              </p:ext>
+            </p:extLst>
+          </p:nvPr>
+        </p:nvSpPr>
+        <p:spPr>
+          <a:xfrm>
+            <a:off x="1" y="0"/>
+            <a:ext cx="4167271" cy="6858000"/>
+          </a:xfrm>
+          <a:custGeom>
+            <a:avLst/>
+            <a:gdLst>
+              <a:gd name="connsiteX0" fmla="*/ 0 w 4167271"/>
+              <a:gd name="connsiteY0" fmla="*/ 0 h 6858000"/>
+              <a:gd name="connsiteX1" fmla="*/ 2259550 w 4167271"/>
+              <a:gd name="connsiteY1" fmla="*/ 0 h 6858000"/>
+              <a:gd name="connsiteX2" fmla="*/ 2387803 w 4167271"/>
+              <a:gd name="connsiteY2" fmla="*/ 82222 h 6858000"/>
+              <a:gd name="connsiteX3" fmla="*/ 4167271 w 4167271"/>
+              <a:gd name="connsiteY3" fmla="*/ 3429000 h 6858000"/>
+              <a:gd name="connsiteX4" fmla="*/ 2387803 w 4167271"/>
+              <a:gd name="connsiteY4" fmla="*/ 6775779 h 6858000"/>
+              <a:gd name="connsiteX5" fmla="*/ 2259550 w 4167271"/>
+              <a:gd name="connsiteY5" fmla="*/ 6858000 h 6858000"/>
+              <a:gd name="connsiteX6" fmla="*/ 0 w 4167271"/>
+              <a:gd name="connsiteY6" fmla="*/ 6858000 h 6858000"/>
+            </a:gdLst>
+            <a:ahLst/>
+            <a:cxnLst>
+              <a:cxn ang="0">
+                <a:pos x="connsiteX0" y="connsiteY0"/>
+              </a:cxn>
+              <a:cxn ang="0">
+                <a:pos x="connsiteX1" y="connsiteY1"/>
+              </a:cxn>
+              <a:cxn ang="0">
+                <a:pos x="connsiteX2" y="connsiteY2"/>
+              </a:cxn>
+              <a:cxn ang="0">
+                <a:pos x="connsiteX3" y="connsiteY3"/>
+              </a:cxn>
+              <a:cxn ang="0">
+                <a:pos x="connsiteX4" y="connsiteY4"/>
+              </a:cxn>
+              <a:cxn ang="0">
+                <a:pos x="connsiteX5" y="connsiteY5"/>
+              </a:cxn>
+              <a:cxn ang="0">
+                <a:pos x="connsiteX6" y="connsiteY6"/>
+              </a:cxn>
+            </a:cxnLst>
+            <a:rect l="l" t="t" r="r" b="b"/>
+            <a:pathLst>
+              <a:path w="4167271" h="6858000">
+                <a:moveTo>
+                  <a:pt x="0" y="0"/>
+                </a:moveTo>
+                <a:lnTo>
+                  <a:pt x="2259550" y="0"/>
+                </a:lnTo>
+                <a:lnTo>
+                  <a:pt x="2387803" y="82222"/>
+                </a:lnTo>
+                <a:cubicBezTo>
+                  <a:pt x="3461407" y="807534"/>
+                  <a:pt x="4167271" y="2035835"/>
+                  <a:pt x="4167271" y="3429000"/>
+                </a:cubicBezTo>
+                <a:cubicBezTo>
+                  <a:pt x="4167271" y="4822165"/>
+                  <a:pt x="3461407" y="6050467"/>
+                  <a:pt x="2387803" y="6775779"/>
+                </a:cubicBezTo>
+                <a:lnTo>
+                  <a:pt x="2259550" y="6858000"/>
+                </a:lnTo>
+                <a:lnTo>
+                  <a:pt x="0" y="6858000"/>
+                </a:lnTo>
+                <a:close/>
+              </a:path>
+            </a:pathLst>
+          </a:custGeom>
+          <a:solidFill>
+            <a:schemeClr val="accent2"/>
+          </a:solidFill>
+          <a:ln>
+            <a:noFill/>
+          </a:ln>
+        </p:spPr>
+        <p:style>
+          <a:lnRef idx="2">
+            <a:schemeClr val="accent1">
+              <a:shade val="50000"/>
+            </a:schemeClr>
+          </a:lnRef>
+          <a:fillRef idx="1">
+            <a:schemeClr val="accent1"/>
+          </a:fillRef>
+          <a:effectRef idx="0">
+            <a:schemeClr val="accent1"/>
+          </a:effectRef>
+          <a:fontRef idx="minor">
+            <a:schemeClr val="lt1"/>
+          </a:fontRef>
+        </p:style>
+        <p:txBody>
+          <a:bodyPr rtlCol="0" anchor="ctr"/>
+          <a:lstStyle/>
+          <a:p>
+            <a:pPr algn="ctr"/>
+            <a:endParaRPr lang="en-US"/>
+          </a:p>
+        </p:txBody>
+      </p:sp>
+      <p:sp>
+        <p:nvSpPr>
+          <p:cNvPr id="21" name="Arc 20">
+            <a:extLst>
+              <a:ext uri="{FF2B5EF4-FFF2-40B4-BE49-F238E27FC236}">
+                <a16:creationId xmlns:a16="http://schemas.microsoft.com/office/drawing/2014/main" id="{081E4A58-353D-44AE-B2FC-2A74E2E400F7}"/>
+              </a:ext>
+              <a:ext uri="{C183D7F6-B498-43B3-948B-1728B52AA6E4}">
+                <adec:decorative xmlns:adec="http://schemas.microsoft.com/office/drawing/2017/decorative" val="1"/>
+              </a:ext>
+            </a:extLst>
+          </p:cNvPr>
+          <p:cNvSpPr>
+            <a:spLocks noGrp="1" noRot="1" noChangeAspect="1" noMove="1" noResize="1" noEditPoints="1" noAdjustHandles="1" noChangeArrowheads="1" noChangeShapeType="1" noTextEdit="1"/>
+          </p:cNvSpPr>
+          <p:nvPr>
+            <p:extLst>
+              <p:ext uri="{386F3935-93C4-4BCD-93E2-E3B085C9AB24}">
+                <p16:designElem xmlns:p16="http://schemas.microsoft.com/office/powerpoint/2015/main" val="1"/>
+              </p:ext>
+            </p:extLst>
+          </p:nvPr>
+        </p:nvSpPr>
+        <p:spPr>
+          <a:xfrm flipV="1">
+            <a:off x="7550402" y="2455479"/>
+            <a:ext cx="4083433" cy="4083433"/>
+          </a:xfrm>
+          <a:prstGeom prst="arc">
+            <a:avLst/>
+          </a:prstGeom>
+          <a:ln w="127000" cap="rnd">
+            <a:solidFill>
+              <a:schemeClr val="accent4"/>
+            </a:solidFill>
+            <a:prstDash val="dash"/>
+          </a:ln>
+        </p:spPr>
+        <p:style>
+          <a:lnRef idx="1">
+            <a:schemeClr val="accent1"/>
+          </a:lnRef>
+          <a:fillRef idx="0">
+            <a:schemeClr val="accent1"/>
+          </a:fillRef>
+          <a:effectRef idx="0">
+            <a:schemeClr val="accent1"/>
+          </a:effectRef>
+          <a:fontRef idx="minor">
+            <a:schemeClr val="tx1"/>
+          </a:fontRef>
+        </p:style>
+        <p:txBody>
+          <a:bodyPr rtlCol="0" anchor="ctr"/>
+          <a:lstStyle/>
+          <a:p>
+            <a:pPr algn="ctr"/>
+            <a:endParaRPr lang="en-US" dirty="0"/>
+          </a:p>
+        </p:txBody>
+      </p:sp>
+      <p:sp>
+        <p:nvSpPr>
+          <p:cNvPr id="3" name="Content Placeholder 2">
+            <a:extLst>
+              <a:ext uri="{FF2B5EF4-FFF2-40B4-BE49-F238E27FC236}">
+                <a16:creationId xmlns:a16="http://schemas.microsoft.com/office/drawing/2014/main" id="{55F93B07-670A-4344-BAE8-8F5CBE449FB9}"/>
+              </a:ext>
+            </a:extLst>
+          </p:cNvPr>
+          <p:cNvSpPr>
+            <a:spLocks noGrp="1"/>
+          </p:cNvSpPr>
+          <p:nvPr>
+            <p:ph idx="1"/>
+          </p:nvPr>
+        </p:nvSpPr>
+        <p:spPr>
+          <a:xfrm>
+            <a:off x="4447308" y="591344"/>
+            <a:ext cx="6906491" cy="5585619"/>
+          </a:xfrm>
+        </p:spPr>
+        <p:txBody>
+          <a:bodyPr anchor="ctr">
+            <a:normAutofit/>
+          </a:bodyPr>
+          <a:lstStyle/>
+          <a:p>
+            <a:pPr marL="0" indent="0">
+              <a:buNone/>
+            </a:pPr>
+            <a:r>
+              <a:rPr lang="en-GB" sz="1200" dirty="0"/>
+              <a:t>static int </a:t>
+            </a:r>
+            <a:r>
+              <a:rPr lang="en-GB" sz="1200" dirty="0" err="1"/>
+              <a:t>my_usb_probe</a:t>
+            </a:r>
+            <a:r>
+              <a:rPr lang="en-GB" sz="1200" dirty="0"/>
+              <a:t>(struct </a:t>
+            </a:r>
+            <a:r>
+              <a:rPr lang="en-GB" sz="1200" dirty="0" err="1"/>
+              <a:t>usb_interface</a:t>
+            </a:r>
+            <a:r>
+              <a:rPr lang="en-GB" sz="1200" dirty="0"/>
+              <a:t> *interface, </a:t>
+            </a:r>
+            <a:r>
+              <a:rPr lang="en-GB" sz="1200" dirty="0" err="1"/>
+              <a:t>const</a:t>
+            </a:r>
+            <a:r>
+              <a:rPr lang="en-GB" sz="1200" dirty="0"/>
+              <a:t> struct </a:t>
+            </a:r>
+            <a:r>
+              <a:rPr lang="en-GB" sz="1200" dirty="0" err="1"/>
+              <a:t>usb_device_id</a:t>
+            </a:r>
+            <a:r>
+              <a:rPr lang="en-GB" sz="1200" dirty="0"/>
+              <a:t> *id)</a:t>
+            </a:r>
+          </a:p>
+          <a:p>
+            <a:pPr marL="0" indent="0">
+              <a:buNone/>
+            </a:pPr>
+            <a:r>
+              <a:rPr lang="en-GB" sz="1200" dirty="0"/>
+              <a:t>{</a:t>
+            </a:r>
+          </a:p>
+          <a:p>
+            <a:pPr marL="0" indent="0">
+              <a:buNone/>
+            </a:pPr>
+            <a:r>
+              <a:rPr lang="en-GB" sz="1200" dirty="0"/>
+              <a:t>    return 0;</a:t>
+            </a:r>
+          </a:p>
+          <a:p>
+            <a:pPr marL="0" indent="0">
+              <a:buNone/>
+            </a:pPr>
+            <a:r>
+              <a:rPr lang="en-GB" sz="1200" dirty="0"/>
+              <a:t>}</a:t>
+            </a:r>
+          </a:p>
+          <a:p>
+            <a:pPr marL="0" indent="0">
+              <a:buNone/>
+            </a:pPr>
+            <a:endParaRPr lang="en-GB" sz="1200" dirty="0"/>
+          </a:p>
+          <a:p>
+            <a:pPr lvl="1"/>
+            <a:r>
+              <a:rPr lang="en-GB" sz="1200" dirty="0"/>
+              <a:t>Probe function takes a </a:t>
+            </a:r>
+            <a:r>
+              <a:rPr lang="en-GB" sz="1200" dirty="0" err="1"/>
+              <a:t>usb</a:t>
+            </a:r>
+            <a:r>
+              <a:rPr lang="en-GB" sz="1200" dirty="0"/>
+              <a:t> interface and a </a:t>
+            </a:r>
+            <a:r>
+              <a:rPr lang="en-GB" sz="1200" dirty="0" err="1"/>
+              <a:t>usb</a:t>
+            </a:r>
+            <a:r>
+              <a:rPr lang="en-GB" sz="1200" dirty="0"/>
+              <a:t> device id as arguments and returns a int. This function gets called whenever any device supported by this driver gets installed to the host device.</a:t>
+            </a:r>
+          </a:p>
+          <a:p>
+            <a:pPr marL="0" indent="0">
+              <a:buNone/>
+            </a:pPr>
+            <a:endParaRPr lang="en-GB" sz="1200" dirty="0"/>
+          </a:p>
+          <a:p>
+            <a:pPr marL="0" indent="0">
+              <a:buNone/>
+            </a:pPr>
+            <a:r>
+              <a:rPr lang="en-GB" sz="1200" dirty="0"/>
+              <a:t>static void </a:t>
+            </a:r>
+            <a:r>
+              <a:rPr lang="en-GB" sz="1200" dirty="0" err="1"/>
+              <a:t>my_usb_disconnect</a:t>
+            </a:r>
+            <a:r>
+              <a:rPr lang="en-GB" sz="1200" dirty="0"/>
+              <a:t>(struct </a:t>
+            </a:r>
+            <a:r>
+              <a:rPr lang="en-GB" sz="1200" dirty="0" err="1"/>
+              <a:t>usb_interface</a:t>
+            </a:r>
+            <a:r>
+              <a:rPr lang="en-GB" sz="1200" dirty="0"/>
+              <a:t> *interface)</a:t>
+            </a:r>
+          </a:p>
+          <a:p>
+            <a:pPr marL="0" indent="0">
+              <a:buNone/>
+            </a:pPr>
+            <a:r>
+              <a:rPr lang="en-GB" sz="1200" dirty="0"/>
+              <a:t>{</a:t>
+            </a:r>
+          </a:p>
+          <a:p>
+            <a:pPr marL="0" indent="0">
+              <a:buNone/>
+            </a:pPr>
+            <a:r>
+              <a:rPr lang="en-GB" sz="1200" dirty="0"/>
+              <a:t>}</a:t>
+            </a:r>
+          </a:p>
+          <a:p>
+            <a:pPr marL="0" indent="0">
+              <a:buNone/>
+            </a:pPr>
+            <a:endParaRPr lang="en-GB" sz="1200" dirty="0"/>
+          </a:p>
+          <a:p>
+            <a:pPr lvl="1"/>
+            <a:r>
+              <a:rPr lang="en-GB" sz="1200" dirty="0"/>
+              <a:t>Disconnect function takes only a </a:t>
+            </a:r>
+            <a:r>
+              <a:rPr lang="en-GB" sz="1200" dirty="0" err="1"/>
+              <a:t>usb</a:t>
+            </a:r>
+            <a:r>
+              <a:rPr lang="en-GB" sz="1200" dirty="0"/>
+              <a:t> interface as an argument and doesn’t return anything. This function gets called whenever any device supported by this driver gets removed from the host device.</a:t>
+            </a:r>
+          </a:p>
+          <a:p>
+            <a:pPr marL="0" indent="0">
+              <a:buNone/>
+            </a:pPr>
+            <a:endParaRPr lang="en-GB" sz="1200" dirty="0"/>
+          </a:p>
+          <a:p>
+            <a:pPr marL="0" indent="0">
+              <a:buNone/>
+            </a:pPr>
+            <a:r>
+              <a:rPr lang="en-GB" sz="1200" dirty="0"/>
+              <a:t>Probe and disconnect functions will be filled later.</a:t>
+            </a:r>
+          </a:p>
+          <a:p>
+            <a:pPr marL="0" indent="0">
+              <a:buNone/>
+            </a:pPr>
+            <a:endParaRPr lang="en-GB" sz="1000" dirty="0"/>
+          </a:p>
+        </p:txBody>
+      </p:sp>
+    </p:spTree>
+    <p:extLst>
+      <p:ext uri="{BB962C8B-B14F-4D97-AF65-F5344CB8AC3E}">
+        <p14:creationId xmlns:p14="http://schemas.microsoft.com/office/powerpoint/2010/main" val="274937843"/>
+      </p:ext>
+    </p:extLst>
+  </p:cSld>
+  <p:clrMapOvr>
+    <a:masterClrMapping/>
+  </p:clrMapOvr>
+</p:sld>
+</file>
+
+<file path=ppt/slides/slide12.xml><?xml version="1.0" encoding="utf-8"?>
+<p:sld xmlns:a="http://schemas.openxmlformats.org/drawingml/2006/main" xmlns:r="http://schemas.openxmlformats.org/officeDocument/2006/relationships" xmlns:p="http://schemas.openxmlformats.org/presentationml/2006/main">
+  <p:cSld>
     <p:bg>
       <p:bgPr>
         <a:solidFill>
@@ -7165,7 +7823,7 @@
 </p:sld>
 </file>
 
-<file path=ppt/slides/slide11.xml><?xml version="1.0" encoding="utf-8"?>
+<file path=ppt/slides/slide13.xml><?xml version="1.0" encoding="utf-8"?>
 <p:sld xmlns:a="http://schemas.openxmlformats.org/drawingml/2006/main" xmlns:r="http://schemas.openxmlformats.org/officeDocument/2006/relationships" xmlns:p="http://schemas.openxmlformats.org/presentationml/2006/main">
   <p:cSld>
     <p:bg>
@@ -7620,7 +8278,7 @@
 </p:sld>
 </file>
 
-<file path=ppt/slides/slide12.xml><?xml version="1.0" encoding="utf-8"?>
+<file path=ppt/slides/slide14.xml><?xml version="1.0" encoding="utf-8"?>
 <p:sld xmlns:a="http://schemas.openxmlformats.org/drawingml/2006/main" xmlns:r="http://schemas.openxmlformats.org/officeDocument/2006/relationships" xmlns:p="http://schemas.openxmlformats.org/presentationml/2006/main">
   <p:cSld>
     <p:bg>
@@ -11738,6 +12396,14 @@
 <file path=ppt/slides/slide7.xml><?xml version="1.0" encoding="utf-8"?>
 <p:sld xmlns:a="http://schemas.openxmlformats.org/drawingml/2006/main" xmlns:r="http://schemas.openxmlformats.org/officeDocument/2006/relationships" xmlns:p="http://schemas.openxmlformats.org/presentationml/2006/main">
   <p:cSld>
+    <p:bg>
+      <p:bgPr>
+        <a:solidFill>
+          <a:schemeClr val="bg1"/>
+        </a:solidFill>
+        <a:effectLst/>
+      </p:bgPr>
+    </p:bg>
     <p:spTree>
       <p:nvGrpSpPr>
         <p:cNvPr id="1" name=""/>
@@ -11768,22 +12434,21 @@
             <p:ph type="title"/>
           </p:nvPr>
         </p:nvSpPr>
-        <p:spPr/>
+        <p:spPr>
+          <a:xfrm>
+            <a:off x="648929" y="629266"/>
+            <a:ext cx="3505495" cy="1622321"/>
+          </a:xfrm>
+        </p:spPr>
         <p:txBody>
-          <a:bodyPr/>
+          <a:bodyPr>
+            <a:normAutofit/>
+          </a:bodyPr>
           <a:lstStyle/>
           <a:p>
             <a:r>
-              <a:rPr lang="en-GB" dirty="0"/>
-              <a:t>Structure of Our Driver Module (</a:t>
-            </a:r>
-            <a:r>
-              <a:rPr lang="en-GB" dirty="0" err="1"/>
-              <a:t>my_usb.c</a:t>
-            </a:r>
-            <a:r>
-              <a:rPr lang="en-GB" dirty="0"/>
-              <a:t>)</a:t>
+              <a:rPr lang="en-GB" sz="3700"/>
+              <a:t>Structure of Our Driver Module (my_usb.c)</a:t>
             </a:r>
           </a:p>
         </p:txBody>
@@ -11804,42 +12469,201 @@
             <p:ph idx="1"/>
           </p:nvPr>
         </p:nvSpPr>
-        <p:spPr/>
+        <p:spPr>
+          <a:xfrm>
+            <a:off x="648931" y="2438400"/>
+            <a:ext cx="3505494" cy="3785419"/>
+          </a:xfrm>
+        </p:spPr>
         <p:txBody>
-          <a:bodyPr/>
+          <a:bodyPr>
+            <a:normAutofit/>
+          </a:bodyPr>
           <a:lstStyle/>
           <a:p>
             <a:r>
-              <a:rPr lang="en-GB" dirty="0"/>
-              <a:t>//</a:t>
-            </a:r>
-            <a:r>
-              <a:rPr lang="en-GB" dirty="0" err="1"/>
-              <a:t>buraya</a:t>
-            </a:r>
-            <a:r>
-              <a:rPr lang="en-GB" dirty="0"/>
-              <a:t> struct </a:t>
-            </a:r>
-            <a:r>
-              <a:rPr lang="en-GB" dirty="0" err="1"/>
-              <a:t>usb_driver</a:t>
-            </a:r>
-            <a:r>
-              <a:rPr lang="en-GB" dirty="0"/>
-              <a:t> </a:t>
-            </a:r>
-            <a:r>
-              <a:rPr lang="en-GB" dirty="0" err="1"/>
-              <a:t>ve</a:t>
-            </a:r>
-            <a:r>
-              <a:rPr lang="en-GB" dirty="0"/>
-              <a:t> device table</a:t>
+              <a:rPr lang="en-GB" sz="2000"/>
+              <a:t>Our driver module can be formed of these variables and functions.</a:t>
+            </a:r>
+          </a:p>
+          <a:p>
+            <a:endParaRPr lang="en-GB" sz="2000"/>
+          </a:p>
+          <a:p>
+            <a:r>
+              <a:rPr lang="en-GB" sz="2000"/>
+              <a:t>The descriptions of these are in the next slide.</a:t>
             </a:r>
           </a:p>
         </p:txBody>
       </p:sp>
+      <p:sp>
+        <p:nvSpPr>
+          <p:cNvPr id="20" name="Rectangle 15">
+            <a:extLst>
+              <a:ext uri="{FF2B5EF4-FFF2-40B4-BE49-F238E27FC236}">
+                <a16:creationId xmlns:a16="http://schemas.microsoft.com/office/drawing/2014/main" id="{5E39A796-BE83-48B1-B33F-35C4A32AAB57}"/>
+              </a:ext>
+              <a:ext uri="{C183D7F6-B498-43B3-948B-1728B52AA6E4}">
+                <adec:decorative xmlns:adec="http://schemas.microsoft.com/office/drawing/2017/decorative" val="1"/>
+              </a:ext>
+            </a:extLst>
+          </p:cNvPr>
+          <p:cNvSpPr>
+            <a:spLocks noGrp="1" noRot="1" noChangeAspect="1" noMove="1" noResize="1" noEditPoints="1" noAdjustHandles="1" noChangeArrowheads="1" noChangeShapeType="1" noTextEdit="1"/>
+          </p:cNvSpPr>
+          <p:nvPr>
+            <p:extLst>
+              <p:ext uri="{386F3935-93C4-4BCD-93E2-E3B085C9AB24}">
+                <p16:designElem xmlns:p16="http://schemas.microsoft.com/office/powerpoint/2015/main" val="1"/>
+              </p:ext>
+            </p:extLst>
+          </p:nvPr>
+        </p:nvSpPr>
+        <p:spPr>
+          <a:xfrm>
+            <a:off x="4639056" y="0"/>
+            <a:ext cx="7552944" cy="6858000"/>
+          </a:xfrm>
+          <a:prstGeom prst="rect">
+            <a:avLst/>
+          </a:prstGeom>
+          <a:solidFill>
+            <a:srgbClr val="C8CACA"/>
+          </a:solidFill>
+          <a:ln>
+            <a:noFill/>
+          </a:ln>
+        </p:spPr>
+        <p:style>
+          <a:lnRef idx="2">
+            <a:schemeClr val="accent1">
+              <a:shade val="50000"/>
+            </a:schemeClr>
+          </a:lnRef>
+          <a:fillRef idx="1">
+            <a:schemeClr val="accent1"/>
+          </a:fillRef>
+          <a:effectRef idx="0">
+            <a:schemeClr val="accent1"/>
+          </a:effectRef>
+          <a:fontRef idx="minor">
+            <a:schemeClr val="lt1"/>
+          </a:fontRef>
+        </p:style>
+        <p:txBody>
+          <a:bodyPr rtlCol="0" anchor="ctr"/>
+          <a:lstStyle/>
+          <a:p>
+            <a:pPr algn="ctr"/>
+            <a:endParaRPr lang="en-US"/>
+          </a:p>
+        </p:txBody>
+      </p:sp>
+      <p:sp>
+        <p:nvSpPr>
+          <p:cNvPr id="21" name="Rounded Rectangle 9">
+            <a:extLst>
+              <a:ext uri="{FF2B5EF4-FFF2-40B4-BE49-F238E27FC236}">
+                <a16:creationId xmlns:a16="http://schemas.microsoft.com/office/drawing/2014/main" id="{72F84B47-E267-4194-8194-831DB7B5547F}"/>
+              </a:ext>
+              <a:ext uri="{C183D7F6-B498-43B3-948B-1728B52AA6E4}">
+                <adec:decorative xmlns:adec="http://schemas.microsoft.com/office/drawing/2017/decorative" val="1"/>
+              </a:ext>
+            </a:extLst>
+          </p:cNvPr>
+          <p:cNvSpPr>
+            <a:spLocks noGrp="1" noRot="1" noChangeAspect="1" noMove="1" noResize="1" noEditPoints="1" noAdjustHandles="1" noChangeArrowheads="1" noChangeShapeType="1" noTextEdit="1"/>
+          </p:cNvSpPr>
+          <p:nvPr>
+            <p:extLst>
+              <p:ext uri="{386F3935-93C4-4BCD-93E2-E3B085C9AB24}">
+                <p16:designElem xmlns:p16="http://schemas.microsoft.com/office/powerpoint/2015/main" val="1"/>
+              </p:ext>
+            </p:extLst>
+          </p:nvPr>
+        </p:nvSpPr>
+        <p:spPr>
+          <a:xfrm>
+            <a:off x="5123688" y="557784"/>
+            <a:ext cx="6584098" cy="5739187"/>
+          </a:xfrm>
+          <a:prstGeom prst="roundRect">
+            <a:avLst>
+              <a:gd name="adj" fmla="val 0"/>
+            </a:avLst>
+          </a:prstGeom>
+          <a:solidFill>
+            <a:srgbClr val="FFFFFF"/>
+          </a:solidFill>
+          <a:ln w="9525">
+            <a:solidFill>
+              <a:srgbClr val="C8CACA"/>
+            </a:solidFill>
+          </a:ln>
+          <a:effectLst>
+            <a:outerShdw blurRad="57150" dist="19050" dir="5400000" algn="t" rotWithShape="0">
+              <a:prstClr val="black">
+                <a:alpha val="63000"/>
+              </a:prstClr>
+            </a:outerShdw>
+          </a:effectLst>
+        </p:spPr>
+        <p:style>
+          <a:lnRef idx="2">
+            <a:schemeClr val="accent1">
+              <a:shade val="50000"/>
+            </a:schemeClr>
+          </a:lnRef>
+          <a:fillRef idx="1">
+            <a:schemeClr val="accent1"/>
+          </a:fillRef>
+          <a:effectRef idx="0">
+            <a:schemeClr val="accent1"/>
+          </a:effectRef>
+          <a:fontRef idx="minor">
+            <a:schemeClr val="lt1"/>
+          </a:fontRef>
+        </p:style>
+        <p:txBody>
+          <a:bodyPr rtlCol="0" anchor="ctr"/>
+          <a:lstStyle/>
+          <a:p>
+            <a:pPr algn="ctr"/>
+            <a:endParaRPr lang="en-US"/>
+          </a:p>
+        </p:txBody>
+      </p:sp>
+      <p:pic>
+        <p:nvPicPr>
+          <p:cNvPr id="4" name="Picture 3">
+            <a:extLst>
+              <a:ext uri="{FF2B5EF4-FFF2-40B4-BE49-F238E27FC236}">
+                <a16:creationId xmlns:a16="http://schemas.microsoft.com/office/drawing/2014/main" id="{BB2204ED-8E9E-F54D-97B7-84120434A18A}"/>
+              </a:ext>
+            </a:extLst>
+          </p:cNvPr>
+          <p:cNvPicPr>
+            <a:picLocks noChangeAspect="1"/>
+          </p:cNvPicPr>
+          <p:nvPr/>
+        </p:nvPicPr>
+        <p:blipFill rotWithShape="1">
+          <a:blip r:embed="rId2"/>
+          <a:srcRect l="3039" r="6660"/>
+          <a:stretch/>
+        </p:blipFill>
+        <p:spPr>
+          <a:xfrm>
+            <a:off x="5405862" y="1660927"/>
+            <a:ext cx="6019331" cy="3532899"/>
+          </a:xfrm>
+          <a:prstGeom prst="rect">
+            <a:avLst/>
+          </a:prstGeom>
+          <a:effectLst/>
+        </p:spPr>
+      </p:pic>
     </p:spTree>
     <p:extLst>
       <p:ext uri="{BB962C8B-B14F-4D97-AF65-F5344CB8AC3E}">
@@ -11870,42 +12694,12 @@
           <a:chExt cx="0" cy="0"/>
         </a:xfrm>
       </p:grpSpPr>
-      <p:pic>
-        <p:nvPicPr>
-          <p:cNvPr id="5" name="Resim 4">
-            <a:extLst>
-              <a:ext uri="{FF2B5EF4-FFF2-40B4-BE49-F238E27FC236}">
-                <a16:creationId xmlns:a16="http://schemas.microsoft.com/office/drawing/2014/main" id="{DE098F4E-8303-489E-BC3F-B5F5F058A0A7}"/>
-              </a:ext>
-            </a:extLst>
-          </p:cNvPr>
-          <p:cNvPicPr>
-            <a:picLocks noChangeAspect="1"/>
-          </p:cNvPicPr>
-          <p:nvPr/>
-        </p:nvPicPr>
-        <p:blipFill>
-          <a:blip r:embed="rId2"/>
-          <a:stretch>
-            <a:fillRect/>
-          </a:stretch>
-        </p:blipFill>
-        <p:spPr>
-          <a:xfrm>
-            <a:off x="8658821" y="4154905"/>
-            <a:ext cx="3533179" cy="2703095"/>
-          </a:xfrm>
-          <a:prstGeom prst="rect">
-            <a:avLst/>
-          </a:prstGeom>
-        </p:spPr>
-      </p:pic>
       <p:sp>
         <p:nvSpPr>
           <p:cNvPr id="3" name="Content Placeholder 2">
             <a:extLst>
               <a:ext uri="{FF2B5EF4-FFF2-40B4-BE49-F238E27FC236}">
-                <a16:creationId xmlns:a16="http://schemas.microsoft.com/office/drawing/2014/main" id="{7B2D110B-817E-4BD8-8B5F-37900368E924}"/>
+                <a16:creationId xmlns:a16="http://schemas.microsoft.com/office/drawing/2014/main" id="{03A27C3F-C3DB-364B-97CF-2DC1F4BC6D61}"/>
               </a:ext>
             </a:extLst>
           </p:cNvPr>
@@ -11916,55 +12710,10 @@
             <p:ph idx="1"/>
           </p:nvPr>
         </p:nvSpPr>
-        <p:spPr/>
-        <p:txBody>
-          <a:bodyPr/>
-          <a:lstStyle/>
-          <a:p>
-            <a:r>
-              <a:rPr lang="en-GB" dirty="0"/>
-              <a:t> Static method </a:t>
-            </a:r>
-            <a:r>
-              <a:rPr lang="en-GB" dirty="0" err="1"/>
-              <a:t>init</a:t>
-            </a:r>
-            <a:r>
-              <a:rPr lang="en-GB" dirty="0"/>
-              <a:t> stands for initialize and contains the functionality that we want to execute when the device is connected such as registering our device etc. . Takes no parameter.</a:t>
-            </a:r>
-          </a:p>
-          <a:p>
-            <a:r>
-              <a:rPr lang="en-GB" dirty="0"/>
-              <a:t>Static method exit is used for the computation that we want our kernel to do when the device is disconnected. In our case we may disable some features of system or enable them.</a:t>
-            </a:r>
-          </a:p>
-          <a:p>
-            <a:endParaRPr lang="en-GB" dirty="0"/>
-          </a:p>
-        </p:txBody>
-      </p:sp>
-      <p:sp>
-        <p:nvSpPr>
-          <p:cNvPr id="4" name="Title 1">
-            <a:extLst>
-              <a:ext uri="{FF2B5EF4-FFF2-40B4-BE49-F238E27FC236}">
-                <a16:creationId xmlns:a16="http://schemas.microsoft.com/office/drawing/2014/main" id="{E858737E-E6A5-432E-A130-750C366E12AB}"/>
-              </a:ext>
-            </a:extLst>
-          </p:cNvPr>
-          <p:cNvSpPr>
-            <a:spLocks noGrp="1"/>
-          </p:cNvSpPr>
-          <p:nvPr>
-            <p:ph type="title"/>
-          </p:nvPr>
-        </p:nvSpPr>
         <p:spPr>
           <a:xfrm>
-            <a:off x="838200" y="365125"/>
-            <a:ext cx="10515600" cy="1325563"/>
+            <a:off x="838200" y="973855"/>
+            <a:ext cx="10515600" cy="4351338"/>
           </a:xfrm>
         </p:spPr>
         <p:txBody>
@@ -11973,15 +12722,49 @@
           <a:p>
             <a:r>
               <a:rPr lang="en-GB" dirty="0"/>
-              <a:t>“__</a:t>
+              <a:t>The name variable is a string that describes the USB driver. It is used everywhere to specify the driver in system logs.</a:t>
+            </a:r>
+          </a:p>
+          <a:p>
+            <a:r>
+              <a:rPr lang="en-GB" dirty="0"/>
+              <a:t>The disconnect and probe function pointers are called when a USB device is matched with a device in the </a:t>
             </a:r>
             <a:r>
               <a:rPr lang="en-GB" dirty="0" err="1"/>
-              <a:t>init</a:t>
+              <a:t>id_table</a:t>
             </a:r>
             <a:r>
               <a:rPr lang="en-GB" dirty="0"/>
-              <a:t>” and “__exit” methods</a:t>
+              <a:t>.</a:t>
+            </a:r>
+          </a:p>
+          <a:p>
+            <a:r>
+              <a:rPr lang="en-GB" dirty="0"/>
+              <a:t>The fops and minor variables are optional. We are not going to implement them in our project.</a:t>
+            </a:r>
+          </a:p>
+          <a:p>
+            <a:r>
+              <a:rPr lang="en-GB" dirty="0"/>
+              <a:t>We need to create an </a:t>
+            </a:r>
+            <a:r>
+              <a:rPr lang="en-GB" dirty="0" err="1"/>
+              <a:t>id_table</a:t>
+            </a:r>
+            <a:r>
+              <a:rPr lang="en-GB" dirty="0"/>
+              <a:t> to load the driver automatically when we plug our USB. Therefore, an </a:t>
+            </a:r>
+            <a:r>
+              <a:rPr lang="en-GB" dirty="0" err="1"/>
+              <a:t>id_table</a:t>
+            </a:r>
+            <a:r>
+              <a:rPr lang="en-GB" dirty="0"/>
+              <a:t> defines which devices the driver supports at its current status.</a:t>
             </a:r>
           </a:p>
         </p:txBody>
@@ -11989,7 +12772,7 @@
     </p:spTree>
     <p:extLst>
       <p:ext uri="{BB962C8B-B14F-4D97-AF65-F5344CB8AC3E}">
-        <p14:creationId xmlns:p14="http://schemas.microsoft.com/office/powerpoint/2010/main" val="4135456617"/>
+        <p14:creationId xmlns:p14="http://schemas.microsoft.com/office/powerpoint/2010/main" val="690846184"/>
       </p:ext>
     </p:extLst>
   </p:cSld>
@@ -12026,10 +12809,10 @@
       </p:grpSpPr>
       <p:sp useBgFill="1">
         <p:nvSpPr>
-          <p:cNvPr id="17" name="Rectangle 16">
+          <p:cNvPr id="10" name="Rectangle 9">
             <a:extLst>
               <a:ext uri="{FF2B5EF4-FFF2-40B4-BE49-F238E27FC236}">
-                <a16:creationId xmlns:a16="http://schemas.microsoft.com/office/drawing/2014/main" id="{907EF6B7-1338-4443-8C46-6A318D952DFD}"/>
+                <a16:creationId xmlns:a16="http://schemas.microsoft.com/office/drawing/2014/main" id="{2550BE34-C2B8-49B8-8519-67A8CAD51AE9}"/>
               </a:ext>
               <a:ext uri="{C183D7F6-B498-43B3-948B-1728B52AA6E4}">
                 <adec:decorative xmlns:adec="http://schemas.microsoft.com/office/drawing/2017/decorative" val="1"/>
@@ -12049,8 +12832,8 @@
         </p:nvSpPr>
         <p:spPr>
           <a:xfrm>
-            <a:off x="3048" y="0"/>
-            <a:ext cx="12188952" cy="6858000"/>
+            <a:off x="0" y="0"/>
+            <a:ext cx="12192000" cy="6858000"/>
           </a:xfrm>
           <a:prstGeom prst="rect">
             <a:avLst/>
@@ -12084,12 +12867,12 @@
           </a:p>
         </p:txBody>
       </p:sp>
-      <p:sp>
+      <p:sp useBgFill="1">
         <p:nvSpPr>
-          <p:cNvPr id="19" name="Freeform: Shape 18">
+          <p:cNvPr id="12" name="Rectangle 11">
             <a:extLst>
               <a:ext uri="{FF2B5EF4-FFF2-40B4-BE49-F238E27FC236}">
-                <a16:creationId xmlns:a16="http://schemas.microsoft.com/office/drawing/2014/main" id="{DAAE4CDD-124C-4DCF-9584-B6033B545DD5}"/>
+                <a16:creationId xmlns:a16="http://schemas.microsoft.com/office/drawing/2014/main" id="{A7457DD9-5A45-400A-AB4B-4B4EDECA25F1}"/>
               </a:ext>
               <a:ext uri="{C183D7F6-B498-43B3-948B-1728B52AA6E4}">
                 <adec:decorative xmlns:adec="http://schemas.microsoft.com/office/drawing/2017/decorative" val="1"/>
@@ -12109,83 +12892,153 @@
         </p:nvSpPr>
         <p:spPr>
           <a:xfrm>
-            <a:off x="1" y="0"/>
-            <a:ext cx="4167271" cy="6858000"/>
+            <a:off x="554416" y="365125"/>
+            <a:ext cx="11167447" cy="2089317"/>
           </a:xfrm>
-          <a:custGeom>
+          <a:prstGeom prst="rect">
             <a:avLst/>
-            <a:gdLst>
-              <a:gd name="connsiteX0" fmla="*/ 0 w 4167271"/>
-              <a:gd name="connsiteY0" fmla="*/ 0 h 6858000"/>
-              <a:gd name="connsiteX1" fmla="*/ 2259550 w 4167271"/>
-              <a:gd name="connsiteY1" fmla="*/ 0 h 6858000"/>
-              <a:gd name="connsiteX2" fmla="*/ 2387803 w 4167271"/>
-              <a:gd name="connsiteY2" fmla="*/ 82222 h 6858000"/>
-              <a:gd name="connsiteX3" fmla="*/ 4167271 w 4167271"/>
-              <a:gd name="connsiteY3" fmla="*/ 3429000 h 6858000"/>
-              <a:gd name="connsiteX4" fmla="*/ 2387803 w 4167271"/>
-              <a:gd name="connsiteY4" fmla="*/ 6775779 h 6858000"/>
-              <a:gd name="connsiteX5" fmla="*/ 2259550 w 4167271"/>
-              <a:gd name="connsiteY5" fmla="*/ 6858000 h 6858000"/>
-              <a:gd name="connsiteX6" fmla="*/ 0 w 4167271"/>
-              <a:gd name="connsiteY6" fmla="*/ 6858000 h 6858000"/>
-            </a:gdLst>
-            <a:ahLst/>
-            <a:cxnLst>
-              <a:cxn ang="0">
-                <a:pos x="connsiteX0" y="connsiteY0"/>
-              </a:cxn>
-              <a:cxn ang="0">
-                <a:pos x="connsiteX1" y="connsiteY1"/>
-              </a:cxn>
-              <a:cxn ang="0">
-                <a:pos x="connsiteX2" y="connsiteY2"/>
-              </a:cxn>
-              <a:cxn ang="0">
-                <a:pos x="connsiteX3" y="connsiteY3"/>
-              </a:cxn>
-              <a:cxn ang="0">
-                <a:pos x="connsiteX4" y="connsiteY4"/>
-              </a:cxn>
-              <a:cxn ang="0">
-                <a:pos x="connsiteX5" y="connsiteY5"/>
-              </a:cxn>
-              <a:cxn ang="0">
-                <a:pos x="connsiteX6" y="connsiteY6"/>
-              </a:cxn>
-            </a:cxnLst>
-            <a:rect l="l" t="t" r="r" b="b"/>
-            <a:pathLst>
-              <a:path w="4167271" h="6858000">
-                <a:moveTo>
-                  <a:pt x="0" y="0"/>
-                </a:moveTo>
-                <a:lnTo>
-                  <a:pt x="2259550" y="0"/>
-                </a:lnTo>
-                <a:lnTo>
-                  <a:pt x="2387803" y="82222"/>
-                </a:lnTo>
-                <a:cubicBezTo>
-                  <a:pt x="3461407" y="807534"/>
-                  <a:pt x="4167271" y="2035835"/>
-                  <a:pt x="4167271" y="3429000"/>
-                </a:cubicBezTo>
-                <a:cubicBezTo>
-                  <a:pt x="4167271" y="4822165"/>
-                  <a:pt x="3461407" y="6050467"/>
-                  <a:pt x="2387803" y="6775779"/>
-                </a:cubicBezTo>
-                <a:lnTo>
-                  <a:pt x="2259550" y="6858000"/>
-                </a:lnTo>
-                <a:lnTo>
-                  <a:pt x="0" y="6858000"/>
-                </a:lnTo>
-                <a:close/>
-              </a:path>
-            </a:pathLst>
-          </a:custGeom>
+          </a:prstGeom>
+          <a:ln w="12700">
+            <a:solidFill>
+              <a:srgbClr val="DEDEDE"/>
+            </a:solidFill>
+          </a:ln>
+          <a:effectLst>
+            <a:outerShdw blurRad="50800" dist="38100" dir="2700000" algn="tl" rotWithShape="0">
+              <a:schemeClr val="bg2">
+                <a:lumMod val="85000"/>
+                <a:alpha val="50000"/>
+              </a:schemeClr>
+            </a:outerShdw>
+          </a:effectLst>
+        </p:spPr>
+        <p:style>
+          <a:lnRef idx="2">
+            <a:schemeClr val="accent1">
+              <a:shade val="50000"/>
+            </a:schemeClr>
+          </a:lnRef>
+          <a:fillRef idx="1">
+            <a:schemeClr val="accent1"/>
+          </a:fillRef>
+          <a:effectRef idx="0">
+            <a:schemeClr val="accent1"/>
+          </a:effectRef>
+          <a:fontRef idx="minor">
+            <a:schemeClr val="lt1"/>
+          </a:fontRef>
+        </p:style>
+        <p:txBody>
+          <a:bodyPr rtlCol="0" anchor="ctr"/>
+          <a:lstStyle/>
+          <a:p>
+            <a:pPr marL="0" marR="0" lvl="0" indent="0" algn="ctr" defTabSz="914400" rtl="0" eaLnBrk="1" fontAlgn="auto" latinLnBrk="0" hangingPunct="1">
+              <a:lnSpc>
+                <a:spcPct val="100000"/>
+              </a:lnSpc>
+              <a:spcBef>
+                <a:spcPts val="0"/>
+              </a:spcBef>
+              <a:spcAft>
+                <a:spcPts val="0"/>
+              </a:spcAft>
+              <a:buClrTx/>
+              <a:buSzTx/>
+              <a:buFontTx/>
+              <a:buNone/>
+              <a:tabLst/>
+              <a:defRPr/>
+            </a:pPr>
+            <a:endParaRPr kumimoji="0" lang="en-US" sz="1800" b="0" i="0" u="none" strike="noStrike" kern="1200" cap="none" spc="0" normalizeH="0" baseline="0" noProof="0">
+              <a:ln>
+                <a:noFill/>
+              </a:ln>
+              <a:solidFill>
+                <a:prstClr val="white"/>
+              </a:solidFill>
+              <a:effectLst/>
+              <a:uLnTx/>
+              <a:uFillTx/>
+              <a:latin typeface="Calibri" panose="020F0502020204030204"/>
+              <a:ea typeface="+mn-ea"/>
+              <a:cs typeface="+mn-cs"/>
+            </a:endParaRPr>
+          </a:p>
+        </p:txBody>
+      </p:sp>
+      <p:sp>
+        <p:nvSpPr>
+          <p:cNvPr id="2" name="Title 1">
+            <a:extLst>
+              <a:ext uri="{FF2B5EF4-FFF2-40B4-BE49-F238E27FC236}">
+                <a16:creationId xmlns:a16="http://schemas.microsoft.com/office/drawing/2014/main" id="{48FE7A46-5640-1D42-9A39-D790287C751F}"/>
+              </a:ext>
+            </a:extLst>
+          </p:cNvPr>
+          <p:cNvSpPr>
+            <a:spLocks noGrp="1"/>
+          </p:cNvSpPr>
+          <p:nvPr>
+            <p:ph type="title"/>
+          </p:nvPr>
+        </p:nvSpPr>
+        <p:spPr>
+          <a:xfrm>
+            <a:off x="1046746" y="586822"/>
+            <a:ext cx="3560252" cy="1645920"/>
+          </a:xfrm>
+        </p:spPr>
+        <p:txBody>
+          <a:bodyPr vert="horz" lIns="91440" tIns="45720" rIns="91440" bIns="45720" rtlCol="0" anchor="ctr">
+            <a:normAutofit/>
+          </a:bodyPr>
+          <a:lstStyle/>
+          <a:p>
+            <a:r>
+              <a:rPr lang="en-US" sz="3200" kern="1200">
+                <a:solidFill>
+                  <a:schemeClr val="tx1"/>
+                </a:solidFill>
+                <a:latin typeface="+mj-lt"/>
+                <a:ea typeface="+mj-ea"/>
+                <a:cs typeface="+mj-cs"/>
+              </a:rPr>
+              <a:t>ID_TABLE</a:t>
+            </a:r>
+          </a:p>
+        </p:txBody>
+      </p:sp>
+      <p:sp>
+        <p:nvSpPr>
+          <p:cNvPr id="14" name="Rectangle 13">
+            <a:extLst>
+              <a:ext uri="{FF2B5EF4-FFF2-40B4-BE49-F238E27FC236}">
+                <a16:creationId xmlns:a16="http://schemas.microsoft.com/office/drawing/2014/main" id="{441CF7D6-A660-431A-B0BB-140A0D5556B6}"/>
+              </a:ext>
+              <a:ext uri="{C183D7F6-B498-43B3-948B-1728B52AA6E4}">
+                <adec:decorative xmlns:adec="http://schemas.microsoft.com/office/drawing/2017/decorative" val="1"/>
+              </a:ext>
+            </a:extLst>
+          </p:cNvPr>
+          <p:cNvSpPr>
+            <a:spLocks noGrp="1" noRot="1" noChangeAspect="1" noMove="1" noResize="1" noEditPoints="1" noAdjustHandles="1" noChangeArrowheads="1" noChangeShapeType="1" noTextEdit="1"/>
+          </p:cNvSpPr>
+          <p:nvPr>
+            <p:extLst>
+              <p:ext uri="{386F3935-93C4-4BCD-93E2-E3B085C9AB24}">
+                <p16:designElem xmlns:p16="http://schemas.microsoft.com/office/powerpoint/2015/main" val="1"/>
+              </p:ext>
+            </p:extLst>
+          </p:nvPr>
+        </p:nvSpPr>
+        <p:spPr>
+          <a:xfrm>
+            <a:off x="490408" y="1057739"/>
+            <a:ext cx="128016" cy="704088"/>
+          </a:xfrm>
+          <a:prstGeom prst="rect">
+            <a:avLst/>
+          </a:prstGeom>
           <a:solidFill>
             <a:schemeClr val="accent2"/>
           </a:solidFill>
@@ -12214,16 +13067,21 @@
           <a:lstStyle/>
           <a:p>
             <a:pPr algn="ctr"/>
-            <a:endParaRPr lang="en-US"/>
+            <a:endParaRPr lang="en-US" dirty="0">
+              <a:solidFill>
+                <a:prstClr val="white"/>
+              </a:solidFill>
+              <a:latin typeface="Calibri" panose="020F0502020204030204"/>
+            </a:endParaRPr>
           </a:p>
         </p:txBody>
       </p:sp>
       <p:sp>
         <p:nvSpPr>
-          <p:cNvPr id="21" name="Arc 20">
+          <p:cNvPr id="16" name="Rectangle 15">
             <a:extLst>
               <a:ext uri="{FF2B5EF4-FFF2-40B4-BE49-F238E27FC236}">
-                <a16:creationId xmlns:a16="http://schemas.microsoft.com/office/drawing/2014/main" id="{081E4A58-353D-44AE-B2FC-2A74E2E400F7}"/>
+                <a16:creationId xmlns:a16="http://schemas.microsoft.com/office/drawing/2014/main" id="{0570A85B-3810-4F95-97B0-CBF4CCDB381C}"/>
               </a:ext>
               <a:ext uri="{C183D7F6-B498-43B3-948B-1728B52AA6E4}">
                 <adec:decorative xmlns:adec="http://schemas.microsoft.com/office/drawing/2017/decorative" val="1"/>
@@ -12242,32 +13100,35 @@
           </p:nvPr>
         </p:nvSpPr>
         <p:spPr>
-          <a:xfrm flipV="1">
-            <a:off x="7550402" y="2455479"/>
-            <a:ext cx="4083433" cy="4083433"/>
+          <a:xfrm rot="5400000">
+            <a:off x="4243541" y="1400638"/>
+            <a:ext cx="1463040" cy="18288"/>
           </a:xfrm>
-          <a:prstGeom prst="arc">
+          <a:prstGeom prst="rect">
             <a:avLst/>
           </a:prstGeom>
-          <a:ln w="127000" cap="rnd">
-            <a:solidFill>
-              <a:schemeClr val="accent4"/>
-            </a:solidFill>
-            <a:prstDash val="dash"/>
+          <a:solidFill>
+            <a:srgbClr val="D5D5D5"/>
+          </a:solidFill>
+          <a:ln w="3175">
+            <a:noFill/>
           </a:ln>
+          <a:effectLst/>
         </p:spPr>
         <p:style>
-          <a:lnRef idx="1">
-            <a:schemeClr val="accent1"/>
+          <a:lnRef idx="2">
+            <a:schemeClr val="accent1">
+              <a:shade val="50000"/>
+            </a:schemeClr>
           </a:lnRef>
-          <a:fillRef idx="0">
+          <a:fillRef idx="1">
             <a:schemeClr val="accent1"/>
           </a:fillRef>
           <a:effectRef idx="0">
             <a:schemeClr val="accent1"/>
           </a:effectRef>
           <a:fontRef idx="minor">
-            <a:schemeClr val="tx1"/>
+            <a:schemeClr val="lt1"/>
           </a:fontRef>
         </p:style>
         <p:txBody>
@@ -12275,231 +13136,140 @@
           <a:lstStyle/>
           <a:p>
             <a:pPr algn="ctr"/>
-            <a:endParaRPr lang="en-US" dirty="0"/>
+            <a:endParaRPr lang="en-US">
+              <a:solidFill>
+                <a:prstClr val="white"/>
+              </a:solidFill>
+              <a:latin typeface="Calibri" panose="020F0502020204030204"/>
+            </a:endParaRPr>
           </a:p>
         </p:txBody>
       </p:sp>
       <p:sp>
         <p:nvSpPr>
-          <p:cNvPr id="3" name="Content Placeholder 2">
+          <p:cNvPr id="5" name="TextBox 4">
             <a:extLst>
               <a:ext uri="{FF2B5EF4-FFF2-40B4-BE49-F238E27FC236}">
-                <a16:creationId xmlns:a16="http://schemas.microsoft.com/office/drawing/2014/main" id="{55F93B07-670A-4344-BAE8-8F5CBE449FB9}"/>
+                <a16:creationId xmlns:a16="http://schemas.microsoft.com/office/drawing/2014/main" id="{7CC68232-7221-D748-83EB-1CF1F84C1604}"/>
               </a:ext>
             </a:extLst>
           </p:cNvPr>
-          <p:cNvSpPr>
-            <a:spLocks noGrp="1"/>
-          </p:cNvSpPr>
+          <p:cNvSpPr txBox="1"/>
+          <p:nvPr/>
+        </p:nvSpPr>
+        <p:spPr>
+          <a:xfrm>
+            <a:off x="5351164" y="586822"/>
+            <a:ext cx="6002636" cy="1645920"/>
+          </a:xfrm>
+          <a:prstGeom prst="rect">
+            <a:avLst/>
+          </a:prstGeom>
+        </p:spPr>
+        <p:txBody>
+          <a:bodyPr vert="horz" lIns="91440" tIns="45720" rIns="91440" bIns="45720" rtlCol="0" anchor="ctr">
+            <a:normAutofit/>
+          </a:bodyPr>
+          <a:lstStyle/>
+          <a:p>
+            <a:pPr indent="-228600">
+              <a:lnSpc>
+                <a:spcPct val="90000"/>
+              </a:lnSpc>
+              <a:spcAft>
+                <a:spcPts val="600"/>
+              </a:spcAft>
+              <a:buFont typeface="Arial" panose="020B0604020202020204" pitchFamily="34" charset="0"/>
+              <a:buChar char="•"/>
+            </a:pPr>
+            <a:r>
+              <a:rPr lang="en-US"/>
+              <a:t>In our case, the USB drive that our driver will support will have the following specifications:</a:t>
+            </a:r>
+          </a:p>
+          <a:p>
+            <a:pPr indent="-228600">
+              <a:lnSpc>
+                <a:spcPct val="90000"/>
+              </a:lnSpc>
+              <a:spcAft>
+                <a:spcPts val="600"/>
+              </a:spcAft>
+              <a:buFont typeface="Arial" panose="020B0604020202020204" pitchFamily="34" charset="0"/>
+              <a:buChar char="•"/>
+            </a:pPr>
+            <a:endParaRPr lang="en-US"/>
+          </a:p>
+          <a:p>
+            <a:pPr indent="-228600">
+              <a:lnSpc>
+                <a:spcPct val="90000"/>
+              </a:lnSpc>
+              <a:spcAft>
+                <a:spcPts val="600"/>
+              </a:spcAft>
+              <a:buFont typeface="Arial" panose="020B0604020202020204" pitchFamily="34" charset="0"/>
+              <a:buChar char="•"/>
+            </a:pPr>
+            <a:r>
+              <a:rPr lang="en-US"/>
+              <a:t>Vendor ID: 0x05dc Lexar Media, Inc.</a:t>
+            </a:r>
+          </a:p>
+          <a:p>
+            <a:pPr indent="-228600">
+              <a:lnSpc>
+                <a:spcPct val="90000"/>
+              </a:lnSpc>
+              <a:spcAft>
+                <a:spcPts val="600"/>
+              </a:spcAft>
+              <a:buFont typeface="Arial" panose="020B0604020202020204" pitchFamily="34" charset="0"/>
+              <a:buChar char="•"/>
+            </a:pPr>
+            <a:r>
+              <a:rPr lang="en-US"/>
+              <a:t>Product ID: 0xa81d LJDTT16G [JumpDrive 16GB]</a:t>
+            </a:r>
+          </a:p>
+        </p:txBody>
+      </p:sp>
+      <p:pic>
+        <p:nvPicPr>
+          <p:cNvPr id="4" name="Content Placeholder 3">
+            <a:extLst>
+              <a:ext uri="{FF2B5EF4-FFF2-40B4-BE49-F238E27FC236}">
+                <a16:creationId xmlns:a16="http://schemas.microsoft.com/office/drawing/2014/main" id="{23646192-6B22-874E-AAA9-B8FE1CEFFB25}"/>
+              </a:ext>
+            </a:extLst>
+          </p:cNvPr>
+          <p:cNvPicPr>
+            <a:picLocks noGrp="1" noChangeAspect="1"/>
+          </p:cNvPicPr>
           <p:nvPr>
             <p:ph idx="1"/>
           </p:nvPr>
-        </p:nvSpPr>
+        </p:nvPicPr>
+        <p:blipFill>
+          <a:blip r:embed="rId2"/>
+          <a:stretch>
+            <a:fillRect/>
+          </a:stretch>
+        </p:blipFill>
         <p:spPr>
           <a:xfrm>
-            <a:off x="4447308" y="591344"/>
-            <a:ext cx="6906491" cy="5585619"/>
+            <a:off x="557784" y="3373461"/>
+            <a:ext cx="11164824" cy="2205053"/>
           </a:xfrm>
+          <a:prstGeom prst="rect">
+            <a:avLst/>
+          </a:prstGeom>
         </p:spPr>
-        <p:txBody>
-          <a:bodyPr anchor="ctr">
-            <a:normAutofit/>
-          </a:bodyPr>
-          <a:lstStyle/>
-          <a:p>
-            <a:pPr marL="0" indent="0">
-              <a:buNone/>
-            </a:pPr>
-            <a:r>
-              <a:rPr lang="en-GB" sz="1200" dirty="0"/>
-              <a:t>static int </a:t>
-            </a:r>
-            <a:r>
-              <a:rPr lang="en-GB" sz="1200" dirty="0" err="1"/>
-              <a:t>my_usb_probe</a:t>
-            </a:r>
-            <a:r>
-              <a:rPr lang="en-GB" sz="1200" dirty="0"/>
-              <a:t>(struct </a:t>
-            </a:r>
-            <a:r>
-              <a:rPr lang="en-GB" sz="1200" dirty="0" err="1"/>
-              <a:t>usb_interface</a:t>
-            </a:r>
-            <a:r>
-              <a:rPr lang="en-GB" sz="1200" dirty="0"/>
-              <a:t> *interface, </a:t>
-            </a:r>
-            <a:r>
-              <a:rPr lang="en-GB" sz="1200" dirty="0" err="1"/>
-              <a:t>const</a:t>
-            </a:r>
-            <a:r>
-              <a:rPr lang="en-GB" sz="1200" dirty="0"/>
-              <a:t> struct </a:t>
-            </a:r>
-            <a:r>
-              <a:rPr lang="en-GB" sz="1200" dirty="0" err="1"/>
-              <a:t>usb_device_id</a:t>
-            </a:r>
-            <a:r>
-              <a:rPr lang="en-GB" sz="1200" dirty="0"/>
-              <a:t> *id)</a:t>
-            </a:r>
-          </a:p>
-          <a:p>
-            <a:pPr marL="0" indent="0">
-              <a:buNone/>
-            </a:pPr>
-            <a:r>
-              <a:rPr lang="en-GB" sz="1200" dirty="0"/>
-              <a:t>{</a:t>
-            </a:r>
-          </a:p>
-          <a:p>
-            <a:pPr marL="0" indent="0">
-              <a:buNone/>
-            </a:pPr>
-            <a:r>
-              <a:rPr lang="en-GB" sz="1200" dirty="0"/>
-              <a:t>    return 0;</a:t>
-            </a:r>
-          </a:p>
-          <a:p>
-            <a:pPr marL="0" indent="0">
-              <a:buNone/>
-            </a:pPr>
-            <a:r>
-              <a:rPr lang="en-GB" sz="1200" dirty="0"/>
-              <a:t>}</a:t>
-            </a:r>
-          </a:p>
-          <a:p>
-            <a:pPr marL="0" indent="0">
-              <a:buNone/>
-            </a:pPr>
-            <a:endParaRPr lang="en-GB" sz="1200" dirty="0"/>
-          </a:p>
-          <a:p>
-            <a:pPr lvl="1"/>
-            <a:r>
-              <a:rPr lang="en-GB" sz="1200" dirty="0"/>
-              <a:t>Probe function takes a </a:t>
-            </a:r>
-            <a:r>
-              <a:rPr lang="en-GB" sz="1200" dirty="0" err="1"/>
-              <a:t>usb</a:t>
-            </a:r>
-            <a:r>
-              <a:rPr lang="en-GB" sz="1200" dirty="0"/>
-              <a:t> interface and a </a:t>
-            </a:r>
-            <a:r>
-              <a:rPr lang="en-GB" sz="1200" dirty="0" err="1"/>
-              <a:t>usb</a:t>
-            </a:r>
-            <a:r>
-              <a:rPr lang="en-GB" sz="1200" dirty="0"/>
-              <a:t> device id as arguments and returns a int. This function gets called whenever any device supported by this driver gets installed to the host device.</a:t>
-            </a:r>
-          </a:p>
-          <a:p>
-            <a:pPr marL="0" indent="0">
-              <a:buNone/>
-            </a:pPr>
-            <a:endParaRPr lang="en-GB" sz="1200" dirty="0"/>
-          </a:p>
-          <a:p>
-            <a:pPr marL="0" indent="0">
-              <a:buNone/>
-            </a:pPr>
-            <a:r>
-              <a:rPr lang="en-GB" sz="1200" dirty="0"/>
-              <a:t>static void </a:t>
-            </a:r>
-            <a:r>
-              <a:rPr lang="en-GB" sz="1200" dirty="0" err="1"/>
-              <a:t>my_usb_disconnect</a:t>
-            </a:r>
-            <a:r>
-              <a:rPr lang="en-GB" sz="1200" dirty="0"/>
-              <a:t>(struct </a:t>
-            </a:r>
-            <a:r>
-              <a:rPr lang="en-GB" sz="1200" dirty="0" err="1"/>
-              <a:t>usb_interface</a:t>
-            </a:r>
-            <a:r>
-              <a:rPr lang="en-GB" sz="1200" dirty="0"/>
-              <a:t> *interface)</a:t>
-            </a:r>
-          </a:p>
-          <a:p>
-            <a:pPr marL="0" indent="0">
-              <a:buNone/>
-            </a:pPr>
-            <a:r>
-              <a:rPr lang="en-GB" sz="1200" dirty="0"/>
-              <a:t>{</a:t>
-            </a:r>
-          </a:p>
-          <a:p>
-            <a:pPr marL="0" indent="0">
-              <a:buNone/>
-            </a:pPr>
-            <a:r>
-              <a:rPr lang="en-GB" sz="1200" dirty="0"/>
-              <a:t>}</a:t>
-            </a:r>
-          </a:p>
-          <a:p>
-            <a:pPr marL="0" indent="0">
-              <a:buNone/>
-            </a:pPr>
-            <a:endParaRPr lang="en-GB" sz="1200" dirty="0"/>
-          </a:p>
-          <a:p>
-            <a:pPr lvl="1"/>
-            <a:r>
-              <a:rPr lang="en-GB" sz="1200" dirty="0"/>
-              <a:t>Disconnect function takes only a </a:t>
-            </a:r>
-            <a:r>
-              <a:rPr lang="en-GB" sz="1200" dirty="0" err="1"/>
-              <a:t>usb</a:t>
-            </a:r>
-            <a:r>
-              <a:rPr lang="en-GB" sz="1200" dirty="0"/>
-              <a:t> interface as an argument and doesn’t return anything. This function gets called whenever any device supported by this driver gets removed from the host device.</a:t>
-            </a:r>
-          </a:p>
-          <a:p>
-            <a:pPr marL="0" indent="0">
-              <a:buNone/>
-            </a:pPr>
-            <a:endParaRPr lang="en-GB" sz="1200" dirty="0"/>
-          </a:p>
-          <a:p>
-            <a:pPr marL="0" indent="0">
-              <a:buNone/>
-            </a:pPr>
-            <a:r>
-              <a:rPr lang="en-GB" sz="1200" dirty="0"/>
-              <a:t>Probe and disconnect functions will be filled later.</a:t>
-            </a:r>
-          </a:p>
-          <a:p>
-            <a:pPr marL="0" indent="0">
-              <a:buNone/>
-            </a:pPr>
-            <a:endParaRPr lang="en-GB" sz="1000" dirty="0"/>
-          </a:p>
-        </p:txBody>
-      </p:sp>
+      </p:pic>
     </p:spTree>
     <p:extLst>
       <p:ext uri="{BB962C8B-B14F-4D97-AF65-F5344CB8AC3E}">
-        <p14:creationId xmlns:p14="http://schemas.microsoft.com/office/powerpoint/2010/main" val="274937843"/>
+        <p14:creationId xmlns:p14="http://schemas.microsoft.com/office/powerpoint/2010/main" val="2571021819"/>
       </p:ext>
     </p:extLst>
   </p:cSld>

</xml_diff>

<commit_message>
Updated the progress report.
</commit_message>
<xml_diff>
--- a/progress_report.pptx
+++ b/progress_report.pptx
@@ -12499,7 +12499,7 @@
       </p:sp>
       <p:sp>
         <p:nvSpPr>
-          <p:cNvPr id="20" name="Rectangle 15">
+          <p:cNvPr id="26" name="Rectangle 25">
             <a:extLst>
               <a:ext uri="{FF2B5EF4-FFF2-40B4-BE49-F238E27FC236}">
                 <a16:creationId xmlns:a16="http://schemas.microsoft.com/office/drawing/2014/main" id="{5E39A796-BE83-48B1-B33F-35C4A32AAB57}"/>
@@ -12562,7 +12562,7 @@
       </p:sp>
       <p:sp>
         <p:nvSpPr>
-          <p:cNvPr id="21" name="Rounded Rectangle 9">
+          <p:cNvPr id="28" name="Rounded Rectangle 9">
             <a:extLst>
               <a:ext uri="{FF2B5EF4-FFF2-40B4-BE49-F238E27FC236}">
                 <a16:creationId xmlns:a16="http://schemas.microsoft.com/office/drawing/2014/main" id="{72F84B47-E267-4194-8194-831DB7B5547F}"/>
@@ -12636,10 +12636,10 @@
       </p:sp>
       <p:pic>
         <p:nvPicPr>
-          <p:cNvPr id="4" name="Picture 3">
+          <p:cNvPr id="5" name="Picture 4">
             <a:extLst>
               <a:ext uri="{FF2B5EF4-FFF2-40B4-BE49-F238E27FC236}">
-                <a16:creationId xmlns:a16="http://schemas.microsoft.com/office/drawing/2014/main" id="{BB2204ED-8E9E-F54D-97B7-84120434A18A}"/>
+                <a16:creationId xmlns:a16="http://schemas.microsoft.com/office/drawing/2014/main" id="{3996A7E5-DF39-2147-81D2-516E14336EAB}"/>
               </a:ext>
             </a:extLst>
           </p:cNvPr>
@@ -12648,15 +12648,16 @@
           </p:cNvPicPr>
           <p:nvPr/>
         </p:nvPicPr>
-        <p:blipFill rotWithShape="1">
+        <p:blipFill>
           <a:blip r:embed="rId2"/>
-          <a:srcRect l="3039" r="6660"/>
-          <a:stretch/>
+          <a:stretch>
+            <a:fillRect/>
+          </a:stretch>
         </p:blipFill>
         <p:spPr>
           <a:xfrm>
-            <a:off x="5405862" y="1660927"/>
-            <a:ext cx="6019331" cy="3532899"/>
+            <a:off x="5405862" y="2246084"/>
+            <a:ext cx="6019331" cy="2362586"/>
           </a:xfrm>
           <a:prstGeom prst="rect">
             <a:avLst/>

</xml_diff>

<commit_message>
made a few changes in progress report
</commit_message>
<xml_diff>
--- a/progress_report.pptx
+++ b/progress_report.pptx
@@ -3111,7 +3111,7 @@
           <a:p>
             <a:fld id="{FEB878D6-2472-4594-812B-C6E8B8E156AD}" type="datetimeFigureOut">
               <a:rPr lang="en-GB" smtClean="0"/>
-              <a:t>09/04/2021</a:t>
+              <a:t>10/04/2021</a:t>
             </a:fld>
             <a:endParaRPr lang="en-GB"/>
           </a:p>
@@ -3311,7 +3311,7 @@
           <a:p>
             <a:fld id="{FEB878D6-2472-4594-812B-C6E8B8E156AD}" type="datetimeFigureOut">
               <a:rPr lang="en-GB" smtClean="0"/>
-              <a:t>09/04/2021</a:t>
+              <a:t>10/04/2021</a:t>
             </a:fld>
             <a:endParaRPr lang="en-GB"/>
           </a:p>
@@ -3521,7 +3521,7 @@
           <a:p>
             <a:fld id="{FEB878D6-2472-4594-812B-C6E8B8E156AD}" type="datetimeFigureOut">
               <a:rPr lang="en-GB" smtClean="0"/>
-              <a:t>09/04/2021</a:t>
+              <a:t>10/04/2021</a:t>
             </a:fld>
             <a:endParaRPr lang="en-GB"/>
           </a:p>
@@ -3721,7 +3721,7 @@
           <a:p>
             <a:fld id="{FEB878D6-2472-4594-812B-C6E8B8E156AD}" type="datetimeFigureOut">
               <a:rPr lang="en-GB" smtClean="0"/>
-              <a:t>09/04/2021</a:t>
+              <a:t>10/04/2021</a:t>
             </a:fld>
             <a:endParaRPr lang="en-GB"/>
           </a:p>
@@ -3997,7 +3997,7 @@
           <a:p>
             <a:fld id="{FEB878D6-2472-4594-812B-C6E8B8E156AD}" type="datetimeFigureOut">
               <a:rPr lang="en-GB" smtClean="0"/>
-              <a:t>09/04/2021</a:t>
+              <a:t>10/04/2021</a:t>
             </a:fld>
             <a:endParaRPr lang="en-GB"/>
           </a:p>
@@ -4265,7 +4265,7 @@
           <a:p>
             <a:fld id="{FEB878D6-2472-4594-812B-C6E8B8E156AD}" type="datetimeFigureOut">
               <a:rPr lang="en-GB" smtClean="0"/>
-              <a:t>09/04/2021</a:t>
+              <a:t>10/04/2021</a:t>
             </a:fld>
             <a:endParaRPr lang="en-GB"/>
           </a:p>
@@ -4680,7 +4680,7 @@
           <a:p>
             <a:fld id="{FEB878D6-2472-4594-812B-C6E8B8E156AD}" type="datetimeFigureOut">
               <a:rPr lang="en-GB" smtClean="0"/>
-              <a:t>09/04/2021</a:t>
+              <a:t>10/04/2021</a:t>
             </a:fld>
             <a:endParaRPr lang="en-GB"/>
           </a:p>
@@ -4822,7 +4822,7 @@
           <a:p>
             <a:fld id="{FEB878D6-2472-4594-812B-C6E8B8E156AD}" type="datetimeFigureOut">
               <a:rPr lang="en-GB" smtClean="0"/>
-              <a:t>09/04/2021</a:t>
+              <a:t>10/04/2021</a:t>
             </a:fld>
             <a:endParaRPr lang="en-GB"/>
           </a:p>
@@ -4935,7 +4935,7 @@
           <a:p>
             <a:fld id="{FEB878D6-2472-4594-812B-C6E8B8E156AD}" type="datetimeFigureOut">
               <a:rPr lang="en-GB" smtClean="0"/>
-              <a:t>09/04/2021</a:t>
+              <a:t>10/04/2021</a:t>
             </a:fld>
             <a:endParaRPr lang="en-GB"/>
           </a:p>
@@ -5248,7 +5248,7 @@
           <a:p>
             <a:fld id="{FEB878D6-2472-4594-812B-C6E8B8E156AD}" type="datetimeFigureOut">
               <a:rPr lang="en-GB" smtClean="0"/>
-              <a:t>09/04/2021</a:t>
+              <a:t>10/04/2021</a:t>
             </a:fld>
             <a:endParaRPr lang="en-GB"/>
           </a:p>
@@ -5537,7 +5537,7 @@
           <a:p>
             <a:fld id="{FEB878D6-2472-4594-812B-C6E8B8E156AD}" type="datetimeFigureOut">
               <a:rPr lang="en-GB" smtClean="0"/>
-              <a:t>09/04/2021</a:t>
+              <a:t>10/04/2021</a:t>
             </a:fld>
             <a:endParaRPr lang="en-GB"/>
           </a:p>
@@ -5780,7 +5780,7 @@
           <a:p>
             <a:fld id="{FEB878D6-2472-4594-812B-C6E8B8E156AD}" type="datetimeFigureOut">
               <a:rPr lang="en-GB" smtClean="0"/>
-              <a:t>09/04/2021</a:t>
+              <a:t>10/04/2021</a:t>
             </a:fld>
             <a:endParaRPr lang="en-GB"/>
           </a:p>
@@ -6831,6 +6831,14 @@
 <file path=ppt/slides/slide10.xml><?xml version="1.0" encoding="utf-8"?>
 <p:sld xmlns:a="http://schemas.openxmlformats.org/drawingml/2006/main" xmlns:r="http://schemas.openxmlformats.org/officeDocument/2006/relationships" xmlns:p="http://schemas.openxmlformats.org/presentationml/2006/main">
   <p:cSld>
+    <p:bg>
+      <p:bgPr>
+        <a:solidFill>
+          <a:schemeClr val="bg1"/>
+        </a:solidFill>
+        <a:effectLst/>
+      </p:bgPr>
+    </p:bg>
     <p:spTree>
       <p:nvGrpSpPr>
         <p:cNvPr id="1" name=""/>
@@ -6845,9 +6853,474 @@
           <a:chExt cx="0" cy="0"/>
         </a:xfrm>
       </p:grpSpPr>
+      <p:sp useBgFill="1">
+        <p:nvSpPr>
+          <p:cNvPr id="10" name="Rectangle 9">
+            <a:extLst>
+              <a:ext uri="{FF2B5EF4-FFF2-40B4-BE49-F238E27FC236}">
+                <a16:creationId xmlns:a16="http://schemas.microsoft.com/office/drawing/2014/main" id="{743AA782-23D1-4521-8CAD-47662984AA08}"/>
+              </a:ext>
+              <a:ext uri="{C183D7F6-B498-43B3-948B-1728B52AA6E4}">
+                <adec:decorative xmlns:adec="http://schemas.microsoft.com/office/drawing/2017/decorative" val="1"/>
+              </a:ext>
+            </a:extLst>
+          </p:cNvPr>
+          <p:cNvSpPr>
+            <a:spLocks noGrp="1" noRot="1" noChangeAspect="1" noMove="1" noResize="1" noEditPoints="1" noAdjustHandles="1" noChangeArrowheads="1" noChangeShapeType="1" noTextEdit="1"/>
+          </p:cNvSpPr>
+          <p:nvPr>
+            <p:extLst>
+              <p:ext uri="{386F3935-93C4-4BCD-93E2-E3B085C9AB24}">
+                <p16:designElem xmlns:p16="http://schemas.microsoft.com/office/powerpoint/2015/main" val="1"/>
+              </p:ext>
+            </p:extLst>
+          </p:nvPr>
+        </p:nvSpPr>
+        <p:spPr>
+          <a:xfrm>
+            <a:off x="0" y="0"/>
+            <a:ext cx="12192000" cy="6858000"/>
+          </a:xfrm>
+          <a:prstGeom prst="rect">
+            <a:avLst/>
+          </a:prstGeom>
+          <a:ln>
+            <a:noFill/>
+          </a:ln>
+        </p:spPr>
+        <p:style>
+          <a:lnRef idx="2">
+            <a:schemeClr val="accent1">
+              <a:shade val="50000"/>
+            </a:schemeClr>
+          </a:lnRef>
+          <a:fillRef idx="1">
+            <a:schemeClr val="accent1"/>
+          </a:fillRef>
+          <a:effectRef idx="0">
+            <a:schemeClr val="accent1"/>
+          </a:effectRef>
+          <a:fontRef idx="minor">
+            <a:schemeClr val="lt1"/>
+          </a:fontRef>
+        </p:style>
+        <p:txBody>
+          <a:bodyPr rtlCol="0" anchor="ctr"/>
+          <a:lstStyle/>
+          <a:p>
+            <a:pPr algn="ctr"/>
+            <a:endParaRPr lang="en-US"/>
+          </a:p>
+        </p:txBody>
+      </p:sp>
+      <p:sp>
+        <p:nvSpPr>
+          <p:cNvPr id="4" name="Title 1">
+            <a:extLst>
+              <a:ext uri="{FF2B5EF4-FFF2-40B4-BE49-F238E27FC236}">
+                <a16:creationId xmlns:a16="http://schemas.microsoft.com/office/drawing/2014/main" id="{E858737E-E6A5-432E-A130-750C366E12AB}"/>
+              </a:ext>
+            </a:extLst>
+          </p:cNvPr>
+          <p:cNvSpPr>
+            <a:spLocks noGrp="1"/>
+          </p:cNvSpPr>
+          <p:nvPr>
+            <p:ph type="title"/>
+          </p:nvPr>
+        </p:nvSpPr>
+        <p:spPr>
+          <a:xfrm>
+            <a:off x="630936" y="640080"/>
+            <a:ext cx="4818888" cy="1481328"/>
+          </a:xfrm>
+        </p:spPr>
+        <p:txBody>
+          <a:bodyPr anchor="b">
+            <a:normAutofit/>
+          </a:bodyPr>
+          <a:lstStyle/>
+          <a:p>
+            <a:r>
+              <a:rPr lang="en-GB" sz="5000" dirty="0"/>
+              <a:t>“__</a:t>
+            </a:r>
+            <a:r>
+              <a:rPr lang="en-GB" sz="5000" dirty="0" err="1"/>
+              <a:t>init</a:t>
+            </a:r>
+            <a:r>
+              <a:rPr lang="en-GB" sz="5000" dirty="0"/>
+              <a:t>” and “__exit” methods</a:t>
+            </a:r>
+          </a:p>
+        </p:txBody>
+      </p:sp>
+      <p:sp>
+        <p:nvSpPr>
+          <p:cNvPr id="12" name="sketch line">
+            <a:extLst>
+              <a:ext uri="{FF2B5EF4-FFF2-40B4-BE49-F238E27FC236}">
+                <a16:creationId xmlns:a16="http://schemas.microsoft.com/office/drawing/2014/main" id="{71877DBC-BB60-40F0-AC93-2ACDBAAE60CE}"/>
+              </a:ext>
+              <a:ext uri="{C183D7F6-B498-43B3-948B-1728B52AA6E4}">
+                <adec:decorative xmlns:adec="http://schemas.microsoft.com/office/drawing/2017/decorative" val="1"/>
+              </a:ext>
+            </a:extLst>
+          </p:cNvPr>
+          <p:cNvSpPr>
+            <a:spLocks noGrp="1" noRot="1" noChangeAspect="1" noMove="1" noResize="1" noEditPoints="1" noAdjustHandles="1" noChangeArrowheads="1" noChangeShapeType="1" noTextEdit="1"/>
+          </p:cNvSpPr>
+          <p:nvPr>
+            <p:extLst>
+              <p:ext uri="{386F3935-93C4-4BCD-93E2-E3B085C9AB24}">
+                <p16:designElem xmlns:p16="http://schemas.microsoft.com/office/powerpoint/2015/main" val="1"/>
+              </p:ext>
+            </p:extLst>
+          </p:nvPr>
+        </p:nvSpPr>
+        <p:spPr>
+          <a:xfrm>
+            <a:off x="643278" y="2372868"/>
+            <a:ext cx="3255095" cy="18288"/>
+          </a:xfrm>
+          <a:custGeom>
+            <a:avLst/>
+            <a:gdLst>
+              <a:gd name="connsiteX0" fmla="*/ 0 w 3255095"/>
+              <a:gd name="connsiteY0" fmla="*/ 0 h 18288"/>
+              <a:gd name="connsiteX1" fmla="*/ 618468 w 3255095"/>
+              <a:gd name="connsiteY1" fmla="*/ 0 h 18288"/>
+              <a:gd name="connsiteX2" fmla="*/ 1269487 w 3255095"/>
+              <a:gd name="connsiteY2" fmla="*/ 0 h 18288"/>
+              <a:gd name="connsiteX3" fmla="*/ 1953057 w 3255095"/>
+              <a:gd name="connsiteY3" fmla="*/ 0 h 18288"/>
+              <a:gd name="connsiteX4" fmla="*/ 2636627 w 3255095"/>
+              <a:gd name="connsiteY4" fmla="*/ 0 h 18288"/>
+              <a:gd name="connsiteX5" fmla="*/ 3255095 w 3255095"/>
+              <a:gd name="connsiteY5" fmla="*/ 0 h 18288"/>
+              <a:gd name="connsiteX6" fmla="*/ 3255095 w 3255095"/>
+              <a:gd name="connsiteY6" fmla="*/ 18288 h 18288"/>
+              <a:gd name="connsiteX7" fmla="*/ 2538974 w 3255095"/>
+              <a:gd name="connsiteY7" fmla="*/ 18288 h 18288"/>
+              <a:gd name="connsiteX8" fmla="*/ 1822853 w 3255095"/>
+              <a:gd name="connsiteY8" fmla="*/ 18288 h 18288"/>
+              <a:gd name="connsiteX9" fmla="*/ 1171834 w 3255095"/>
+              <a:gd name="connsiteY9" fmla="*/ 18288 h 18288"/>
+              <a:gd name="connsiteX10" fmla="*/ 0 w 3255095"/>
+              <a:gd name="connsiteY10" fmla="*/ 18288 h 18288"/>
+              <a:gd name="connsiteX11" fmla="*/ 0 w 3255095"/>
+              <a:gd name="connsiteY11" fmla="*/ 0 h 18288"/>
+            </a:gdLst>
+            <a:ahLst/>
+            <a:cxnLst>
+              <a:cxn ang="0">
+                <a:pos x="connsiteX0" y="connsiteY0"/>
+              </a:cxn>
+              <a:cxn ang="0">
+                <a:pos x="connsiteX1" y="connsiteY1"/>
+              </a:cxn>
+              <a:cxn ang="0">
+                <a:pos x="connsiteX2" y="connsiteY2"/>
+              </a:cxn>
+              <a:cxn ang="0">
+                <a:pos x="connsiteX3" y="connsiteY3"/>
+              </a:cxn>
+              <a:cxn ang="0">
+                <a:pos x="connsiteX4" y="connsiteY4"/>
+              </a:cxn>
+              <a:cxn ang="0">
+                <a:pos x="connsiteX5" y="connsiteY5"/>
+              </a:cxn>
+              <a:cxn ang="0">
+                <a:pos x="connsiteX6" y="connsiteY6"/>
+              </a:cxn>
+              <a:cxn ang="0">
+                <a:pos x="connsiteX7" y="connsiteY7"/>
+              </a:cxn>
+              <a:cxn ang="0">
+                <a:pos x="connsiteX8" y="connsiteY8"/>
+              </a:cxn>
+              <a:cxn ang="0">
+                <a:pos x="connsiteX9" y="connsiteY9"/>
+              </a:cxn>
+              <a:cxn ang="0">
+                <a:pos x="connsiteX10" y="connsiteY10"/>
+              </a:cxn>
+              <a:cxn ang="0">
+                <a:pos x="connsiteX11" y="connsiteY11"/>
+              </a:cxn>
+            </a:cxnLst>
+            <a:rect l="l" t="t" r="r" b="b"/>
+            <a:pathLst>
+              <a:path w="3255095" h="18288" fill="none" extrusionOk="0">
+                <a:moveTo>
+                  <a:pt x="0" y="0"/>
+                </a:moveTo>
+                <a:cubicBezTo>
+                  <a:pt x="240201" y="-22123"/>
+                  <a:pt x="462021" y="-19623"/>
+                  <a:pt x="618468" y="0"/>
+                </a:cubicBezTo>
+                <a:cubicBezTo>
+                  <a:pt x="774915" y="19623"/>
+                  <a:pt x="974734" y="2035"/>
+                  <a:pt x="1269487" y="0"/>
+                </a:cubicBezTo>
+                <a:cubicBezTo>
+                  <a:pt x="1564240" y="-2035"/>
+                  <a:pt x="1733579" y="10639"/>
+                  <a:pt x="1953057" y="0"/>
+                </a:cubicBezTo>
+                <a:cubicBezTo>
+                  <a:pt x="2172535" y="-10639"/>
+                  <a:pt x="2453962" y="14018"/>
+                  <a:pt x="2636627" y="0"/>
+                </a:cubicBezTo>
+                <a:cubicBezTo>
+                  <a:pt x="2819292" y="-14018"/>
+                  <a:pt x="3121375" y="5399"/>
+                  <a:pt x="3255095" y="0"/>
+                </a:cubicBezTo>
+                <a:cubicBezTo>
+                  <a:pt x="3254386" y="8157"/>
+                  <a:pt x="3254682" y="12125"/>
+                  <a:pt x="3255095" y="18288"/>
+                </a:cubicBezTo>
+                <a:cubicBezTo>
+                  <a:pt x="3088545" y="23203"/>
+                  <a:pt x="2687475" y="7419"/>
+                  <a:pt x="2538974" y="18288"/>
+                </a:cubicBezTo>
+                <a:cubicBezTo>
+                  <a:pt x="2390473" y="29157"/>
+                  <a:pt x="2137381" y="-8959"/>
+                  <a:pt x="1822853" y="18288"/>
+                </a:cubicBezTo>
+                <a:cubicBezTo>
+                  <a:pt x="1508325" y="45535"/>
+                  <a:pt x="1466437" y="20385"/>
+                  <a:pt x="1171834" y="18288"/>
+                </a:cubicBezTo>
+                <a:cubicBezTo>
+                  <a:pt x="877231" y="16191"/>
+                  <a:pt x="561097" y="37643"/>
+                  <a:pt x="0" y="18288"/>
+                </a:cubicBezTo>
+                <a:cubicBezTo>
+                  <a:pt x="-46" y="12483"/>
+                  <a:pt x="-203" y="6491"/>
+                  <a:pt x="0" y="0"/>
+                </a:cubicBezTo>
+                <a:close/>
+              </a:path>
+              <a:path w="3255095" h="18288" stroke="0" extrusionOk="0">
+                <a:moveTo>
+                  <a:pt x="0" y="0"/>
+                </a:moveTo>
+                <a:cubicBezTo>
+                  <a:pt x="291965" y="19429"/>
+                  <a:pt x="363155" y="8568"/>
+                  <a:pt x="618468" y="0"/>
+                </a:cubicBezTo>
+                <a:cubicBezTo>
+                  <a:pt x="873781" y="-8568"/>
+                  <a:pt x="904459" y="-19505"/>
+                  <a:pt x="1171834" y="0"/>
+                </a:cubicBezTo>
+                <a:cubicBezTo>
+                  <a:pt x="1439209" y="19505"/>
+                  <a:pt x="1744369" y="9790"/>
+                  <a:pt x="1887955" y="0"/>
+                </a:cubicBezTo>
+                <a:cubicBezTo>
+                  <a:pt x="2031541" y="-9790"/>
+                  <a:pt x="2346378" y="21240"/>
+                  <a:pt x="2506423" y="0"/>
+                </a:cubicBezTo>
+                <a:cubicBezTo>
+                  <a:pt x="2666468" y="-21240"/>
+                  <a:pt x="2990257" y="30414"/>
+                  <a:pt x="3255095" y="0"/>
+                </a:cubicBezTo>
+                <a:cubicBezTo>
+                  <a:pt x="3254831" y="4493"/>
+                  <a:pt x="3255479" y="9472"/>
+                  <a:pt x="3255095" y="18288"/>
+                </a:cubicBezTo>
+                <a:cubicBezTo>
+                  <a:pt x="3120743" y="16690"/>
+                  <a:pt x="2759628" y="42462"/>
+                  <a:pt x="2604076" y="18288"/>
+                </a:cubicBezTo>
+                <a:cubicBezTo>
+                  <a:pt x="2448524" y="-5886"/>
+                  <a:pt x="2184336" y="19599"/>
+                  <a:pt x="1887955" y="18288"/>
+                </a:cubicBezTo>
+                <a:cubicBezTo>
+                  <a:pt x="1591574" y="16977"/>
+                  <a:pt x="1548845" y="6870"/>
+                  <a:pt x="1334589" y="18288"/>
+                </a:cubicBezTo>
+                <a:cubicBezTo>
+                  <a:pt x="1120333" y="29706"/>
+                  <a:pt x="996014" y="9662"/>
+                  <a:pt x="683570" y="18288"/>
+                </a:cubicBezTo>
+                <a:cubicBezTo>
+                  <a:pt x="371126" y="26914"/>
+                  <a:pt x="198687" y="16167"/>
+                  <a:pt x="0" y="18288"/>
+                </a:cubicBezTo>
+                <a:cubicBezTo>
+                  <a:pt x="843" y="9577"/>
+                  <a:pt x="371" y="6900"/>
+                  <a:pt x="0" y="0"/>
+                </a:cubicBezTo>
+                <a:close/>
+              </a:path>
+            </a:pathLst>
+          </a:custGeom>
+          <a:solidFill>
+            <a:schemeClr val="accent2"/>
+          </a:solidFill>
+          <a:ln w="38100" cap="rnd">
+            <a:solidFill>
+              <a:schemeClr val="accent2"/>
+            </a:solidFill>
+            <a:round/>
+            <a:extLst>
+              <a:ext uri="{C807C97D-BFC1-408E-A445-0C87EB9F89A2}">
+                <ask:lineSketchStyleProps xmlns:ask="http://schemas.microsoft.com/office/drawing/2018/sketchyshapes" sd="1219033472">
+                  <a:prstGeom prst="rect">
+                    <a:avLst/>
+                  </a:prstGeom>
+                  <ask:type>
+                    <ask:lineSketchFreehand/>
+                  </ask:type>
+                </ask:lineSketchStyleProps>
+              </a:ext>
+            </a:extLst>
+          </a:ln>
+        </p:spPr>
+        <p:style>
+          <a:lnRef idx="2">
+            <a:schemeClr val="accent1">
+              <a:shade val="50000"/>
+            </a:schemeClr>
+          </a:lnRef>
+          <a:fillRef idx="1">
+            <a:schemeClr val="accent1"/>
+          </a:fillRef>
+          <a:effectRef idx="0">
+            <a:schemeClr val="accent1"/>
+          </a:effectRef>
+          <a:fontRef idx="minor">
+            <a:schemeClr val="lt1"/>
+          </a:fontRef>
+        </p:style>
+        <p:txBody>
+          <a:bodyPr rtlCol="0" anchor="ctr"/>
+          <a:lstStyle/>
+          <a:p>
+            <a:pPr algn="ctr"/>
+            <a:endParaRPr lang="en-US"/>
+          </a:p>
+        </p:txBody>
+      </p:sp>
+      <p:sp>
+        <p:nvSpPr>
+          <p:cNvPr id="3" name="Content Placeholder 2">
+            <a:extLst>
+              <a:ext uri="{FF2B5EF4-FFF2-40B4-BE49-F238E27FC236}">
+                <a16:creationId xmlns:a16="http://schemas.microsoft.com/office/drawing/2014/main" id="{7B2D110B-817E-4BD8-8B5F-37900368E924}"/>
+              </a:ext>
+            </a:extLst>
+          </p:cNvPr>
+          <p:cNvSpPr>
+            <a:spLocks noGrp="1"/>
+          </p:cNvSpPr>
+          <p:nvPr>
+            <p:ph idx="1"/>
+          </p:nvPr>
+        </p:nvSpPr>
+        <p:spPr>
+          <a:xfrm>
+            <a:off x="630936" y="2660904"/>
+            <a:ext cx="4818888" cy="3547872"/>
+          </a:xfrm>
+        </p:spPr>
+        <p:txBody>
+          <a:bodyPr anchor="t">
+            <a:normAutofit lnSpcReduction="10000"/>
+          </a:bodyPr>
+          <a:lstStyle/>
+          <a:p>
+            <a:r>
+              <a:rPr lang="en-GB" sz="2000" dirty="0">
+                <a:latin typeface="Liberation Mono"/>
+              </a:rPr>
+              <a:t> Static method </a:t>
+            </a:r>
+            <a:r>
+              <a:rPr lang="en-GB" sz="2000" dirty="0" err="1">
+                <a:latin typeface="Liberation Mono"/>
+              </a:rPr>
+              <a:t>init</a:t>
+            </a:r>
+            <a:r>
+              <a:rPr lang="en-GB" sz="2000" dirty="0">
+                <a:latin typeface="Liberation Mono"/>
+              </a:rPr>
+              <a:t> stands for initialize and contains the functionality that we want to execute when the module is installed to the Linux kernel. In our case, we register the struct </a:t>
+            </a:r>
+            <a:r>
+              <a:rPr lang="en-GB" sz="2000" dirty="0" err="1">
+                <a:latin typeface="Liberation Mono"/>
+              </a:rPr>
+              <a:t>usb_driver</a:t>
+            </a:r>
+            <a:r>
+              <a:rPr lang="en-GB" sz="2000" dirty="0">
+                <a:latin typeface="Liberation Mono"/>
+              </a:rPr>
+              <a:t> with the USB subsystem.</a:t>
+            </a:r>
+          </a:p>
+          <a:p>
+            <a:pPr marL="0" indent="0">
+              <a:buNone/>
+            </a:pPr>
+            <a:endParaRPr lang="en-GB" sz="2000" dirty="0">
+              <a:latin typeface="Liberation Mono"/>
+            </a:endParaRPr>
+          </a:p>
+          <a:p>
+            <a:r>
+              <a:rPr lang="en-GB" sz="2000" dirty="0">
+                <a:latin typeface="Liberation Mono"/>
+              </a:rPr>
+              <a:t>Static method exit is called when the module is removed from the Linux kernel. The struct </a:t>
+            </a:r>
+            <a:r>
+              <a:rPr lang="en-GB" sz="2000" dirty="0" err="1">
+                <a:latin typeface="Liberation Mono"/>
+              </a:rPr>
+              <a:t>usb_driver</a:t>
+            </a:r>
+            <a:r>
+              <a:rPr lang="en-GB" sz="2000" dirty="0">
+                <a:latin typeface="Liberation Mono"/>
+              </a:rPr>
+              <a:t> should be unregistered from the kernel when the USB driver is unloaded.</a:t>
+            </a:r>
+          </a:p>
+        </p:txBody>
+      </p:sp>
       <p:pic>
         <p:nvPicPr>
-          <p:cNvPr id="5" name="Resim 4">
+          <p:cNvPr id="5" name="Resim 4" descr="Text&#10;&#10;Description automatically generated">
             <a:extLst>
               <a:ext uri="{FF2B5EF4-FFF2-40B4-BE49-F238E27FC236}">
                 <a16:creationId xmlns:a16="http://schemas.microsoft.com/office/drawing/2014/main" id="{DE098F4E-8303-489E-BC3F-B5F5F058A0A7}"/>
@@ -6867,100 +7340,14 @@
         </p:blipFill>
         <p:spPr>
           <a:xfrm>
-            <a:off x="8658821" y="4154905"/>
-            <a:ext cx="3533179" cy="2703095"/>
+            <a:off x="6099048" y="1340780"/>
+            <a:ext cx="5458968" cy="4176439"/>
           </a:xfrm>
           <a:prstGeom prst="rect">
             <a:avLst/>
           </a:prstGeom>
         </p:spPr>
       </p:pic>
-      <p:sp>
-        <p:nvSpPr>
-          <p:cNvPr id="3" name="Content Placeholder 2">
-            <a:extLst>
-              <a:ext uri="{FF2B5EF4-FFF2-40B4-BE49-F238E27FC236}">
-                <a16:creationId xmlns:a16="http://schemas.microsoft.com/office/drawing/2014/main" id="{7B2D110B-817E-4BD8-8B5F-37900368E924}"/>
-              </a:ext>
-            </a:extLst>
-          </p:cNvPr>
-          <p:cNvSpPr>
-            <a:spLocks noGrp="1"/>
-          </p:cNvSpPr>
-          <p:nvPr>
-            <p:ph idx="1"/>
-          </p:nvPr>
-        </p:nvSpPr>
-        <p:spPr/>
-        <p:txBody>
-          <a:bodyPr/>
-          <a:lstStyle/>
-          <a:p>
-            <a:r>
-              <a:rPr lang="en-GB" dirty="0"/>
-              <a:t> Static method </a:t>
-            </a:r>
-            <a:r>
-              <a:rPr lang="en-GB" dirty="0" err="1"/>
-              <a:t>init</a:t>
-            </a:r>
-            <a:r>
-              <a:rPr lang="en-GB" dirty="0"/>
-              <a:t> stands for initialize and contains the functionality that we want to execute when the device is connected such as registering our device etc. . Takes no parameter.</a:t>
-            </a:r>
-          </a:p>
-          <a:p>
-            <a:r>
-              <a:rPr lang="en-GB" dirty="0"/>
-              <a:t>Static method exit is used for the computation that we want our kernel to do when the device is disconnected. In our case we may disable some features of system or enable them.</a:t>
-            </a:r>
-          </a:p>
-          <a:p>
-            <a:endParaRPr lang="en-GB" dirty="0"/>
-          </a:p>
-        </p:txBody>
-      </p:sp>
-      <p:sp>
-        <p:nvSpPr>
-          <p:cNvPr id="4" name="Title 1">
-            <a:extLst>
-              <a:ext uri="{FF2B5EF4-FFF2-40B4-BE49-F238E27FC236}">
-                <a16:creationId xmlns:a16="http://schemas.microsoft.com/office/drawing/2014/main" id="{E858737E-E6A5-432E-A130-750C366E12AB}"/>
-              </a:ext>
-            </a:extLst>
-          </p:cNvPr>
-          <p:cNvSpPr>
-            <a:spLocks noGrp="1"/>
-          </p:cNvSpPr>
-          <p:nvPr>
-            <p:ph type="title"/>
-          </p:nvPr>
-        </p:nvSpPr>
-        <p:spPr>
-          <a:xfrm>
-            <a:off x="838200" y="365125"/>
-            <a:ext cx="10515600" cy="1325563"/>
-          </a:xfrm>
-        </p:spPr>
-        <p:txBody>
-          <a:bodyPr/>
-          <a:lstStyle/>
-          <a:p>
-            <a:r>
-              <a:rPr lang="en-GB" dirty="0"/>
-              <a:t>“__</a:t>
-            </a:r>
-            <a:r>
-              <a:rPr lang="en-GB" dirty="0" err="1"/>
-              <a:t>init</a:t>
-            </a:r>
-            <a:r>
-              <a:rPr lang="en-GB" dirty="0"/>
-              <a:t>” and “__exit” methods</a:t>
-            </a:r>
-          </a:p>
-        </p:txBody>
-      </p:sp>
     </p:spTree>
     <p:extLst>
       <p:ext uri="{BB962C8B-B14F-4D97-AF65-F5344CB8AC3E}">
@@ -7278,7 +7665,7 @@
         </p:spPr>
         <p:txBody>
           <a:bodyPr anchor="ctr">
-            <a:normAutofit/>
+            <a:normAutofit lnSpcReduction="10000"/>
           </a:bodyPr>
           <a:lstStyle/>
           <a:p>
@@ -7286,39 +7673,39 @@
               <a:buNone/>
             </a:pPr>
             <a:r>
-              <a:rPr lang="en-GB" sz="1200" dirty="0"/>
+              <a:rPr lang="en-GB" sz="1600" dirty="0"/>
               <a:t>static int </a:t>
             </a:r>
             <a:r>
-              <a:rPr lang="en-GB" sz="1200" dirty="0" err="1"/>
+              <a:rPr lang="en-GB" sz="1600" dirty="0" err="1"/>
               <a:t>my_usb_probe</a:t>
             </a:r>
             <a:r>
-              <a:rPr lang="en-GB" sz="1200" dirty="0"/>
+              <a:rPr lang="en-GB" sz="1600" dirty="0"/>
               <a:t>(struct </a:t>
             </a:r>
             <a:r>
-              <a:rPr lang="en-GB" sz="1200" dirty="0" err="1"/>
+              <a:rPr lang="en-GB" sz="1600" dirty="0" err="1"/>
               <a:t>usb_interface</a:t>
             </a:r>
             <a:r>
-              <a:rPr lang="en-GB" sz="1200" dirty="0"/>
+              <a:rPr lang="en-GB" sz="1600" dirty="0"/>
               <a:t> *interface, </a:t>
             </a:r>
             <a:r>
-              <a:rPr lang="en-GB" sz="1200" dirty="0" err="1"/>
+              <a:rPr lang="en-GB" sz="1600" dirty="0" err="1"/>
               <a:t>const</a:t>
             </a:r>
             <a:r>
-              <a:rPr lang="en-GB" sz="1200" dirty="0"/>
+              <a:rPr lang="en-GB" sz="1600" dirty="0"/>
               <a:t> struct </a:t>
             </a:r>
             <a:r>
-              <a:rPr lang="en-GB" sz="1200" dirty="0" err="1"/>
+              <a:rPr lang="en-GB" sz="1600" dirty="0" err="1"/>
               <a:t>usb_device_id</a:t>
             </a:r>
             <a:r>
-              <a:rPr lang="en-GB" sz="1200" dirty="0"/>
+              <a:rPr lang="en-GB" sz="1600" dirty="0"/>
               <a:t> *id)</a:t>
             </a:r>
           </a:p>
@@ -7327,7 +7714,7 @@
               <a:buNone/>
             </a:pPr>
             <a:r>
-              <a:rPr lang="en-GB" sz="1200" dirty="0"/>
+              <a:rPr lang="en-GB" sz="1600" dirty="0"/>
               <a:t>{</a:t>
             </a:r>
           </a:p>
@@ -7336,7 +7723,7 @@
               <a:buNone/>
             </a:pPr>
             <a:r>
-              <a:rPr lang="en-GB" sz="1200" dirty="0"/>
+              <a:rPr lang="en-GB" sz="1600" dirty="0"/>
               <a:t>    return 0;</a:t>
             </a:r>
           </a:p>
@@ -7345,7 +7732,7 @@
               <a:buNone/>
             </a:pPr>
             <a:r>
-              <a:rPr lang="en-GB" sz="1200" dirty="0"/>
+              <a:rPr lang="en-GB" sz="1600" dirty="0"/>
               <a:t>}</a:t>
             </a:r>
           </a:p>
@@ -7353,28 +7740,28 @@
             <a:pPr marL="0" indent="0">
               <a:buNone/>
             </a:pPr>
-            <a:endParaRPr lang="en-GB" sz="1200" dirty="0"/>
+            <a:endParaRPr lang="en-GB" sz="1600" dirty="0"/>
           </a:p>
           <a:p>
             <a:pPr lvl="1"/>
             <a:r>
-              <a:rPr lang="en-GB" sz="1200" dirty="0"/>
+              <a:rPr lang="en-GB" sz="1600" dirty="0"/>
               <a:t>Probe function takes a </a:t>
             </a:r>
             <a:r>
-              <a:rPr lang="en-GB" sz="1200" dirty="0" err="1"/>
+              <a:rPr lang="en-GB" sz="1600" dirty="0" err="1"/>
               <a:t>usb</a:t>
             </a:r>
             <a:r>
-              <a:rPr lang="en-GB" sz="1200" dirty="0"/>
+              <a:rPr lang="en-GB" sz="1600" dirty="0"/>
               <a:t> interface and a </a:t>
             </a:r>
             <a:r>
-              <a:rPr lang="en-GB" sz="1200" dirty="0" err="1"/>
+              <a:rPr lang="en-GB" sz="1600" dirty="0" err="1"/>
               <a:t>usb</a:t>
             </a:r>
             <a:r>
-              <a:rPr lang="en-GB" sz="1200" dirty="0"/>
+              <a:rPr lang="en-GB" sz="1600" dirty="0"/>
               <a:t> device id as arguments and returns a int. This function gets called whenever any device supported by this driver gets installed to the host device.</a:t>
             </a:r>
           </a:p>
@@ -7382,30 +7769,30 @@
             <a:pPr marL="0" indent="0">
               <a:buNone/>
             </a:pPr>
-            <a:endParaRPr lang="en-GB" sz="1200" dirty="0"/>
+            <a:endParaRPr lang="en-GB" sz="1600" dirty="0"/>
           </a:p>
           <a:p>
             <a:pPr marL="0" indent="0">
               <a:buNone/>
             </a:pPr>
             <a:r>
-              <a:rPr lang="en-GB" sz="1200" dirty="0"/>
+              <a:rPr lang="en-GB" sz="1600" dirty="0"/>
               <a:t>static void </a:t>
             </a:r>
             <a:r>
-              <a:rPr lang="en-GB" sz="1200" dirty="0" err="1"/>
+              <a:rPr lang="en-GB" sz="1600" dirty="0" err="1"/>
               <a:t>my_usb_disconnect</a:t>
             </a:r>
             <a:r>
-              <a:rPr lang="en-GB" sz="1200" dirty="0"/>
+              <a:rPr lang="en-GB" sz="1600" dirty="0"/>
               <a:t>(struct </a:t>
             </a:r>
             <a:r>
-              <a:rPr lang="en-GB" sz="1200" dirty="0" err="1"/>
+              <a:rPr lang="en-GB" sz="1600" dirty="0" err="1"/>
               <a:t>usb_interface</a:t>
             </a:r>
             <a:r>
-              <a:rPr lang="en-GB" sz="1200" dirty="0"/>
+              <a:rPr lang="en-GB" sz="1600" dirty="0"/>
               <a:t> *interface)</a:t>
             </a:r>
           </a:p>
@@ -7414,7 +7801,7 @@
               <a:buNone/>
             </a:pPr>
             <a:r>
-              <a:rPr lang="en-GB" sz="1200" dirty="0"/>
+              <a:rPr lang="en-GB" sz="1600" dirty="0"/>
               <a:t>{</a:t>
             </a:r>
           </a:p>
@@ -7423,7 +7810,7 @@
               <a:buNone/>
             </a:pPr>
             <a:r>
-              <a:rPr lang="en-GB" sz="1200" dirty="0"/>
+              <a:rPr lang="en-GB" sz="1600" dirty="0"/>
               <a:t>}</a:t>
             </a:r>
           </a:p>
@@ -7431,20 +7818,20 @@
             <a:pPr marL="0" indent="0">
               <a:buNone/>
             </a:pPr>
-            <a:endParaRPr lang="en-GB" sz="1200" dirty="0"/>
+            <a:endParaRPr lang="en-GB" sz="1600" dirty="0"/>
           </a:p>
           <a:p>
             <a:pPr lvl="1"/>
             <a:r>
-              <a:rPr lang="en-GB" sz="1200" dirty="0"/>
+              <a:rPr lang="en-GB" sz="1600" dirty="0"/>
               <a:t>Disconnect function takes only a </a:t>
             </a:r>
             <a:r>
-              <a:rPr lang="en-GB" sz="1200" dirty="0" err="1"/>
+              <a:rPr lang="en-GB" sz="1600" dirty="0" err="1"/>
               <a:t>usb</a:t>
             </a:r>
             <a:r>
-              <a:rPr lang="en-GB" sz="1200" dirty="0"/>
+              <a:rPr lang="en-GB" sz="1600" dirty="0"/>
               <a:t> interface as an argument and doesn’t return anything. This function gets called whenever any device supported by this driver gets removed from the host device.</a:t>
             </a:r>
           </a:p>
@@ -7452,14 +7839,14 @@
             <a:pPr marL="0" indent="0">
               <a:buNone/>
             </a:pPr>
-            <a:endParaRPr lang="en-GB" sz="1200" dirty="0"/>
+            <a:endParaRPr lang="en-GB" sz="1600" dirty="0"/>
           </a:p>
           <a:p>
             <a:pPr marL="0" indent="0">
               <a:buNone/>
             </a:pPr>
             <a:r>
-              <a:rPr lang="en-GB" sz="1200" dirty="0"/>
+              <a:rPr lang="en-GB" sz="1600" dirty="0"/>
               <a:t>Probe and disconnect functions will be filled later.</a:t>
             </a:r>
           </a:p>
@@ -7468,6 +7855,47 @@
               <a:buNone/>
             </a:pPr>
             <a:endParaRPr lang="en-GB" sz="1000" dirty="0"/>
+          </a:p>
+        </p:txBody>
+      </p:sp>
+      <p:sp>
+        <p:nvSpPr>
+          <p:cNvPr id="2" name="TextBox 1">
+            <a:extLst>
+              <a:ext uri="{FF2B5EF4-FFF2-40B4-BE49-F238E27FC236}">
+                <a16:creationId xmlns:a16="http://schemas.microsoft.com/office/drawing/2014/main" id="{34F7B930-98C6-4997-87AC-5E9F7A12D123}"/>
+              </a:ext>
+            </a:extLst>
+          </p:cNvPr>
+          <p:cNvSpPr txBox="1"/>
+          <p:nvPr/>
+        </p:nvSpPr>
+        <p:spPr>
+          <a:xfrm>
+            <a:off x="1" y="2322324"/>
+            <a:ext cx="4167272" cy="2123658"/>
+          </a:xfrm>
+          <a:prstGeom prst="rect">
+            <a:avLst/>
+          </a:prstGeom>
+          <a:noFill/>
+        </p:spPr>
+        <p:txBody>
+          <a:bodyPr wrap="square" rtlCol="0">
+            <a:spAutoFit/>
+          </a:bodyPr>
+          <a:lstStyle/>
+          <a:p>
+            <a:pPr algn="ctr"/>
+            <a:r>
+              <a:rPr lang="en-GB" sz="4400" dirty="0">
+                <a:solidFill>
+                  <a:srgbClr val="FFFFFF"/>
+                </a:solidFill>
+                <a:latin typeface="Liberation Mono"/>
+              </a:rPr>
+              <a:t>probe and disconnect functions</a:t>
+            </a:r>
           </a:p>
         </p:txBody>
       </p:sp>
@@ -8000,7 +8428,7 @@
           <a:lstStyle/>
           <a:p>
             <a:r>
-              <a:rPr lang="en-US">
+              <a:rPr lang="en-US" dirty="0">
                 <a:solidFill>
                   <a:srgbClr val="FFFFFF"/>
                 </a:solidFill>
@@ -8012,7 +8440,7 @@
               <a:t>Software Setup</a:t>
             </a:r>
             <a:br>
-              <a:rPr lang="en-GB">
+              <a:rPr lang="en-GB" dirty="0">
                 <a:solidFill>
                   <a:srgbClr val="FFFFFF"/>
                 </a:solidFill>
@@ -8022,7 +8450,7 @@
                 <a:cs typeface="Liberation Mono"/>
               </a:rPr>
             </a:br>
-            <a:endParaRPr lang="en-GB">
+            <a:endParaRPr lang="en-GB" dirty="0">
               <a:solidFill>
                 <a:srgbClr val="FFFFFF"/>
               </a:solidFill>
@@ -12418,402 +12846,12 @@
           <a:chExt cx="0" cy="0"/>
         </a:xfrm>
       </p:grpSpPr>
-      <p:sp>
+      <p:sp useBgFill="1">
         <p:nvSpPr>
-          <p:cNvPr id="2" name="Title 1">
+          <p:cNvPr id="45" name="Rectangle 32">
             <a:extLst>
               <a:ext uri="{FF2B5EF4-FFF2-40B4-BE49-F238E27FC236}">
-                <a16:creationId xmlns:a16="http://schemas.microsoft.com/office/drawing/2014/main" id="{88F28E72-4095-468C-81A9-CAE997BDC483}"/>
-              </a:ext>
-            </a:extLst>
-          </p:cNvPr>
-          <p:cNvSpPr>
-            <a:spLocks noGrp="1"/>
-          </p:cNvSpPr>
-          <p:nvPr>
-            <p:ph type="title"/>
-          </p:nvPr>
-        </p:nvSpPr>
-        <p:spPr>
-          <a:xfrm>
-            <a:off x="648929" y="629266"/>
-            <a:ext cx="3505495" cy="1622321"/>
-          </a:xfrm>
-        </p:spPr>
-        <p:txBody>
-          <a:bodyPr>
-            <a:normAutofit/>
-          </a:bodyPr>
-          <a:lstStyle/>
-          <a:p>
-            <a:r>
-              <a:rPr lang="en-GB" sz="3700"/>
-              <a:t>Structure of Our Driver Module (my_usb.c)</a:t>
-            </a:r>
-          </a:p>
-        </p:txBody>
-      </p:sp>
-      <p:sp>
-        <p:nvSpPr>
-          <p:cNvPr id="3" name="Content Placeholder 2">
-            <a:extLst>
-              <a:ext uri="{FF2B5EF4-FFF2-40B4-BE49-F238E27FC236}">
-                <a16:creationId xmlns:a16="http://schemas.microsoft.com/office/drawing/2014/main" id="{60B40582-C89B-41E5-96F7-0D1D250726C4}"/>
-              </a:ext>
-            </a:extLst>
-          </p:cNvPr>
-          <p:cNvSpPr>
-            <a:spLocks noGrp="1"/>
-          </p:cNvSpPr>
-          <p:nvPr>
-            <p:ph idx="1"/>
-          </p:nvPr>
-        </p:nvSpPr>
-        <p:spPr>
-          <a:xfrm>
-            <a:off x="648931" y="2438400"/>
-            <a:ext cx="3505494" cy="3785419"/>
-          </a:xfrm>
-        </p:spPr>
-        <p:txBody>
-          <a:bodyPr>
-            <a:normAutofit/>
-          </a:bodyPr>
-          <a:lstStyle/>
-          <a:p>
-            <a:r>
-              <a:rPr lang="en-GB" sz="2000"/>
-              <a:t>Our driver module can be formed of these variables and functions.</a:t>
-            </a:r>
-          </a:p>
-          <a:p>
-            <a:endParaRPr lang="en-GB" sz="2000"/>
-          </a:p>
-          <a:p>
-            <a:r>
-              <a:rPr lang="en-GB" sz="2000"/>
-              <a:t>The descriptions of these are in the next slide.</a:t>
-            </a:r>
-          </a:p>
-        </p:txBody>
-      </p:sp>
-      <p:sp>
-        <p:nvSpPr>
-          <p:cNvPr id="26" name="Rectangle 25">
-            <a:extLst>
-              <a:ext uri="{FF2B5EF4-FFF2-40B4-BE49-F238E27FC236}">
-                <a16:creationId xmlns:a16="http://schemas.microsoft.com/office/drawing/2014/main" id="{5E39A796-BE83-48B1-B33F-35C4A32AAB57}"/>
-              </a:ext>
-              <a:ext uri="{C183D7F6-B498-43B3-948B-1728B52AA6E4}">
-                <adec:decorative xmlns:adec="http://schemas.microsoft.com/office/drawing/2017/decorative" val="1"/>
-              </a:ext>
-            </a:extLst>
-          </p:cNvPr>
-          <p:cNvSpPr>
-            <a:spLocks noGrp="1" noRot="1" noChangeAspect="1" noMove="1" noResize="1" noEditPoints="1" noAdjustHandles="1" noChangeArrowheads="1" noChangeShapeType="1" noTextEdit="1"/>
-          </p:cNvSpPr>
-          <p:nvPr>
-            <p:extLst>
-              <p:ext uri="{386F3935-93C4-4BCD-93E2-E3B085C9AB24}">
-                <p16:designElem xmlns:p16="http://schemas.microsoft.com/office/powerpoint/2015/main" val="1"/>
-              </p:ext>
-            </p:extLst>
-          </p:nvPr>
-        </p:nvSpPr>
-        <p:spPr>
-          <a:xfrm>
-            <a:off x="4639056" y="0"/>
-            <a:ext cx="7552944" cy="6858000"/>
-          </a:xfrm>
-          <a:prstGeom prst="rect">
-            <a:avLst/>
-          </a:prstGeom>
-          <a:solidFill>
-            <a:srgbClr val="C8CACA"/>
-          </a:solidFill>
-          <a:ln>
-            <a:noFill/>
-          </a:ln>
-        </p:spPr>
-        <p:style>
-          <a:lnRef idx="2">
-            <a:schemeClr val="accent1">
-              <a:shade val="50000"/>
-            </a:schemeClr>
-          </a:lnRef>
-          <a:fillRef idx="1">
-            <a:schemeClr val="accent1"/>
-          </a:fillRef>
-          <a:effectRef idx="0">
-            <a:schemeClr val="accent1"/>
-          </a:effectRef>
-          <a:fontRef idx="minor">
-            <a:schemeClr val="lt1"/>
-          </a:fontRef>
-        </p:style>
-        <p:txBody>
-          <a:bodyPr rtlCol="0" anchor="ctr"/>
-          <a:lstStyle/>
-          <a:p>
-            <a:pPr algn="ctr"/>
-            <a:endParaRPr lang="en-US"/>
-          </a:p>
-        </p:txBody>
-      </p:sp>
-      <p:sp>
-        <p:nvSpPr>
-          <p:cNvPr id="28" name="Rounded Rectangle 9">
-            <a:extLst>
-              <a:ext uri="{FF2B5EF4-FFF2-40B4-BE49-F238E27FC236}">
-                <a16:creationId xmlns:a16="http://schemas.microsoft.com/office/drawing/2014/main" id="{72F84B47-E267-4194-8194-831DB7B5547F}"/>
-              </a:ext>
-              <a:ext uri="{C183D7F6-B498-43B3-948B-1728B52AA6E4}">
-                <adec:decorative xmlns:adec="http://schemas.microsoft.com/office/drawing/2017/decorative" val="1"/>
-              </a:ext>
-            </a:extLst>
-          </p:cNvPr>
-          <p:cNvSpPr>
-            <a:spLocks noGrp="1" noRot="1" noChangeAspect="1" noMove="1" noResize="1" noEditPoints="1" noAdjustHandles="1" noChangeArrowheads="1" noChangeShapeType="1" noTextEdit="1"/>
-          </p:cNvSpPr>
-          <p:nvPr>
-            <p:extLst>
-              <p:ext uri="{386F3935-93C4-4BCD-93E2-E3B085C9AB24}">
-                <p16:designElem xmlns:p16="http://schemas.microsoft.com/office/powerpoint/2015/main" val="1"/>
-              </p:ext>
-            </p:extLst>
-          </p:nvPr>
-        </p:nvSpPr>
-        <p:spPr>
-          <a:xfrm>
-            <a:off x="5123688" y="557784"/>
-            <a:ext cx="6584098" cy="5739187"/>
-          </a:xfrm>
-          <a:prstGeom prst="roundRect">
-            <a:avLst>
-              <a:gd name="adj" fmla="val 0"/>
-            </a:avLst>
-          </a:prstGeom>
-          <a:solidFill>
-            <a:srgbClr val="FFFFFF"/>
-          </a:solidFill>
-          <a:ln w="9525">
-            <a:solidFill>
-              <a:srgbClr val="C8CACA"/>
-            </a:solidFill>
-          </a:ln>
-          <a:effectLst>
-            <a:outerShdw blurRad="57150" dist="19050" dir="5400000" algn="t" rotWithShape="0">
-              <a:prstClr val="black">
-                <a:alpha val="63000"/>
-              </a:prstClr>
-            </a:outerShdw>
-          </a:effectLst>
-        </p:spPr>
-        <p:style>
-          <a:lnRef idx="2">
-            <a:schemeClr val="accent1">
-              <a:shade val="50000"/>
-            </a:schemeClr>
-          </a:lnRef>
-          <a:fillRef idx="1">
-            <a:schemeClr val="accent1"/>
-          </a:fillRef>
-          <a:effectRef idx="0">
-            <a:schemeClr val="accent1"/>
-          </a:effectRef>
-          <a:fontRef idx="minor">
-            <a:schemeClr val="lt1"/>
-          </a:fontRef>
-        </p:style>
-        <p:txBody>
-          <a:bodyPr rtlCol="0" anchor="ctr"/>
-          <a:lstStyle/>
-          <a:p>
-            <a:pPr algn="ctr"/>
-            <a:endParaRPr lang="en-US"/>
-          </a:p>
-        </p:txBody>
-      </p:sp>
-      <p:pic>
-        <p:nvPicPr>
-          <p:cNvPr id="5" name="Picture 4">
-            <a:extLst>
-              <a:ext uri="{FF2B5EF4-FFF2-40B4-BE49-F238E27FC236}">
-                <a16:creationId xmlns:a16="http://schemas.microsoft.com/office/drawing/2014/main" id="{3996A7E5-DF39-2147-81D2-516E14336EAB}"/>
-              </a:ext>
-            </a:extLst>
-          </p:cNvPr>
-          <p:cNvPicPr>
-            <a:picLocks noChangeAspect="1"/>
-          </p:cNvPicPr>
-          <p:nvPr/>
-        </p:nvPicPr>
-        <p:blipFill>
-          <a:blip r:embed="rId2"/>
-          <a:stretch>
-            <a:fillRect/>
-          </a:stretch>
-        </p:blipFill>
-        <p:spPr>
-          <a:xfrm>
-            <a:off x="5405862" y="2246084"/>
-            <a:ext cx="6019331" cy="2362586"/>
-          </a:xfrm>
-          <a:prstGeom prst="rect">
-            <a:avLst/>
-          </a:prstGeom>
-          <a:effectLst/>
-        </p:spPr>
-      </p:pic>
-    </p:spTree>
-    <p:extLst>
-      <p:ext uri="{BB962C8B-B14F-4D97-AF65-F5344CB8AC3E}">
-        <p14:creationId xmlns:p14="http://schemas.microsoft.com/office/powerpoint/2010/main" val="2094302918"/>
-      </p:ext>
-    </p:extLst>
-  </p:cSld>
-  <p:clrMapOvr>
-    <a:masterClrMapping/>
-  </p:clrMapOvr>
-</p:sld>
-</file>
-
-<file path=ppt/slides/slide8.xml><?xml version="1.0" encoding="utf-8"?>
-<p:sld xmlns:a="http://schemas.openxmlformats.org/drawingml/2006/main" xmlns:r="http://schemas.openxmlformats.org/officeDocument/2006/relationships" xmlns:p="http://schemas.openxmlformats.org/presentationml/2006/main">
-  <p:cSld>
-    <p:spTree>
-      <p:nvGrpSpPr>
-        <p:cNvPr id="1" name=""/>
-        <p:cNvGrpSpPr/>
-        <p:nvPr/>
-      </p:nvGrpSpPr>
-      <p:grpSpPr>
-        <a:xfrm>
-          <a:off x="0" y="0"/>
-          <a:ext cx="0" cy="0"/>
-          <a:chOff x="0" y="0"/>
-          <a:chExt cx="0" cy="0"/>
-        </a:xfrm>
-      </p:grpSpPr>
-      <p:sp>
-        <p:nvSpPr>
-          <p:cNvPr id="3" name="Content Placeholder 2">
-            <a:extLst>
-              <a:ext uri="{FF2B5EF4-FFF2-40B4-BE49-F238E27FC236}">
-                <a16:creationId xmlns:a16="http://schemas.microsoft.com/office/drawing/2014/main" id="{03A27C3F-C3DB-364B-97CF-2DC1F4BC6D61}"/>
-              </a:ext>
-            </a:extLst>
-          </p:cNvPr>
-          <p:cNvSpPr>
-            <a:spLocks noGrp="1"/>
-          </p:cNvSpPr>
-          <p:nvPr>
-            <p:ph idx="1"/>
-          </p:nvPr>
-        </p:nvSpPr>
-        <p:spPr>
-          <a:xfrm>
-            <a:off x="838200" y="973855"/>
-            <a:ext cx="10515600" cy="4351338"/>
-          </a:xfrm>
-        </p:spPr>
-        <p:txBody>
-          <a:bodyPr/>
-          <a:lstStyle/>
-          <a:p>
-            <a:r>
-              <a:rPr lang="en-GB" dirty="0"/>
-              <a:t>The name variable is a string that describes the USB driver. It is used everywhere to specify the driver in system logs.</a:t>
-            </a:r>
-          </a:p>
-          <a:p>
-            <a:r>
-              <a:rPr lang="en-GB" dirty="0"/>
-              <a:t>The disconnect and probe function pointers are called when a USB device is matched with a device in the </a:t>
-            </a:r>
-            <a:r>
-              <a:rPr lang="en-GB" dirty="0" err="1"/>
-              <a:t>id_table</a:t>
-            </a:r>
-            <a:r>
-              <a:rPr lang="en-GB" dirty="0"/>
-              <a:t>.</a:t>
-            </a:r>
-          </a:p>
-          <a:p>
-            <a:r>
-              <a:rPr lang="en-GB" dirty="0"/>
-              <a:t>The fops and minor variables are optional. We are not going to implement them in our project.</a:t>
-            </a:r>
-          </a:p>
-          <a:p>
-            <a:r>
-              <a:rPr lang="en-GB" dirty="0"/>
-              <a:t>We need to create an </a:t>
-            </a:r>
-            <a:r>
-              <a:rPr lang="en-GB" dirty="0" err="1"/>
-              <a:t>id_table</a:t>
-            </a:r>
-            <a:r>
-              <a:rPr lang="en-GB" dirty="0"/>
-              <a:t> to load the driver automatically when we plug our USB. Therefore, an </a:t>
-            </a:r>
-            <a:r>
-              <a:rPr lang="en-GB" dirty="0" err="1"/>
-              <a:t>id_table</a:t>
-            </a:r>
-            <a:r>
-              <a:rPr lang="en-GB" dirty="0"/>
-              <a:t> defines which devices the driver supports at its current status.</a:t>
-            </a:r>
-          </a:p>
-        </p:txBody>
-      </p:sp>
-    </p:spTree>
-    <p:extLst>
-      <p:ext uri="{BB962C8B-B14F-4D97-AF65-F5344CB8AC3E}">
-        <p14:creationId xmlns:p14="http://schemas.microsoft.com/office/powerpoint/2010/main" val="690846184"/>
-      </p:ext>
-    </p:extLst>
-  </p:cSld>
-  <p:clrMapOvr>
-    <a:masterClrMapping/>
-  </p:clrMapOvr>
-</p:sld>
-</file>
-
-<file path=ppt/slides/slide9.xml><?xml version="1.0" encoding="utf-8"?>
-<p:sld xmlns:a="http://schemas.openxmlformats.org/drawingml/2006/main" xmlns:r="http://schemas.openxmlformats.org/officeDocument/2006/relationships" xmlns:p="http://schemas.openxmlformats.org/presentationml/2006/main">
-  <p:cSld>
-    <p:bg>
-      <p:bgPr>
-        <a:solidFill>
-          <a:schemeClr val="bg1"/>
-        </a:solidFill>
-        <a:effectLst/>
-      </p:bgPr>
-    </p:bg>
-    <p:spTree>
-      <p:nvGrpSpPr>
-        <p:cNvPr id="1" name=""/>
-        <p:cNvGrpSpPr/>
-        <p:nvPr/>
-      </p:nvGrpSpPr>
-      <p:grpSpPr>
-        <a:xfrm>
-          <a:off x="0" y="0"/>
-          <a:ext cx="0" cy="0"/>
-          <a:chOff x="0" y="0"/>
-          <a:chExt cx="0" cy="0"/>
-        </a:xfrm>
-      </p:grpSpPr>
-      <p:sp useBgFill="1">
-        <p:nvSpPr>
-          <p:cNvPr id="10" name="Rectangle 9">
-            <a:extLst>
-              <a:ext uri="{FF2B5EF4-FFF2-40B4-BE49-F238E27FC236}">
-                <a16:creationId xmlns:a16="http://schemas.microsoft.com/office/drawing/2014/main" id="{2550BE34-C2B8-49B8-8519-67A8CAD51AE9}"/>
+                <a16:creationId xmlns:a16="http://schemas.microsoft.com/office/drawing/2014/main" id="{2B97F24A-32CE-4C1C-A50D-3016B394DCFB}"/>
               </a:ext>
               <a:ext uri="{C183D7F6-B498-43B3-948B-1728B52AA6E4}">
                 <adec:decorative xmlns:adec="http://schemas.microsoft.com/office/drawing/2017/decorative" val="1"/>
@@ -12868,12 +12906,47 @@
           </a:p>
         </p:txBody>
       </p:sp>
-      <p:sp useBgFill="1">
+      <p:sp>
         <p:nvSpPr>
-          <p:cNvPr id="12" name="Rectangle 11">
+          <p:cNvPr id="2" name="Title 1">
             <a:extLst>
               <a:ext uri="{FF2B5EF4-FFF2-40B4-BE49-F238E27FC236}">
-                <a16:creationId xmlns:a16="http://schemas.microsoft.com/office/drawing/2014/main" id="{A7457DD9-5A45-400A-AB4B-4B4EDECA25F1}"/>
+                <a16:creationId xmlns:a16="http://schemas.microsoft.com/office/drawing/2014/main" id="{88F28E72-4095-468C-81A9-CAE997BDC483}"/>
+              </a:ext>
+            </a:extLst>
+          </p:cNvPr>
+          <p:cNvSpPr>
+            <a:spLocks noGrp="1"/>
+          </p:cNvSpPr>
+          <p:nvPr>
+            <p:ph type="title"/>
+          </p:nvPr>
+        </p:nvSpPr>
+        <p:spPr>
+          <a:xfrm>
+            <a:off x="630936" y="639520"/>
+            <a:ext cx="3429000" cy="1719072"/>
+          </a:xfrm>
+        </p:spPr>
+        <p:txBody>
+          <a:bodyPr anchor="b">
+            <a:normAutofit/>
+          </a:bodyPr>
+          <a:lstStyle/>
+          <a:p>
+            <a:r>
+              <a:rPr lang="en-GB" sz="3800"/>
+              <a:t>Structure of Our Driver Module (my_usb.c)</a:t>
+            </a:r>
+          </a:p>
+        </p:txBody>
+      </p:sp>
+      <p:sp>
+        <p:nvSpPr>
+          <p:cNvPr id="46" name="sketch line">
+            <a:extLst>
+              <a:ext uri="{FF2B5EF4-FFF2-40B4-BE49-F238E27FC236}">
+                <a16:creationId xmlns:a16="http://schemas.microsoft.com/office/drawing/2014/main" id="{CD8B4F24-440B-49E9-B85D-733523DC064B}"/>
               </a:ext>
               <a:ext uri="{C183D7F6-B498-43B3-948B-1728B52AA6E4}">
                 <adec:decorative xmlns:adec="http://schemas.microsoft.com/office/drawing/2017/decorative" val="1"/>
@@ -12893,25 +12966,228 @@
         </p:nvSpPr>
         <p:spPr>
           <a:xfrm>
-            <a:off x="554416" y="365125"/>
-            <a:ext cx="11167447" cy="2089317"/>
+            <a:off x="643278" y="2573756"/>
+            <a:ext cx="3255095" cy="18288"/>
           </a:xfrm>
-          <a:prstGeom prst="rect">
+          <a:custGeom>
             <a:avLst/>
-          </a:prstGeom>
-          <a:ln w="12700">
+            <a:gdLst>
+              <a:gd name="connsiteX0" fmla="*/ 0 w 3255095"/>
+              <a:gd name="connsiteY0" fmla="*/ 0 h 18288"/>
+              <a:gd name="connsiteX1" fmla="*/ 618468 w 3255095"/>
+              <a:gd name="connsiteY1" fmla="*/ 0 h 18288"/>
+              <a:gd name="connsiteX2" fmla="*/ 1269487 w 3255095"/>
+              <a:gd name="connsiteY2" fmla="*/ 0 h 18288"/>
+              <a:gd name="connsiteX3" fmla="*/ 1953057 w 3255095"/>
+              <a:gd name="connsiteY3" fmla="*/ 0 h 18288"/>
+              <a:gd name="connsiteX4" fmla="*/ 2636627 w 3255095"/>
+              <a:gd name="connsiteY4" fmla="*/ 0 h 18288"/>
+              <a:gd name="connsiteX5" fmla="*/ 3255095 w 3255095"/>
+              <a:gd name="connsiteY5" fmla="*/ 0 h 18288"/>
+              <a:gd name="connsiteX6" fmla="*/ 3255095 w 3255095"/>
+              <a:gd name="connsiteY6" fmla="*/ 18288 h 18288"/>
+              <a:gd name="connsiteX7" fmla="*/ 2538974 w 3255095"/>
+              <a:gd name="connsiteY7" fmla="*/ 18288 h 18288"/>
+              <a:gd name="connsiteX8" fmla="*/ 1822853 w 3255095"/>
+              <a:gd name="connsiteY8" fmla="*/ 18288 h 18288"/>
+              <a:gd name="connsiteX9" fmla="*/ 1171834 w 3255095"/>
+              <a:gd name="connsiteY9" fmla="*/ 18288 h 18288"/>
+              <a:gd name="connsiteX10" fmla="*/ 0 w 3255095"/>
+              <a:gd name="connsiteY10" fmla="*/ 18288 h 18288"/>
+              <a:gd name="connsiteX11" fmla="*/ 0 w 3255095"/>
+              <a:gd name="connsiteY11" fmla="*/ 0 h 18288"/>
+            </a:gdLst>
+            <a:ahLst/>
+            <a:cxnLst>
+              <a:cxn ang="0">
+                <a:pos x="connsiteX0" y="connsiteY0"/>
+              </a:cxn>
+              <a:cxn ang="0">
+                <a:pos x="connsiteX1" y="connsiteY1"/>
+              </a:cxn>
+              <a:cxn ang="0">
+                <a:pos x="connsiteX2" y="connsiteY2"/>
+              </a:cxn>
+              <a:cxn ang="0">
+                <a:pos x="connsiteX3" y="connsiteY3"/>
+              </a:cxn>
+              <a:cxn ang="0">
+                <a:pos x="connsiteX4" y="connsiteY4"/>
+              </a:cxn>
+              <a:cxn ang="0">
+                <a:pos x="connsiteX5" y="connsiteY5"/>
+              </a:cxn>
+              <a:cxn ang="0">
+                <a:pos x="connsiteX6" y="connsiteY6"/>
+              </a:cxn>
+              <a:cxn ang="0">
+                <a:pos x="connsiteX7" y="connsiteY7"/>
+              </a:cxn>
+              <a:cxn ang="0">
+                <a:pos x="connsiteX8" y="connsiteY8"/>
+              </a:cxn>
+              <a:cxn ang="0">
+                <a:pos x="connsiteX9" y="connsiteY9"/>
+              </a:cxn>
+              <a:cxn ang="0">
+                <a:pos x="connsiteX10" y="connsiteY10"/>
+              </a:cxn>
+              <a:cxn ang="0">
+                <a:pos x="connsiteX11" y="connsiteY11"/>
+              </a:cxn>
+            </a:cxnLst>
+            <a:rect l="l" t="t" r="r" b="b"/>
+            <a:pathLst>
+              <a:path w="3255095" h="18288" fill="none" extrusionOk="0">
+                <a:moveTo>
+                  <a:pt x="0" y="0"/>
+                </a:moveTo>
+                <a:cubicBezTo>
+                  <a:pt x="240201" y="-22123"/>
+                  <a:pt x="462021" y="-19623"/>
+                  <a:pt x="618468" y="0"/>
+                </a:cubicBezTo>
+                <a:cubicBezTo>
+                  <a:pt x="774915" y="19623"/>
+                  <a:pt x="974734" y="2035"/>
+                  <a:pt x="1269487" y="0"/>
+                </a:cubicBezTo>
+                <a:cubicBezTo>
+                  <a:pt x="1564240" y="-2035"/>
+                  <a:pt x="1733579" y="10639"/>
+                  <a:pt x="1953057" y="0"/>
+                </a:cubicBezTo>
+                <a:cubicBezTo>
+                  <a:pt x="2172535" y="-10639"/>
+                  <a:pt x="2453962" y="14018"/>
+                  <a:pt x="2636627" y="0"/>
+                </a:cubicBezTo>
+                <a:cubicBezTo>
+                  <a:pt x="2819292" y="-14018"/>
+                  <a:pt x="3121375" y="5399"/>
+                  <a:pt x="3255095" y="0"/>
+                </a:cubicBezTo>
+                <a:cubicBezTo>
+                  <a:pt x="3254386" y="8157"/>
+                  <a:pt x="3254682" y="12125"/>
+                  <a:pt x="3255095" y="18288"/>
+                </a:cubicBezTo>
+                <a:cubicBezTo>
+                  <a:pt x="3088545" y="23203"/>
+                  <a:pt x="2687475" y="7419"/>
+                  <a:pt x="2538974" y="18288"/>
+                </a:cubicBezTo>
+                <a:cubicBezTo>
+                  <a:pt x="2390473" y="29157"/>
+                  <a:pt x="2137381" y="-8959"/>
+                  <a:pt x="1822853" y="18288"/>
+                </a:cubicBezTo>
+                <a:cubicBezTo>
+                  <a:pt x="1508325" y="45535"/>
+                  <a:pt x="1466437" y="20385"/>
+                  <a:pt x="1171834" y="18288"/>
+                </a:cubicBezTo>
+                <a:cubicBezTo>
+                  <a:pt x="877231" y="16191"/>
+                  <a:pt x="561097" y="37643"/>
+                  <a:pt x="0" y="18288"/>
+                </a:cubicBezTo>
+                <a:cubicBezTo>
+                  <a:pt x="-46" y="12483"/>
+                  <a:pt x="-203" y="6491"/>
+                  <a:pt x="0" y="0"/>
+                </a:cubicBezTo>
+                <a:close/>
+              </a:path>
+              <a:path w="3255095" h="18288" stroke="0" extrusionOk="0">
+                <a:moveTo>
+                  <a:pt x="0" y="0"/>
+                </a:moveTo>
+                <a:cubicBezTo>
+                  <a:pt x="291965" y="19429"/>
+                  <a:pt x="363155" y="8568"/>
+                  <a:pt x="618468" y="0"/>
+                </a:cubicBezTo>
+                <a:cubicBezTo>
+                  <a:pt x="873781" y="-8568"/>
+                  <a:pt x="904459" y="-19505"/>
+                  <a:pt x="1171834" y="0"/>
+                </a:cubicBezTo>
+                <a:cubicBezTo>
+                  <a:pt x="1439209" y="19505"/>
+                  <a:pt x="1744369" y="9790"/>
+                  <a:pt x="1887955" y="0"/>
+                </a:cubicBezTo>
+                <a:cubicBezTo>
+                  <a:pt x="2031541" y="-9790"/>
+                  <a:pt x="2346378" y="21240"/>
+                  <a:pt x="2506423" y="0"/>
+                </a:cubicBezTo>
+                <a:cubicBezTo>
+                  <a:pt x="2666468" y="-21240"/>
+                  <a:pt x="2990257" y="30414"/>
+                  <a:pt x="3255095" y="0"/>
+                </a:cubicBezTo>
+                <a:cubicBezTo>
+                  <a:pt x="3254831" y="4493"/>
+                  <a:pt x="3255479" y="9472"/>
+                  <a:pt x="3255095" y="18288"/>
+                </a:cubicBezTo>
+                <a:cubicBezTo>
+                  <a:pt x="3120743" y="16690"/>
+                  <a:pt x="2759628" y="42462"/>
+                  <a:pt x="2604076" y="18288"/>
+                </a:cubicBezTo>
+                <a:cubicBezTo>
+                  <a:pt x="2448524" y="-5886"/>
+                  <a:pt x="2184336" y="19599"/>
+                  <a:pt x="1887955" y="18288"/>
+                </a:cubicBezTo>
+                <a:cubicBezTo>
+                  <a:pt x="1591574" y="16977"/>
+                  <a:pt x="1548845" y="6870"/>
+                  <a:pt x="1334589" y="18288"/>
+                </a:cubicBezTo>
+                <a:cubicBezTo>
+                  <a:pt x="1120333" y="29706"/>
+                  <a:pt x="996014" y="9662"/>
+                  <a:pt x="683570" y="18288"/>
+                </a:cubicBezTo>
+                <a:cubicBezTo>
+                  <a:pt x="371126" y="26914"/>
+                  <a:pt x="198687" y="16167"/>
+                  <a:pt x="0" y="18288"/>
+                </a:cubicBezTo>
+                <a:cubicBezTo>
+                  <a:pt x="843" y="9577"/>
+                  <a:pt x="371" y="6900"/>
+                  <a:pt x="0" y="0"/>
+                </a:cubicBezTo>
+                <a:close/>
+              </a:path>
+            </a:pathLst>
+          </a:custGeom>
+          <a:solidFill>
+            <a:schemeClr val="accent2"/>
+          </a:solidFill>
+          <a:ln w="38100" cap="rnd">
             <a:solidFill>
-              <a:srgbClr val="DEDEDE"/>
+              <a:schemeClr val="accent2"/>
             </a:solidFill>
+            <a:round/>
+            <a:extLst>
+              <a:ext uri="{C807C97D-BFC1-408E-A445-0C87EB9F89A2}">
+                <ask:lineSketchStyleProps xmlns:ask="http://schemas.microsoft.com/office/drawing/2018/sketchyshapes" sd="1219033472">
+                  <a:prstGeom prst="rect">
+                    <a:avLst/>
+                  </a:prstGeom>
+                  <ask:type>
+                    <ask:lineSketchFreehand/>
+                  </ask:type>
+                </ask:lineSketchStyleProps>
+              </a:ext>
+            </a:extLst>
           </a:ln>
-          <a:effectLst>
-            <a:outerShdw blurRad="50800" dist="38100" dir="2700000" algn="tl" rotWithShape="0">
-              <a:schemeClr val="bg2">
-                <a:lumMod val="85000"/>
-                <a:alpha val="50000"/>
-              </a:schemeClr>
-            </a:outerShdw>
-          </a:effectLst>
         </p:spPr>
         <p:style>
           <a:lnRef idx="2">
@@ -12933,46 +13209,17 @@
           <a:bodyPr rtlCol="0" anchor="ctr"/>
           <a:lstStyle/>
           <a:p>
-            <a:pPr marL="0" marR="0" lvl="0" indent="0" algn="ctr" defTabSz="914400" rtl="0" eaLnBrk="1" fontAlgn="auto" latinLnBrk="0" hangingPunct="1">
-              <a:lnSpc>
-                <a:spcPct val="100000"/>
-              </a:lnSpc>
-              <a:spcBef>
-                <a:spcPts val="0"/>
-              </a:spcBef>
-              <a:spcAft>
-                <a:spcPts val="0"/>
-              </a:spcAft>
-              <a:buClrTx/>
-              <a:buSzTx/>
-              <a:buFontTx/>
-              <a:buNone/>
-              <a:tabLst/>
-              <a:defRPr/>
-            </a:pPr>
-            <a:endParaRPr kumimoji="0" lang="en-US" sz="1800" b="0" i="0" u="none" strike="noStrike" kern="1200" cap="none" spc="0" normalizeH="0" baseline="0" noProof="0">
-              <a:ln>
-                <a:noFill/>
-              </a:ln>
-              <a:solidFill>
-                <a:prstClr val="white"/>
-              </a:solidFill>
-              <a:effectLst/>
-              <a:uLnTx/>
-              <a:uFillTx/>
-              <a:latin typeface="Calibri" panose="020F0502020204030204"/>
-              <a:ea typeface="+mn-ea"/>
-              <a:cs typeface="+mn-cs"/>
-            </a:endParaRPr>
+            <a:pPr algn="ctr"/>
+            <a:endParaRPr lang="en-US"/>
           </a:p>
         </p:txBody>
       </p:sp>
       <p:sp>
         <p:nvSpPr>
-          <p:cNvPr id="2" name="Title 1">
+          <p:cNvPr id="3" name="Content Placeholder 2">
             <a:extLst>
               <a:ext uri="{FF2B5EF4-FFF2-40B4-BE49-F238E27FC236}">
-                <a16:creationId xmlns:a16="http://schemas.microsoft.com/office/drawing/2014/main" id="{48FE7A46-5640-1D42-9A39-D790287C751F}"/>
+                <a16:creationId xmlns:a16="http://schemas.microsoft.com/office/drawing/2014/main" id="{60B40582-C89B-41E5-96F7-0D1D250726C4}"/>
               </a:ext>
             </a:extLst>
           </p:cNvPr>
@@ -12980,41 +13227,111 @@
             <a:spLocks noGrp="1"/>
           </p:cNvSpPr>
           <p:nvPr>
-            <p:ph type="title"/>
+            <p:ph idx="1"/>
           </p:nvPr>
         </p:nvSpPr>
         <p:spPr>
           <a:xfrm>
-            <a:off x="1046746" y="586822"/>
-            <a:ext cx="3560252" cy="1645920"/>
+            <a:off x="630936" y="2807208"/>
+            <a:ext cx="3429000" cy="3410712"/>
           </a:xfrm>
         </p:spPr>
         <p:txBody>
-          <a:bodyPr vert="horz" lIns="91440" tIns="45720" rIns="91440" bIns="45720" rtlCol="0" anchor="ctr">
+          <a:bodyPr anchor="t">
             <a:normAutofit/>
           </a:bodyPr>
           <a:lstStyle/>
           <a:p>
             <a:r>
-              <a:rPr lang="en-US" sz="3200" kern="1200">
-                <a:solidFill>
-                  <a:schemeClr val="tx1"/>
-                </a:solidFill>
-                <a:latin typeface="+mj-lt"/>
-                <a:ea typeface="+mj-ea"/>
-                <a:cs typeface="+mj-cs"/>
-              </a:rPr>
-              <a:t>ID_TABLE</a:t>
+              <a:rPr lang="en-GB" sz="2200"/>
+              <a:t>Our driver module can be formed of these variables and functions.</a:t>
+            </a:r>
+          </a:p>
+          <a:p>
+            <a:endParaRPr lang="en-GB" sz="2200"/>
+          </a:p>
+          <a:p>
+            <a:r>
+              <a:rPr lang="en-GB" sz="2200"/>
+              <a:t>The descriptions of these are in the next slide.</a:t>
             </a:r>
           </a:p>
         </p:txBody>
       </p:sp>
-      <p:sp>
-        <p:nvSpPr>
-          <p:cNvPr id="14" name="Rectangle 13">
+      <p:pic>
+        <p:nvPicPr>
+          <p:cNvPr id="5" name="Picture 4">
             <a:extLst>
               <a:ext uri="{FF2B5EF4-FFF2-40B4-BE49-F238E27FC236}">
-                <a16:creationId xmlns:a16="http://schemas.microsoft.com/office/drawing/2014/main" id="{441CF7D6-A660-431A-B0BB-140A0D5556B6}"/>
+                <a16:creationId xmlns:a16="http://schemas.microsoft.com/office/drawing/2014/main" id="{3996A7E5-DF39-2147-81D2-516E14336EAB}"/>
+              </a:ext>
+            </a:extLst>
+          </p:cNvPr>
+          <p:cNvPicPr>
+            <a:picLocks noChangeAspect="1"/>
+          </p:cNvPicPr>
+          <p:nvPr/>
+        </p:nvPicPr>
+        <p:blipFill>
+          <a:blip r:embed="rId2"/>
+          <a:stretch>
+            <a:fillRect/>
+          </a:stretch>
+        </p:blipFill>
+        <p:spPr>
+          <a:xfrm>
+            <a:off x="4654296" y="2074146"/>
+            <a:ext cx="6903720" cy="2709708"/>
+          </a:xfrm>
+          <a:prstGeom prst="rect">
+            <a:avLst/>
+          </a:prstGeom>
+        </p:spPr>
+      </p:pic>
+    </p:spTree>
+    <p:extLst>
+      <p:ext uri="{BB962C8B-B14F-4D97-AF65-F5344CB8AC3E}">
+        <p14:creationId xmlns:p14="http://schemas.microsoft.com/office/powerpoint/2010/main" val="2094302918"/>
+      </p:ext>
+    </p:extLst>
+  </p:cSld>
+  <p:clrMapOvr>
+    <a:masterClrMapping/>
+  </p:clrMapOvr>
+</p:sld>
+</file>
+
+<file path=ppt/slides/slide8.xml><?xml version="1.0" encoding="utf-8"?>
+<p:sld xmlns:a="http://schemas.openxmlformats.org/drawingml/2006/main" xmlns:r="http://schemas.openxmlformats.org/officeDocument/2006/relationships" xmlns:p="http://schemas.openxmlformats.org/presentationml/2006/main">
+  <p:cSld>
+    <p:bg>
+      <p:bgPr>
+        <a:solidFill>
+          <a:schemeClr val="bg1"/>
+        </a:solidFill>
+        <a:effectLst/>
+      </p:bgPr>
+    </p:bg>
+    <p:spTree>
+      <p:nvGrpSpPr>
+        <p:cNvPr id="1" name=""/>
+        <p:cNvGrpSpPr/>
+        <p:nvPr/>
+      </p:nvGrpSpPr>
+      <p:grpSpPr>
+        <a:xfrm>
+          <a:off x="0" y="0"/>
+          <a:ext cx="0" cy="0"/>
+          <a:chOff x="0" y="0"/>
+          <a:chExt cx="0" cy="0"/>
+        </a:xfrm>
+      </p:grpSpPr>
+      <p:sp useBgFill="1">
+        <p:nvSpPr>
+          <p:cNvPr id="12" name="Rectangle 7">
+            <a:extLst>
+              <a:ext uri="{FF2B5EF4-FFF2-40B4-BE49-F238E27FC236}">
+                <a16:creationId xmlns:a16="http://schemas.microsoft.com/office/drawing/2014/main" id="{AC17DE74-01C9-4859-B65A-85CF999E8580}"/>
               </a:ext>
               <a:ext uri="{C183D7F6-B498-43B3-948B-1728B52AA6E4}">
                 <adec:decorative xmlns:adec="http://schemas.microsoft.com/office/drawing/2017/decorative" val="1"/>
@@ -13034,15 +13351,12 @@
         </p:nvSpPr>
         <p:spPr>
           <a:xfrm>
-            <a:off x="490408" y="1057739"/>
-            <a:ext cx="128016" cy="704088"/>
+            <a:off x="0" y="0"/>
+            <a:ext cx="12188952" cy="6858000"/>
           </a:xfrm>
           <a:prstGeom prst="rect">
             <a:avLst/>
           </a:prstGeom>
-          <a:solidFill>
-            <a:schemeClr val="accent2"/>
-          </a:solidFill>
           <a:ln>
             <a:noFill/>
           </a:ln>
@@ -13068,21 +13382,16 @@
           <a:lstStyle/>
           <a:p>
             <a:pPr algn="ctr"/>
-            <a:endParaRPr lang="en-US" dirty="0">
-              <a:solidFill>
-                <a:prstClr val="white"/>
-              </a:solidFill>
-              <a:latin typeface="Calibri" panose="020F0502020204030204"/>
-            </a:endParaRPr>
+            <a:endParaRPr lang="en-US"/>
           </a:p>
         </p:txBody>
       </p:sp>
       <p:sp>
         <p:nvSpPr>
-          <p:cNvPr id="16" name="Rectangle 15">
+          <p:cNvPr id="13" name="Freeform: Shape 9">
             <a:extLst>
               <a:ext uri="{FF2B5EF4-FFF2-40B4-BE49-F238E27FC236}">
-                <a16:creationId xmlns:a16="http://schemas.microsoft.com/office/drawing/2014/main" id="{0570A85B-3810-4F95-97B0-CBF4CCDB381C}"/>
+                <a16:creationId xmlns:a16="http://schemas.microsoft.com/office/drawing/2014/main" id="{068C0432-0E90-4CC1-8CD3-D44A90DF07EF}"/>
               </a:ext>
               <a:ext uri="{C183D7F6-B498-43B3-948B-1728B52AA6E4}">
                 <adec:decorative xmlns:adec="http://schemas.microsoft.com/office/drawing/2017/decorative" val="1"/>
@@ -13101,20 +13410,1032 @@
           </p:nvPr>
         </p:nvSpPr>
         <p:spPr>
-          <a:xfrm rot="5400000">
-            <a:off x="4243541" y="1400638"/>
-            <a:ext cx="1463040" cy="18288"/>
+          <a:xfrm>
+            <a:off x="0" y="0"/>
+            <a:ext cx="12192000" cy="2347414"/>
+          </a:xfrm>
+          <a:custGeom>
+            <a:avLst/>
+            <a:gdLst>
+              <a:gd name="connsiteX0" fmla="*/ 0 w 12192000"/>
+              <a:gd name="connsiteY0" fmla="*/ 0 h 2347414"/>
+              <a:gd name="connsiteX1" fmla="*/ 12192000 w 12192000"/>
+              <a:gd name="connsiteY1" fmla="*/ 0 h 2347414"/>
+              <a:gd name="connsiteX2" fmla="*/ 12192000 w 12192000"/>
+              <a:gd name="connsiteY2" fmla="*/ 1736458 h 2347414"/>
+              <a:gd name="connsiteX3" fmla="*/ 11967601 w 12192000"/>
+              <a:gd name="connsiteY3" fmla="*/ 1784034 h 2347414"/>
+              <a:gd name="connsiteX4" fmla="*/ 10829000 w 12192000"/>
+              <a:gd name="connsiteY4" fmla="*/ 1983294 h 2347414"/>
+              <a:gd name="connsiteX5" fmla="*/ 10743779 w 12192000"/>
+              <a:gd name="connsiteY5" fmla="*/ 1996027 h 2347414"/>
+              <a:gd name="connsiteX6" fmla="*/ 10829254 w 12192000"/>
+              <a:gd name="connsiteY6" fmla="*/ 1987751 h 2347414"/>
+              <a:gd name="connsiteX7" fmla="*/ 10847162 w 12192000"/>
+              <a:gd name="connsiteY7" fmla="*/ 1988388 h 2347414"/>
+              <a:gd name="connsiteX8" fmla="*/ 11575155 w 12192000"/>
+              <a:gd name="connsiteY8" fmla="*/ 1921415 h 2347414"/>
+              <a:gd name="connsiteX9" fmla="*/ 12192000 w 12192000"/>
+              <a:gd name="connsiteY9" fmla="*/ 1851213 h 2347414"/>
+              <a:gd name="connsiteX10" fmla="*/ 12192000 w 12192000"/>
+              <a:gd name="connsiteY10" fmla="*/ 1907356 h 2347414"/>
+              <a:gd name="connsiteX11" fmla="*/ 12035532 w 12192000"/>
+              <a:gd name="connsiteY11" fmla="*/ 1927033 h 2347414"/>
+              <a:gd name="connsiteX12" fmla="*/ 11576932 w 12192000"/>
+              <a:gd name="connsiteY12" fmla="*/ 1976291 h 2347414"/>
+              <a:gd name="connsiteX13" fmla="*/ 10627316 w 12192000"/>
+              <a:gd name="connsiteY13" fmla="*/ 2061470 h 2347414"/>
+              <a:gd name="connsiteX14" fmla="*/ 9804196 w 12192000"/>
+              <a:gd name="connsiteY14" fmla="*/ 2123478 h 2347414"/>
+              <a:gd name="connsiteX15" fmla="*/ 9243851 w 12192000"/>
+              <a:gd name="connsiteY15" fmla="*/ 2180008 h 2347414"/>
+              <a:gd name="connsiteX16" fmla="*/ 8731259 w 12192000"/>
+              <a:gd name="connsiteY16" fmla="*/ 2225081 h 2347414"/>
+              <a:gd name="connsiteX17" fmla="*/ 8065752 w 12192000"/>
+              <a:gd name="connsiteY17" fmla="*/ 2271681 h 2347414"/>
+              <a:gd name="connsiteX18" fmla="*/ 7658065 w 12192000"/>
+              <a:gd name="connsiteY18" fmla="*/ 2292562 h 2347414"/>
+              <a:gd name="connsiteX19" fmla="*/ 6531024 w 12192000"/>
+              <a:gd name="connsiteY19" fmla="*/ 2324138 h 2347414"/>
+              <a:gd name="connsiteX20" fmla="*/ 6178331 w 12192000"/>
+              <a:gd name="connsiteY20" fmla="*/ 2345655 h 2347414"/>
+              <a:gd name="connsiteX21" fmla="*/ 5977282 w 12192000"/>
+              <a:gd name="connsiteY21" fmla="*/ 2344127 h 2347414"/>
+              <a:gd name="connsiteX22" fmla="*/ 5367658 w 12192000"/>
+              <a:gd name="connsiteY22" fmla="*/ 2329230 h 2347414"/>
+              <a:gd name="connsiteX23" fmla="*/ 4387306 w 12192000"/>
+              <a:gd name="connsiteY23" fmla="*/ 2288614 h 2347414"/>
+              <a:gd name="connsiteX24" fmla="*/ 4180287 w 12192000"/>
+              <a:gd name="connsiteY24" fmla="*/ 2280211 h 2347414"/>
+              <a:gd name="connsiteX25" fmla="*/ 3842199 w 12192000"/>
+              <a:gd name="connsiteY25" fmla="*/ 2257039 h 2347414"/>
+              <a:gd name="connsiteX26" fmla="*/ 3730309 w 12192000"/>
+              <a:gd name="connsiteY26" fmla="*/ 2251182 h 2347414"/>
+              <a:gd name="connsiteX27" fmla="*/ 3425496 w 12192000"/>
+              <a:gd name="connsiteY27" fmla="*/ 2231320 h 2347414"/>
+              <a:gd name="connsiteX28" fmla="*/ 3076106 w 12192000"/>
+              <a:gd name="connsiteY28" fmla="*/ 2201781 h 2347414"/>
+              <a:gd name="connsiteX29" fmla="*/ 2819682 w 12192000"/>
+              <a:gd name="connsiteY29" fmla="*/ 2182427 h 2347414"/>
+              <a:gd name="connsiteX30" fmla="*/ 2525539 w 12192000"/>
+              <a:gd name="connsiteY30" fmla="*/ 2152888 h 2347414"/>
+              <a:gd name="connsiteX31" fmla="*/ 2311915 w 12192000"/>
+              <a:gd name="connsiteY31" fmla="*/ 2133536 h 2347414"/>
+              <a:gd name="connsiteX32" fmla="*/ 2054223 w 12192000"/>
+              <a:gd name="connsiteY32" fmla="*/ 2104760 h 2347414"/>
+              <a:gd name="connsiteX33" fmla="*/ 1865367 w 12192000"/>
+              <a:gd name="connsiteY33" fmla="*/ 2084770 h 2347414"/>
+              <a:gd name="connsiteX34" fmla="*/ 1629263 w 12192000"/>
+              <a:gd name="connsiteY34" fmla="*/ 2055996 h 2347414"/>
+              <a:gd name="connsiteX35" fmla="*/ 1458823 w 12192000"/>
+              <a:gd name="connsiteY35" fmla="*/ 2035751 h 2347414"/>
+              <a:gd name="connsiteX36" fmla="*/ 1241390 w 12192000"/>
+              <a:gd name="connsiteY36" fmla="*/ 2007103 h 2347414"/>
+              <a:gd name="connsiteX37" fmla="*/ 1047453 w 12192000"/>
+              <a:gd name="connsiteY37" fmla="*/ 1980748 h 2347414"/>
+              <a:gd name="connsiteX38" fmla="*/ 814907 w 12192000"/>
+              <a:gd name="connsiteY38" fmla="*/ 1949045 h 2347414"/>
+              <a:gd name="connsiteX39" fmla="*/ 592649 w 12192000"/>
+              <a:gd name="connsiteY39" fmla="*/ 1913776 h 2347414"/>
+              <a:gd name="connsiteX40" fmla="*/ 343591 w 12192000"/>
+              <a:gd name="connsiteY40" fmla="*/ 1872650 h 2347414"/>
+              <a:gd name="connsiteX41" fmla="*/ 35731 w 12192000"/>
+              <a:gd name="connsiteY41" fmla="*/ 1821722 h 2347414"/>
+              <a:gd name="connsiteX42" fmla="*/ 0 w 12192000"/>
+              <a:gd name="connsiteY42" fmla="*/ 1814848 h 2347414"/>
+              <a:gd name="connsiteX43" fmla="*/ 0 w 12192000"/>
+              <a:gd name="connsiteY43" fmla="*/ 1758489 h 2347414"/>
+              <a:gd name="connsiteX44" fmla="*/ 274248 w 12192000"/>
+              <a:gd name="connsiteY44" fmla="*/ 1808735 h 2347414"/>
+              <a:gd name="connsiteX45" fmla="*/ 498157 w 12192000"/>
+              <a:gd name="connsiteY45" fmla="*/ 1846167 h 2347414"/>
+              <a:gd name="connsiteX46" fmla="*/ 722828 w 12192000"/>
+              <a:gd name="connsiteY46" fmla="*/ 1878635 h 2347414"/>
+              <a:gd name="connsiteX47" fmla="*/ 949913 w 12192000"/>
+              <a:gd name="connsiteY47" fmla="*/ 1912375 h 2347414"/>
+              <a:gd name="connsiteX48" fmla="*/ 1195414 w 12192000"/>
+              <a:gd name="connsiteY48" fmla="*/ 1947516 h 2347414"/>
+              <a:gd name="connsiteX49" fmla="*/ 1342867 w 12192000"/>
+              <a:gd name="connsiteY49" fmla="*/ 1968397 h 2347414"/>
+              <a:gd name="connsiteX50" fmla="*/ 1518007 w 12192000"/>
+              <a:gd name="connsiteY50" fmla="*/ 1988006 h 2347414"/>
+              <a:gd name="connsiteX51" fmla="*/ 1701403 w 12192000"/>
+              <a:gd name="connsiteY51" fmla="*/ 2010669 h 2347414"/>
+              <a:gd name="connsiteX52" fmla="*/ 1879210 w 12192000"/>
+              <a:gd name="connsiteY52" fmla="*/ 2031167 h 2347414"/>
+              <a:gd name="connsiteX53" fmla="*/ 2068702 w 12192000"/>
+              <a:gd name="connsiteY53" fmla="*/ 2052940 h 2347414"/>
+              <a:gd name="connsiteX54" fmla="*/ 2212090 w 12192000"/>
+              <a:gd name="connsiteY54" fmla="*/ 2067583 h 2347414"/>
+              <a:gd name="connsiteX55" fmla="*/ 2416949 w 12192000"/>
+              <a:gd name="connsiteY55" fmla="*/ 2089609 h 2347414"/>
+              <a:gd name="connsiteX56" fmla="*/ 2582055 w 12192000"/>
+              <a:gd name="connsiteY56" fmla="*/ 2105397 h 2347414"/>
+              <a:gd name="connsiteX57" fmla="*/ 2802282 w 12192000"/>
+              <a:gd name="connsiteY57" fmla="*/ 2126405 h 2347414"/>
+              <a:gd name="connsiteX58" fmla="*/ 2984916 w 12192000"/>
+              <a:gd name="connsiteY58" fmla="*/ 2141684 h 2347414"/>
+              <a:gd name="connsiteX59" fmla="*/ 3241847 w 12192000"/>
+              <a:gd name="connsiteY59" fmla="*/ 2164094 h 2347414"/>
+              <a:gd name="connsiteX60" fmla="*/ 3439848 w 12192000"/>
+              <a:gd name="connsiteY60" fmla="*/ 2176826 h 2347414"/>
+              <a:gd name="connsiteX61" fmla="*/ 3658678 w 12192000"/>
+              <a:gd name="connsiteY61" fmla="*/ 2194523 h 2347414"/>
+              <a:gd name="connsiteX62" fmla="*/ 3881317 w 12192000"/>
+              <a:gd name="connsiteY62" fmla="*/ 2206491 h 2347414"/>
+              <a:gd name="connsiteX63" fmla="*/ 4148916 w 12192000"/>
+              <a:gd name="connsiteY63" fmla="*/ 2225081 h 2347414"/>
+              <a:gd name="connsiteX64" fmla="*/ 4468337 w 12192000"/>
+              <a:gd name="connsiteY64" fmla="*/ 2237813 h 2347414"/>
+              <a:gd name="connsiteX65" fmla="*/ 4605375 w 12192000"/>
+              <a:gd name="connsiteY65" fmla="*/ 2240232 h 2347414"/>
+              <a:gd name="connsiteX66" fmla="*/ 4527647 w 12192000"/>
+              <a:gd name="connsiteY66" fmla="*/ 2236412 h 2347414"/>
+              <a:gd name="connsiteX67" fmla="*/ 4175589 w 12192000"/>
+              <a:gd name="connsiteY67" fmla="*/ 2212985 h 2347414"/>
+              <a:gd name="connsiteX68" fmla="*/ 3988255 w 12192000"/>
+              <a:gd name="connsiteY68" fmla="*/ 2200253 h 2347414"/>
+              <a:gd name="connsiteX69" fmla="*/ 3686492 w 12192000"/>
+              <a:gd name="connsiteY69" fmla="*/ 2176062 h 2347414"/>
+              <a:gd name="connsiteX70" fmla="*/ 3517320 w 12192000"/>
+              <a:gd name="connsiteY70" fmla="*/ 2163330 h 2347414"/>
+              <a:gd name="connsiteX71" fmla="*/ 3258357 w 12192000"/>
+              <a:gd name="connsiteY71" fmla="*/ 2139519 h 2347414"/>
+              <a:gd name="connsiteX72" fmla="*/ 3101506 w 12192000"/>
+              <a:gd name="connsiteY72" fmla="*/ 2126787 h 2347414"/>
+              <a:gd name="connsiteX73" fmla="*/ 2809395 w 12192000"/>
+              <a:gd name="connsiteY73" fmla="*/ 2097502 h 2347414"/>
+              <a:gd name="connsiteX74" fmla="*/ 2598566 w 12192000"/>
+              <a:gd name="connsiteY74" fmla="*/ 2078532 h 2347414"/>
+              <a:gd name="connsiteX75" fmla="*/ 2337444 w 12192000"/>
+              <a:gd name="connsiteY75" fmla="*/ 2048611 h 2347414"/>
+              <a:gd name="connsiteX76" fmla="*/ 2091054 w 12192000"/>
+              <a:gd name="connsiteY76" fmla="*/ 2023146 h 2347414"/>
+              <a:gd name="connsiteX77" fmla="*/ 1755761 w 12192000"/>
+              <a:gd name="connsiteY77" fmla="*/ 1981384 h 2347414"/>
+              <a:gd name="connsiteX78" fmla="*/ 1441169 w 12192000"/>
+              <a:gd name="connsiteY78" fmla="*/ 1943824 h 2347414"/>
+              <a:gd name="connsiteX79" fmla="*/ 1017607 w 12192000"/>
+              <a:gd name="connsiteY79" fmla="*/ 1883345 h 2347414"/>
+              <a:gd name="connsiteX80" fmla="*/ 594427 w 12192000"/>
+              <a:gd name="connsiteY80" fmla="*/ 1821849 h 2347414"/>
+              <a:gd name="connsiteX81" fmla="*/ 200711 w 12192000"/>
+              <a:gd name="connsiteY81" fmla="*/ 1755132 h 2347414"/>
+              <a:gd name="connsiteX82" fmla="*/ 0 w 12192000"/>
+              <a:gd name="connsiteY82" fmla="*/ 1718743 h 2347414"/>
+            </a:gdLst>
+            <a:ahLst/>
+            <a:cxnLst>
+              <a:cxn ang="0">
+                <a:pos x="connsiteX0" y="connsiteY0"/>
+              </a:cxn>
+              <a:cxn ang="0">
+                <a:pos x="connsiteX1" y="connsiteY1"/>
+              </a:cxn>
+              <a:cxn ang="0">
+                <a:pos x="connsiteX2" y="connsiteY2"/>
+              </a:cxn>
+              <a:cxn ang="0">
+                <a:pos x="connsiteX3" y="connsiteY3"/>
+              </a:cxn>
+              <a:cxn ang="0">
+                <a:pos x="connsiteX4" y="connsiteY4"/>
+              </a:cxn>
+              <a:cxn ang="0">
+                <a:pos x="connsiteX5" y="connsiteY5"/>
+              </a:cxn>
+              <a:cxn ang="0">
+                <a:pos x="connsiteX6" y="connsiteY6"/>
+              </a:cxn>
+              <a:cxn ang="0">
+                <a:pos x="connsiteX7" y="connsiteY7"/>
+              </a:cxn>
+              <a:cxn ang="0">
+                <a:pos x="connsiteX8" y="connsiteY8"/>
+              </a:cxn>
+              <a:cxn ang="0">
+                <a:pos x="connsiteX9" y="connsiteY9"/>
+              </a:cxn>
+              <a:cxn ang="0">
+                <a:pos x="connsiteX10" y="connsiteY10"/>
+              </a:cxn>
+              <a:cxn ang="0">
+                <a:pos x="connsiteX11" y="connsiteY11"/>
+              </a:cxn>
+              <a:cxn ang="0">
+                <a:pos x="connsiteX12" y="connsiteY12"/>
+              </a:cxn>
+              <a:cxn ang="0">
+                <a:pos x="connsiteX13" y="connsiteY13"/>
+              </a:cxn>
+              <a:cxn ang="0">
+                <a:pos x="connsiteX14" y="connsiteY14"/>
+              </a:cxn>
+              <a:cxn ang="0">
+                <a:pos x="connsiteX15" y="connsiteY15"/>
+              </a:cxn>
+              <a:cxn ang="0">
+                <a:pos x="connsiteX16" y="connsiteY16"/>
+              </a:cxn>
+              <a:cxn ang="0">
+                <a:pos x="connsiteX17" y="connsiteY17"/>
+              </a:cxn>
+              <a:cxn ang="0">
+                <a:pos x="connsiteX18" y="connsiteY18"/>
+              </a:cxn>
+              <a:cxn ang="0">
+                <a:pos x="connsiteX19" y="connsiteY19"/>
+              </a:cxn>
+              <a:cxn ang="0">
+                <a:pos x="connsiteX20" y="connsiteY20"/>
+              </a:cxn>
+              <a:cxn ang="0">
+                <a:pos x="connsiteX21" y="connsiteY21"/>
+              </a:cxn>
+              <a:cxn ang="0">
+                <a:pos x="connsiteX22" y="connsiteY22"/>
+              </a:cxn>
+              <a:cxn ang="0">
+                <a:pos x="connsiteX23" y="connsiteY23"/>
+              </a:cxn>
+              <a:cxn ang="0">
+                <a:pos x="connsiteX24" y="connsiteY24"/>
+              </a:cxn>
+              <a:cxn ang="0">
+                <a:pos x="connsiteX25" y="connsiteY25"/>
+              </a:cxn>
+              <a:cxn ang="0">
+                <a:pos x="connsiteX26" y="connsiteY26"/>
+              </a:cxn>
+              <a:cxn ang="0">
+                <a:pos x="connsiteX27" y="connsiteY27"/>
+              </a:cxn>
+              <a:cxn ang="0">
+                <a:pos x="connsiteX28" y="connsiteY28"/>
+              </a:cxn>
+              <a:cxn ang="0">
+                <a:pos x="connsiteX29" y="connsiteY29"/>
+              </a:cxn>
+              <a:cxn ang="0">
+                <a:pos x="connsiteX30" y="connsiteY30"/>
+              </a:cxn>
+              <a:cxn ang="0">
+                <a:pos x="connsiteX31" y="connsiteY31"/>
+              </a:cxn>
+              <a:cxn ang="0">
+                <a:pos x="connsiteX32" y="connsiteY32"/>
+              </a:cxn>
+              <a:cxn ang="0">
+                <a:pos x="connsiteX33" y="connsiteY33"/>
+              </a:cxn>
+              <a:cxn ang="0">
+                <a:pos x="connsiteX34" y="connsiteY34"/>
+              </a:cxn>
+              <a:cxn ang="0">
+                <a:pos x="connsiteX35" y="connsiteY35"/>
+              </a:cxn>
+              <a:cxn ang="0">
+                <a:pos x="connsiteX36" y="connsiteY36"/>
+              </a:cxn>
+              <a:cxn ang="0">
+                <a:pos x="connsiteX37" y="connsiteY37"/>
+              </a:cxn>
+              <a:cxn ang="0">
+                <a:pos x="connsiteX38" y="connsiteY38"/>
+              </a:cxn>
+              <a:cxn ang="0">
+                <a:pos x="connsiteX39" y="connsiteY39"/>
+              </a:cxn>
+              <a:cxn ang="0">
+                <a:pos x="connsiteX40" y="connsiteY40"/>
+              </a:cxn>
+              <a:cxn ang="0">
+                <a:pos x="connsiteX41" y="connsiteY41"/>
+              </a:cxn>
+              <a:cxn ang="0">
+                <a:pos x="connsiteX42" y="connsiteY42"/>
+              </a:cxn>
+              <a:cxn ang="0">
+                <a:pos x="connsiteX43" y="connsiteY43"/>
+              </a:cxn>
+              <a:cxn ang="0">
+                <a:pos x="connsiteX44" y="connsiteY44"/>
+              </a:cxn>
+              <a:cxn ang="0">
+                <a:pos x="connsiteX45" y="connsiteY45"/>
+              </a:cxn>
+              <a:cxn ang="0">
+                <a:pos x="connsiteX46" y="connsiteY46"/>
+              </a:cxn>
+              <a:cxn ang="0">
+                <a:pos x="connsiteX47" y="connsiteY47"/>
+              </a:cxn>
+              <a:cxn ang="0">
+                <a:pos x="connsiteX48" y="connsiteY48"/>
+              </a:cxn>
+              <a:cxn ang="0">
+                <a:pos x="connsiteX49" y="connsiteY49"/>
+              </a:cxn>
+              <a:cxn ang="0">
+                <a:pos x="connsiteX50" y="connsiteY50"/>
+              </a:cxn>
+              <a:cxn ang="0">
+                <a:pos x="connsiteX51" y="connsiteY51"/>
+              </a:cxn>
+              <a:cxn ang="0">
+                <a:pos x="connsiteX52" y="connsiteY52"/>
+              </a:cxn>
+              <a:cxn ang="0">
+                <a:pos x="connsiteX53" y="connsiteY53"/>
+              </a:cxn>
+              <a:cxn ang="0">
+                <a:pos x="connsiteX54" y="connsiteY54"/>
+              </a:cxn>
+              <a:cxn ang="0">
+                <a:pos x="connsiteX55" y="connsiteY55"/>
+              </a:cxn>
+              <a:cxn ang="0">
+                <a:pos x="connsiteX56" y="connsiteY56"/>
+              </a:cxn>
+              <a:cxn ang="0">
+                <a:pos x="connsiteX57" y="connsiteY57"/>
+              </a:cxn>
+              <a:cxn ang="0">
+                <a:pos x="connsiteX58" y="connsiteY58"/>
+              </a:cxn>
+              <a:cxn ang="0">
+                <a:pos x="connsiteX59" y="connsiteY59"/>
+              </a:cxn>
+              <a:cxn ang="0">
+                <a:pos x="connsiteX60" y="connsiteY60"/>
+              </a:cxn>
+              <a:cxn ang="0">
+                <a:pos x="connsiteX61" y="connsiteY61"/>
+              </a:cxn>
+              <a:cxn ang="0">
+                <a:pos x="connsiteX62" y="connsiteY62"/>
+              </a:cxn>
+              <a:cxn ang="0">
+                <a:pos x="connsiteX63" y="connsiteY63"/>
+              </a:cxn>
+              <a:cxn ang="0">
+                <a:pos x="connsiteX64" y="connsiteY64"/>
+              </a:cxn>
+              <a:cxn ang="0">
+                <a:pos x="connsiteX65" y="connsiteY65"/>
+              </a:cxn>
+              <a:cxn ang="0">
+                <a:pos x="connsiteX66" y="connsiteY66"/>
+              </a:cxn>
+              <a:cxn ang="0">
+                <a:pos x="connsiteX67" y="connsiteY67"/>
+              </a:cxn>
+              <a:cxn ang="0">
+                <a:pos x="connsiteX68" y="connsiteY68"/>
+              </a:cxn>
+              <a:cxn ang="0">
+                <a:pos x="connsiteX69" y="connsiteY69"/>
+              </a:cxn>
+              <a:cxn ang="0">
+                <a:pos x="connsiteX70" y="connsiteY70"/>
+              </a:cxn>
+              <a:cxn ang="0">
+                <a:pos x="connsiteX71" y="connsiteY71"/>
+              </a:cxn>
+              <a:cxn ang="0">
+                <a:pos x="connsiteX72" y="connsiteY72"/>
+              </a:cxn>
+              <a:cxn ang="0">
+                <a:pos x="connsiteX73" y="connsiteY73"/>
+              </a:cxn>
+              <a:cxn ang="0">
+                <a:pos x="connsiteX74" y="connsiteY74"/>
+              </a:cxn>
+              <a:cxn ang="0">
+                <a:pos x="connsiteX75" y="connsiteY75"/>
+              </a:cxn>
+              <a:cxn ang="0">
+                <a:pos x="connsiteX76" y="connsiteY76"/>
+              </a:cxn>
+              <a:cxn ang="0">
+                <a:pos x="connsiteX77" y="connsiteY77"/>
+              </a:cxn>
+              <a:cxn ang="0">
+                <a:pos x="connsiteX78" y="connsiteY78"/>
+              </a:cxn>
+              <a:cxn ang="0">
+                <a:pos x="connsiteX79" y="connsiteY79"/>
+              </a:cxn>
+              <a:cxn ang="0">
+                <a:pos x="connsiteX80" y="connsiteY80"/>
+              </a:cxn>
+              <a:cxn ang="0">
+                <a:pos x="connsiteX81" y="connsiteY81"/>
+              </a:cxn>
+              <a:cxn ang="0">
+                <a:pos x="connsiteX82" y="connsiteY82"/>
+              </a:cxn>
+            </a:cxnLst>
+            <a:rect l="l" t="t" r="r" b="b"/>
+            <a:pathLst>
+              <a:path w="12192000" h="2347414">
+                <a:moveTo>
+                  <a:pt x="0" y="0"/>
+                </a:moveTo>
+                <a:lnTo>
+                  <a:pt x="12192000" y="0"/>
+                </a:lnTo>
+                <a:lnTo>
+                  <a:pt x="12192000" y="1736458"/>
+                </a:lnTo>
+                <a:lnTo>
+                  <a:pt x="11967601" y="1784034"/>
+                </a:lnTo>
+                <a:cubicBezTo>
+                  <a:pt x="11589888" y="1859409"/>
+                  <a:pt x="11209762" y="1923961"/>
+                  <a:pt x="10829000" y="1983294"/>
+                </a:cubicBezTo>
+                <a:lnTo>
+                  <a:pt x="10743779" y="1996027"/>
+                </a:lnTo>
+                <a:cubicBezTo>
+                  <a:pt x="10772495" y="1996778"/>
+                  <a:pt x="10801211" y="1993989"/>
+                  <a:pt x="10829254" y="1987751"/>
+                </a:cubicBezTo>
+                <a:cubicBezTo>
+                  <a:pt x="10835198" y="1988337"/>
+                  <a:pt x="10841180" y="1988553"/>
+                  <a:pt x="10847162" y="1988388"/>
+                </a:cubicBezTo>
+                <a:cubicBezTo>
+                  <a:pt x="11090123" y="1968907"/>
+                  <a:pt x="11332703" y="1945734"/>
+                  <a:pt x="11575155" y="1921415"/>
+                </a:cubicBezTo>
+                <a:lnTo>
+                  <a:pt x="12192000" y="1851213"/>
+                </a:lnTo>
+                <a:lnTo>
+                  <a:pt x="12192000" y="1907356"/>
+                </a:lnTo>
+                <a:lnTo>
+                  <a:pt x="12035532" y="1927033"/>
+                </a:lnTo>
+                <a:cubicBezTo>
+                  <a:pt x="11882793" y="1944747"/>
+                  <a:pt x="11729910" y="1961077"/>
+                  <a:pt x="11576932" y="1976291"/>
+                </a:cubicBezTo>
+                <a:cubicBezTo>
+                  <a:pt x="11260690" y="2008122"/>
+                  <a:pt x="10944193" y="2037279"/>
+                  <a:pt x="10627316" y="2061470"/>
+                </a:cubicBezTo>
+                <a:cubicBezTo>
+                  <a:pt x="10352985" y="2082351"/>
+                  <a:pt x="10078401" y="2100431"/>
+                  <a:pt x="9804196" y="2123478"/>
+                </a:cubicBezTo>
+                <a:cubicBezTo>
+                  <a:pt x="9617118" y="2139137"/>
+                  <a:pt x="9430675" y="2161674"/>
+                  <a:pt x="9243851" y="2180008"/>
+                </a:cubicBezTo>
+                <a:cubicBezTo>
+                  <a:pt x="9073157" y="2196433"/>
+                  <a:pt x="8902207" y="2211966"/>
+                  <a:pt x="8731259" y="2225081"/>
+                </a:cubicBezTo>
+                <a:cubicBezTo>
+                  <a:pt x="8509507" y="2242054"/>
+                  <a:pt x="8287667" y="2257586"/>
+                  <a:pt x="8065752" y="2271681"/>
+                </a:cubicBezTo>
+                <a:cubicBezTo>
+                  <a:pt x="7929984" y="2280466"/>
+                  <a:pt x="7793961" y="2285814"/>
+                  <a:pt x="7658065" y="2292562"/>
+                </a:cubicBezTo>
+                <a:cubicBezTo>
+                  <a:pt x="7282640" y="2311661"/>
+                  <a:pt x="6906704" y="2314208"/>
+                  <a:pt x="6531024" y="2324138"/>
+                </a:cubicBezTo>
+                <a:cubicBezTo>
+                  <a:pt x="6413417" y="2327322"/>
+                  <a:pt x="6295937" y="2338399"/>
+                  <a:pt x="6178331" y="2345655"/>
+                </a:cubicBezTo>
+                <a:cubicBezTo>
+                  <a:pt x="6111271" y="2349730"/>
+                  <a:pt x="6044342" y="2345655"/>
+                  <a:pt x="5977282" y="2344127"/>
+                </a:cubicBezTo>
+                <a:cubicBezTo>
+                  <a:pt x="5774073" y="2338908"/>
+                  <a:pt x="5570866" y="2334960"/>
+                  <a:pt x="5367658" y="2329230"/>
+                </a:cubicBezTo>
+                <a:cubicBezTo>
+                  <a:pt x="5040746" y="2319809"/>
+                  <a:pt x="4713963" y="2306274"/>
+                  <a:pt x="4387306" y="2288614"/>
+                </a:cubicBezTo>
+                <a:cubicBezTo>
+                  <a:pt x="4318342" y="2284796"/>
+                  <a:pt x="4249253" y="2284286"/>
+                  <a:pt x="4180287" y="2280211"/>
+                </a:cubicBezTo>
+                <a:cubicBezTo>
+                  <a:pt x="4067634" y="2273463"/>
+                  <a:pt x="3954980" y="2265060"/>
+                  <a:pt x="3842199" y="2257039"/>
+                </a:cubicBezTo>
+                <a:cubicBezTo>
+                  <a:pt x="3804988" y="2254492"/>
+                  <a:pt x="3767648" y="2254620"/>
+                  <a:pt x="3730309" y="2251182"/>
+                </a:cubicBezTo>
+                <a:cubicBezTo>
+                  <a:pt x="3628704" y="2242142"/>
+                  <a:pt x="3527101" y="2238449"/>
+                  <a:pt x="3425496" y="2231320"/>
+                </a:cubicBezTo>
+                <a:cubicBezTo>
+                  <a:pt x="3308906" y="2222534"/>
+                  <a:pt x="3192569" y="2211330"/>
+                  <a:pt x="3076106" y="2201781"/>
+                </a:cubicBezTo>
+                <a:cubicBezTo>
+                  <a:pt x="2990757" y="2194905"/>
+                  <a:pt x="2905157" y="2190067"/>
+                  <a:pt x="2819682" y="2182427"/>
+                </a:cubicBezTo>
+                <a:cubicBezTo>
+                  <a:pt x="2721507" y="2173515"/>
+                  <a:pt x="2623586" y="2162311"/>
+                  <a:pt x="2525539" y="2152888"/>
+                </a:cubicBezTo>
+                <a:cubicBezTo>
+                  <a:pt x="2454289" y="2145886"/>
+                  <a:pt x="2383038" y="2140920"/>
+                  <a:pt x="2311915" y="2133536"/>
+                </a:cubicBezTo>
+                <a:cubicBezTo>
+                  <a:pt x="2225933" y="2124749"/>
+                  <a:pt x="2140204" y="2114182"/>
+                  <a:pt x="2054223" y="2104760"/>
+                </a:cubicBezTo>
+                <a:cubicBezTo>
+                  <a:pt x="1990719" y="2097758"/>
+                  <a:pt x="1928233" y="2092028"/>
+                  <a:pt x="1865367" y="2084770"/>
+                </a:cubicBezTo>
+                <a:cubicBezTo>
+                  <a:pt x="1786622" y="2075603"/>
+                  <a:pt x="1708006" y="2065545"/>
+                  <a:pt x="1629263" y="2055996"/>
+                </a:cubicBezTo>
+                <a:cubicBezTo>
+                  <a:pt x="1572492" y="2049120"/>
+                  <a:pt x="1515595" y="2043264"/>
+                  <a:pt x="1458823" y="2035751"/>
+                </a:cubicBezTo>
+                <a:cubicBezTo>
+                  <a:pt x="1386303" y="2026585"/>
+                  <a:pt x="1313784" y="2016780"/>
+                  <a:pt x="1241390" y="2007103"/>
+                </a:cubicBezTo>
+                <a:lnTo>
+                  <a:pt x="1047453" y="1980748"/>
+                </a:lnTo>
+                <a:cubicBezTo>
+                  <a:pt x="969980" y="1970180"/>
+                  <a:pt x="892254" y="1960377"/>
+                  <a:pt x="814907" y="1949045"/>
+                </a:cubicBezTo>
+                <a:cubicBezTo>
+                  <a:pt x="740609" y="1938094"/>
+                  <a:pt x="666692" y="1925744"/>
+                  <a:pt x="592649" y="1913776"/>
+                </a:cubicBezTo>
+                <a:cubicBezTo>
+                  <a:pt x="509587" y="1900280"/>
+                  <a:pt x="426653" y="1886274"/>
+                  <a:pt x="343591" y="1872650"/>
+                </a:cubicBezTo>
+                <a:cubicBezTo>
+                  <a:pt x="240972" y="1855716"/>
+                  <a:pt x="138225" y="1839673"/>
+                  <a:pt x="35731" y="1821722"/>
+                </a:cubicBezTo>
+                <a:lnTo>
+                  <a:pt x="0" y="1814848"/>
+                </a:lnTo>
+                <a:lnTo>
+                  <a:pt x="0" y="1758489"/>
+                </a:lnTo>
+                <a:lnTo>
+                  <a:pt x="274248" y="1808735"/>
+                </a:lnTo>
+                <a:cubicBezTo>
+                  <a:pt x="348926" y="1821467"/>
+                  <a:pt x="423604" y="1832798"/>
+                  <a:pt x="498157" y="1846167"/>
+                </a:cubicBezTo>
+                <a:cubicBezTo>
+                  <a:pt x="572708" y="1859536"/>
+                  <a:pt x="647896" y="1867813"/>
+                  <a:pt x="722828" y="1878635"/>
+                </a:cubicBezTo>
+                <a:cubicBezTo>
+                  <a:pt x="797762" y="1889457"/>
+                  <a:pt x="874219" y="1901426"/>
+                  <a:pt x="949913" y="1912375"/>
+                </a:cubicBezTo>
+                <a:cubicBezTo>
+                  <a:pt x="1031704" y="1924343"/>
+                  <a:pt x="1113496" y="1935802"/>
+                  <a:pt x="1195414" y="1947516"/>
+                </a:cubicBezTo>
+                <a:cubicBezTo>
+                  <a:pt x="1244566" y="1954519"/>
+                  <a:pt x="1293589" y="1962285"/>
+                  <a:pt x="1342867" y="1968397"/>
+                </a:cubicBezTo>
+                <a:cubicBezTo>
+                  <a:pt x="1401162" y="1975656"/>
+                  <a:pt x="1459712" y="1981130"/>
+                  <a:pt x="1518007" y="1988006"/>
+                </a:cubicBezTo>
+                <a:cubicBezTo>
+                  <a:pt x="1579224" y="1995263"/>
+                  <a:pt x="1640186" y="2003411"/>
+                  <a:pt x="1701403" y="2010669"/>
+                </a:cubicBezTo>
+                <a:cubicBezTo>
+                  <a:pt x="1762618" y="2017926"/>
+                  <a:pt x="1820279" y="2024292"/>
+                  <a:pt x="1879210" y="2031167"/>
+                </a:cubicBezTo>
+                <a:cubicBezTo>
+                  <a:pt x="1942712" y="2038425"/>
+                  <a:pt x="2006214" y="2046064"/>
+                  <a:pt x="2068702" y="2052940"/>
+                </a:cubicBezTo>
+                <a:cubicBezTo>
+                  <a:pt x="2116455" y="2058160"/>
+                  <a:pt x="2164335" y="2062362"/>
+                  <a:pt x="2212090" y="2067583"/>
+                </a:cubicBezTo>
+                <a:cubicBezTo>
+                  <a:pt x="2280419" y="2074967"/>
+                  <a:pt x="2348493" y="2085152"/>
+                  <a:pt x="2416949" y="2089609"/>
+                </a:cubicBezTo>
+                <a:cubicBezTo>
+                  <a:pt x="2472070" y="2093302"/>
+                  <a:pt x="2526936" y="2099540"/>
+                  <a:pt x="2582055" y="2105397"/>
+                </a:cubicBezTo>
+                <a:cubicBezTo>
+                  <a:pt x="2655337" y="2113291"/>
+                  <a:pt x="2729001" y="2119785"/>
+                  <a:pt x="2802282" y="2126405"/>
+                </a:cubicBezTo>
+                <a:cubicBezTo>
+                  <a:pt x="2862991" y="2131753"/>
+                  <a:pt x="2924207" y="2136337"/>
+                  <a:pt x="2984916" y="2141684"/>
+                </a:cubicBezTo>
+                <a:cubicBezTo>
+                  <a:pt x="3070516" y="2149324"/>
+                  <a:pt x="3156373" y="2152888"/>
+                  <a:pt x="3241847" y="2164094"/>
+                </a:cubicBezTo>
+                <a:cubicBezTo>
+                  <a:pt x="3307255" y="2172624"/>
+                  <a:pt x="3374060" y="2169822"/>
+                  <a:pt x="3439848" y="2176826"/>
+                </a:cubicBezTo>
+                <a:cubicBezTo>
+                  <a:pt x="3512622" y="2184592"/>
+                  <a:pt x="3585777" y="2186247"/>
+                  <a:pt x="3658678" y="2194523"/>
+                </a:cubicBezTo>
+                <a:cubicBezTo>
+                  <a:pt x="3731578" y="2202800"/>
+                  <a:pt x="3807019" y="2201781"/>
+                  <a:pt x="3881317" y="2206491"/>
+                </a:cubicBezTo>
+                <a:cubicBezTo>
+                  <a:pt x="3970222" y="2212094"/>
+                  <a:pt x="4059124" y="2223552"/>
+                  <a:pt x="4148916" y="2225081"/>
+                </a:cubicBezTo>
+                <a:cubicBezTo>
+                  <a:pt x="4255600" y="2226736"/>
+                  <a:pt x="4361779" y="2236539"/>
+                  <a:pt x="4468337" y="2237813"/>
+                </a:cubicBezTo>
+                <a:cubicBezTo>
+                  <a:pt x="4511390" y="2238577"/>
+                  <a:pt x="4554190" y="2246852"/>
+                  <a:pt x="4605375" y="2240232"/>
+                </a:cubicBezTo>
+                <a:cubicBezTo>
+                  <a:pt x="4574131" y="2238704"/>
+                  <a:pt x="4550762" y="2237940"/>
+                  <a:pt x="4527647" y="2236412"/>
+                </a:cubicBezTo>
+                <a:cubicBezTo>
+                  <a:pt x="4410293" y="2228773"/>
+                  <a:pt x="4292942" y="2220751"/>
+                  <a:pt x="4175589" y="2212985"/>
+                </a:cubicBezTo>
+                <a:cubicBezTo>
+                  <a:pt x="4113101" y="2208783"/>
+                  <a:pt x="4050615" y="2205219"/>
+                  <a:pt x="3988255" y="2200253"/>
+                </a:cubicBezTo>
+                <a:cubicBezTo>
+                  <a:pt x="3887668" y="2192487"/>
+                  <a:pt x="3787079" y="2184082"/>
+                  <a:pt x="3686492" y="2176062"/>
+                </a:cubicBezTo>
+                <a:cubicBezTo>
+                  <a:pt x="3630102" y="2171605"/>
+                  <a:pt x="3573711" y="2168040"/>
+                  <a:pt x="3517320" y="2163330"/>
+                </a:cubicBezTo>
+                <a:cubicBezTo>
+                  <a:pt x="3430958" y="2155689"/>
+                  <a:pt x="3344721" y="2147159"/>
+                  <a:pt x="3258357" y="2139519"/>
+                </a:cubicBezTo>
+                <a:cubicBezTo>
+                  <a:pt x="3206031" y="2134809"/>
+                  <a:pt x="3153705" y="2131371"/>
+                  <a:pt x="3101506" y="2126787"/>
+                </a:cubicBezTo>
+                <a:cubicBezTo>
+                  <a:pt x="3004220" y="2117365"/>
+                  <a:pt x="2907061" y="2106798"/>
+                  <a:pt x="2809395" y="2097502"/>
+                </a:cubicBezTo>
+                <a:cubicBezTo>
+                  <a:pt x="2739161" y="2090628"/>
+                  <a:pt x="2668673" y="2085916"/>
+                  <a:pt x="2598566" y="2078532"/>
+                </a:cubicBezTo>
+                <a:cubicBezTo>
+                  <a:pt x="2511441" y="2069365"/>
+                  <a:pt x="2424569" y="2058160"/>
+                  <a:pt x="2337444" y="2048611"/>
+                </a:cubicBezTo>
+                <a:cubicBezTo>
+                  <a:pt x="2255399" y="2039699"/>
+                  <a:pt x="2173099" y="2032950"/>
+                  <a:pt x="2091054" y="2023146"/>
+                </a:cubicBezTo>
+                <a:cubicBezTo>
+                  <a:pt x="1979162" y="2010414"/>
+                  <a:pt x="1867524" y="1995008"/>
+                  <a:pt x="1755761" y="1981384"/>
+                </a:cubicBezTo>
+                <a:cubicBezTo>
+                  <a:pt x="1650982" y="1968652"/>
+                  <a:pt x="1545821" y="1957830"/>
+                  <a:pt x="1441169" y="1943824"/>
+                </a:cubicBezTo>
+                <a:cubicBezTo>
+                  <a:pt x="1299813" y="1924980"/>
+                  <a:pt x="1158837" y="1903718"/>
+                  <a:pt x="1017607" y="1883345"/>
+                </a:cubicBezTo>
+                <a:cubicBezTo>
+                  <a:pt x="876378" y="1862974"/>
+                  <a:pt x="735402" y="1844003"/>
+                  <a:pt x="594427" y="1821849"/>
+                </a:cubicBezTo>
+                <a:cubicBezTo>
+                  <a:pt x="462850" y="1801222"/>
+                  <a:pt x="331526" y="1778304"/>
+                  <a:pt x="200711" y="1755132"/>
+                </a:cubicBezTo>
+                <a:lnTo>
+                  <a:pt x="0" y="1718743"/>
+                </a:lnTo>
+                <a:close/>
+              </a:path>
+            </a:pathLst>
+          </a:custGeom>
+          <a:solidFill>
+            <a:schemeClr val="accent2"/>
+          </a:solidFill>
+          <a:ln w="8199" cap="flat">
+            <a:noFill/>
+            <a:prstDash val="solid"/>
+            <a:miter/>
+          </a:ln>
+        </p:spPr>
+        <p:txBody>
+          <a:bodyPr rtlCol="0" anchor="ctr"/>
+          <a:lstStyle/>
+          <a:p>
+            <a:endParaRPr lang="en-US"/>
+          </a:p>
+        </p:txBody>
+      </p:sp>
+      <p:sp>
+        <p:nvSpPr>
+          <p:cNvPr id="3" name="Content Placeholder 2">
+            <a:extLst>
+              <a:ext uri="{FF2B5EF4-FFF2-40B4-BE49-F238E27FC236}">
+                <a16:creationId xmlns:a16="http://schemas.microsoft.com/office/drawing/2014/main" id="{03A27C3F-C3DB-364B-97CF-2DC1F4BC6D61}"/>
+              </a:ext>
+            </a:extLst>
+          </p:cNvPr>
+          <p:cNvSpPr>
+            <a:spLocks noGrp="1"/>
+          </p:cNvSpPr>
+          <p:nvPr>
+            <p:ph idx="1"/>
+          </p:nvPr>
+        </p:nvSpPr>
+        <p:spPr>
+          <a:xfrm>
+            <a:off x="838200" y="2586789"/>
+            <a:ext cx="10515600" cy="3590174"/>
+          </a:xfrm>
+        </p:spPr>
+        <p:txBody>
+          <a:bodyPr>
+            <a:normAutofit/>
+          </a:bodyPr>
+          <a:lstStyle/>
+          <a:p>
+            <a:r>
+              <a:rPr lang="en-GB" sz="1900" dirty="0">
+                <a:latin typeface="Liberation Mono"/>
+              </a:rPr>
+              <a:t>The name variable is a string that describes the USB driver. It is used everywhere to specify the driver in system logs.</a:t>
+            </a:r>
+          </a:p>
+          <a:p>
+            <a:endParaRPr lang="en-GB" sz="1900" dirty="0">
+              <a:latin typeface="Liberation Mono"/>
+            </a:endParaRPr>
+          </a:p>
+          <a:p>
+            <a:r>
+              <a:rPr lang="en-GB" sz="1900" dirty="0">
+                <a:latin typeface="Liberation Mono"/>
+              </a:rPr>
+              <a:t>The disconnect and probe function pointers are called when a USB device matched with a device in the </a:t>
+            </a:r>
+            <a:r>
+              <a:rPr lang="en-GB" sz="1900" dirty="0" err="1">
+                <a:latin typeface="Liberation Mono"/>
+              </a:rPr>
+              <a:t>id_table</a:t>
+            </a:r>
+            <a:r>
+              <a:rPr lang="en-GB" sz="1900" dirty="0">
+                <a:latin typeface="Liberation Mono"/>
+              </a:rPr>
+              <a:t> is connected to or disconnected from the machine.</a:t>
+            </a:r>
+          </a:p>
+          <a:p>
+            <a:endParaRPr lang="en-GB" sz="1900" dirty="0">
+              <a:latin typeface="Liberation Mono"/>
+            </a:endParaRPr>
+          </a:p>
+          <a:p>
+            <a:r>
+              <a:rPr lang="en-GB" sz="1900" dirty="0">
+                <a:latin typeface="Liberation Mono"/>
+              </a:rPr>
+              <a:t>The fops and minor variables are optional. We are not going to implement them in our project.</a:t>
+            </a:r>
+          </a:p>
+          <a:p>
+            <a:pPr marL="0" indent="0">
+              <a:buNone/>
+            </a:pPr>
+            <a:endParaRPr lang="en-GB" sz="1900" dirty="0">
+              <a:latin typeface="Liberation Mono"/>
+            </a:endParaRPr>
+          </a:p>
+          <a:p>
+            <a:r>
+              <a:rPr lang="en-GB" sz="1900" dirty="0">
+                <a:latin typeface="Liberation Mono"/>
+              </a:rPr>
+              <a:t>We need to create an </a:t>
+            </a:r>
+            <a:r>
+              <a:rPr lang="en-GB" sz="1900" dirty="0" err="1">
+                <a:latin typeface="Liberation Mono"/>
+              </a:rPr>
+              <a:t>id_table</a:t>
+            </a:r>
+            <a:r>
+              <a:rPr lang="en-GB" sz="1900" dirty="0">
+                <a:latin typeface="Liberation Mono"/>
+              </a:rPr>
+              <a:t> to load the driver automatically when we plug our USB. Therefore, an </a:t>
+            </a:r>
+            <a:r>
+              <a:rPr lang="en-GB" sz="1900" dirty="0" err="1">
+                <a:latin typeface="Liberation Mono"/>
+              </a:rPr>
+              <a:t>id_table</a:t>
+            </a:r>
+            <a:r>
+              <a:rPr lang="en-GB" sz="1900" dirty="0">
+                <a:latin typeface="Liberation Mono"/>
+              </a:rPr>
+              <a:t> defines which devices the driver supports at its current status.</a:t>
+            </a:r>
+          </a:p>
+        </p:txBody>
+      </p:sp>
+    </p:spTree>
+    <p:extLst>
+      <p:ext uri="{BB962C8B-B14F-4D97-AF65-F5344CB8AC3E}">
+        <p14:creationId xmlns:p14="http://schemas.microsoft.com/office/powerpoint/2010/main" val="690846184"/>
+      </p:ext>
+    </p:extLst>
+  </p:cSld>
+  <p:clrMapOvr>
+    <a:masterClrMapping/>
+  </p:clrMapOvr>
+</p:sld>
+</file>
+
+<file path=ppt/slides/slide9.xml><?xml version="1.0" encoding="utf-8"?>
+<p:sld xmlns:a="http://schemas.openxmlformats.org/drawingml/2006/main" xmlns:r="http://schemas.openxmlformats.org/officeDocument/2006/relationships" xmlns:p="http://schemas.openxmlformats.org/presentationml/2006/main">
+  <p:cSld>
+    <p:bg>
+      <p:bgPr>
+        <a:solidFill>
+          <a:schemeClr val="bg1"/>
+        </a:solidFill>
+        <a:effectLst/>
+      </p:bgPr>
+    </p:bg>
+    <p:spTree>
+      <p:nvGrpSpPr>
+        <p:cNvPr id="1" name=""/>
+        <p:cNvGrpSpPr/>
+        <p:nvPr/>
+      </p:nvGrpSpPr>
+      <p:grpSpPr>
+        <a:xfrm>
+          <a:off x="0" y="0"/>
+          <a:ext cx="0" cy="0"/>
+          <a:chOff x="0" y="0"/>
+          <a:chExt cx="0" cy="0"/>
+        </a:xfrm>
+      </p:grpSpPr>
+      <p:sp useBgFill="1">
+        <p:nvSpPr>
+          <p:cNvPr id="21" name="Rectangle 20">
+            <a:extLst>
+              <a:ext uri="{FF2B5EF4-FFF2-40B4-BE49-F238E27FC236}">
+                <a16:creationId xmlns:a16="http://schemas.microsoft.com/office/drawing/2014/main" id="{32AEEBC8-9D30-42EF-95F2-386C2653FBF0}"/>
+              </a:ext>
+              <a:ext uri="{C183D7F6-B498-43B3-948B-1728B52AA6E4}">
+                <adec:decorative xmlns:adec="http://schemas.microsoft.com/office/drawing/2017/decorative" val="1"/>
+              </a:ext>
+            </a:extLst>
+          </p:cNvPr>
+          <p:cNvSpPr>
+            <a:spLocks noGrp="1" noRot="1" noChangeAspect="1" noMove="1" noResize="1" noEditPoints="1" noAdjustHandles="1" noChangeArrowheads="1" noChangeShapeType="1" noTextEdit="1"/>
+          </p:cNvSpPr>
+          <p:nvPr>
+            <p:extLst>
+              <p:ext uri="{386F3935-93C4-4BCD-93E2-E3B085C9AB24}">
+                <p16:designElem xmlns:p16="http://schemas.microsoft.com/office/powerpoint/2015/main" val="1"/>
+              </p:ext>
+            </p:extLst>
+          </p:nvPr>
+        </p:nvSpPr>
+        <p:spPr>
+          <a:xfrm>
+            <a:off x="0" y="0"/>
+            <a:ext cx="12192000" cy="6858000"/>
           </a:xfrm>
           <a:prstGeom prst="rect">
             <a:avLst/>
           </a:prstGeom>
-          <a:solidFill>
-            <a:srgbClr val="D5D5D5"/>
-          </a:solidFill>
-          <a:ln w="3175">
+          <a:ln>
             <a:noFill/>
           </a:ln>
-          <a:effectLst/>
         </p:spPr>
         <p:style>
           <a:lnRef idx="2">
@@ -13137,12 +14458,272 @@
           <a:lstStyle/>
           <a:p>
             <a:pPr algn="ctr"/>
-            <a:endParaRPr lang="en-US">
-              <a:solidFill>
-                <a:prstClr val="white"/>
-              </a:solidFill>
-              <a:latin typeface="Calibri" panose="020F0502020204030204"/>
-            </a:endParaRPr>
+            <a:endParaRPr lang="en-US"/>
+          </a:p>
+        </p:txBody>
+      </p:sp>
+      <p:sp>
+        <p:nvSpPr>
+          <p:cNvPr id="2" name="Title 1">
+            <a:extLst>
+              <a:ext uri="{FF2B5EF4-FFF2-40B4-BE49-F238E27FC236}">
+                <a16:creationId xmlns:a16="http://schemas.microsoft.com/office/drawing/2014/main" id="{48FE7A46-5640-1D42-9A39-D790287C751F}"/>
+              </a:ext>
+            </a:extLst>
+          </p:cNvPr>
+          <p:cNvSpPr>
+            <a:spLocks noGrp="1"/>
+          </p:cNvSpPr>
+          <p:nvPr>
+            <p:ph type="title"/>
+          </p:nvPr>
+        </p:nvSpPr>
+        <p:spPr>
+          <a:xfrm>
+            <a:off x="630936" y="502920"/>
+            <a:ext cx="3419856" cy="1463040"/>
+          </a:xfrm>
+        </p:spPr>
+        <p:txBody>
+          <a:bodyPr vert="horz" lIns="91440" tIns="45720" rIns="91440" bIns="45720" rtlCol="0" anchor="ctr">
+            <a:normAutofit/>
+          </a:bodyPr>
+          <a:lstStyle/>
+          <a:p>
+            <a:r>
+              <a:rPr lang="en-US" sz="4800" kern="1200" dirty="0">
+                <a:solidFill>
+                  <a:schemeClr val="tx1"/>
+                </a:solidFill>
+                <a:latin typeface="+mj-lt"/>
+                <a:ea typeface="+mj-ea"/>
+                <a:cs typeface="+mj-cs"/>
+              </a:rPr>
+              <a:t>ID_TABLE</a:t>
+            </a:r>
+          </a:p>
+        </p:txBody>
+      </p:sp>
+      <p:sp>
+        <p:nvSpPr>
+          <p:cNvPr id="23" name="sketch line">
+            <a:extLst>
+              <a:ext uri="{FF2B5EF4-FFF2-40B4-BE49-F238E27FC236}">
+                <a16:creationId xmlns:a16="http://schemas.microsoft.com/office/drawing/2014/main" id="{2E92FA66-67D7-4CB4-94D3-E643A9AD4757}"/>
+              </a:ext>
+              <a:ext uri="{C183D7F6-B498-43B3-948B-1728B52AA6E4}">
+                <adec:decorative xmlns:adec="http://schemas.microsoft.com/office/drawing/2017/decorative" val="1"/>
+              </a:ext>
+            </a:extLst>
+          </p:cNvPr>
+          <p:cNvSpPr>
+            <a:spLocks noGrp="1" noRot="1" noChangeAspect="1" noMove="1" noResize="1" noEditPoints="1" noAdjustHandles="1" noChangeArrowheads="1" noChangeShapeType="1" noTextEdit="1"/>
+          </p:cNvSpPr>
+          <p:nvPr>
+            <p:extLst>
+              <p:ext uri="{386F3935-93C4-4BCD-93E2-E3B085C9AB24}">
+                <p16:designElem xmlns:p16="http://schemas.microsoft.com/office/powerpoint/2015/main" val="1"/>
+              </p:ext>
+            </p:extLst>
+          </p:nvPr>
+        </p:nvSpPr>
+        <p:spPr>
+          <a:xfrm rot="5400000">
+            <a:off x="3566159" y="1225296"/>
+            <a:ext cx="1554480" cy="18288"/>
+          </a:xfrm>
+          <a:custGeom>
+            <a:avLst/>
+            <a:gdLst>
+              <a:gd name="connsiteX0" fmla="*/ 0 w 1554480"/>
+              <a:gd name="connsiteY0" fmla="*/ 0 h 18288"/>
+              <a:gd name="connsiteX1" fmla="*/ 549250 w 1554480"/>
+              <a:gd name="connsiteY1" fmla="*/ 0 h 18288"/>
+              <a:gd name="connsiteX2" fmla="*/ 1082954 w 1554480"/>
+              <a:gd name="connsiteY2" fmla="*/ 0 h 18288"/>
+              <a:gd name="connsiteX3" fmla="*/ 1554480 w 1554480"/>
+              <a:gd name="connsiteY3" fmla="*/ 0 h 18288"/>
+              <a:gd name="connsiteX4" fmla="*/ 1554480 w 1554480"/>
+              <a:gd name="connsiteY4" fmla="*/ 18288 h 18288"/>
+              <a:gd name="connsiteX5" fmla="*/ 1067410 w 1554480"/>
+              <a:gd name="connsiteY5" fmla="*/ 18288 h 18288"/>
+              <a:gd name="connsiteX6" fmla="*/ 549250 w 1554480"/>
+              <a:gd name="connsiteY6" fmla="*/ 18288 h 18288"/>
+              <a:gd name="connsiteX7" fmla="*/ 0 w 1554480"/>
+              <a:gd name="connsiteY7" fmla="*/ 18288 h 18288"/>
+              <a:gd name="connsiteX8" fmla="*/ 0 w 1554480"/>
+              <a:gd name="connsiteY8" fmla="*/ 0 h 18288"/>
+            </a:gdLst>
+            <a:ahLst/>
+            <a:cxnLst>
+              <a:cxn ang="0">
+                <a:pos x="connsiteX0" y="connsiteY0"/>
+              </a:cxn>
+              <a:cxn ang="0">
+                <a:pos x="connsiteX1" y="connsiteY1"/>
+              </a:cxn>
+              <a:cxn ang="0">
+                <a:pos x="connsiteX2" y="connsiteY2"/>
+              </a:cxn>
+              <a:cxn ang="0">
+                <a:pos x="connsiteX3" y="connsiteY3"/>
+              </a:cxn>
+              <a:cxn ang="0">
+                <a:pos x="connsiteX4" y="connsiteY4"/>
+              </a:cxn>
+              <a:cxn ang="0">
+                <a:pos x="connsiteX5" y="connsiteY5"/>
+              </a:cxn>
+              <a:cxn ang="0">
+                <a:pos x="connsiteX6" y="connsiteY6"/>
+              </a:cxn>
+              <a:cxn ang="0">
+                <a:pos x="connsiteX7" y="connsiteY7"/>
+              </a:cxn>
+              <a:cxn ang="0">
+                <a:pos x="connsiteX8" y="connsiteY8"/>
+              </a:cxn>
+            </a:cxnLst>
+            <a:rect l="l" t="t" r="r" b="b"/>
+            <a:pathLst>
+              <a:path w="1554480" h="18288" fill="none" extrusionOk="0">
+                <a:moveTo>
+                  <a:pt x="0" y="0"/>
+                </a:moveTo>
+                <a:cubicBezTo>
+                  <a:pt x="114141" y="-19864"/>
+                  <a:pt x="345055" y="-1657"/>
+                  <a:pt x="549250" y="0"/>
+                </a:cubicBezTo>
+                <a:cubicBezTo>
+                  <a:pt x="753445" y="1657"/>
+                  <a:pt x="862292" y="-5674"/>
+                  <a:pt x="1082954" y="0"/>
+                </a:cubicBezTo>
+                <a:cubicBezTo>
+                  <a:pt x="1303616" y="5674"/>
+                  <a:pt x="1363530" y="4537"/>
+                  <a:pt x="1554480" y="0"/>
+                </a:cubicBezTo>
+                <a:cubicBezTo>
+                  <a:pt x="1554963" y="7176"/>
+                  <a:pt x="1553909" y="13682"/>
+                  <a:pt x="1554480" y="18288"/>
+                </a:cubicBezTo>
+                <a:cubicBezTo>
+                  <a:pt x="1338847" y="6127"/>
+                  <a:pt x="1215066" y="37851"/>
+                  <a:pt x="1067410" y="18288"/>
+                </a:cubicBezTo>
+                <a:cubicBezTo>
+                  <a:pt x="919754" y="-1275"/>
+                  <a:pt x="800465" y="3080"/>
+                  <a:pt x="549250" y="18288"/>
+                </a:cubicBezTo>
+                <a:cubicBezTo>
+                  <a:pt x="298035" y="33496"/>
+                  <a:pt x="158868" y="22769"/>
+                  <a:pt x="0" y="18288"/>
+                </a:cubicBezTo>
+                <a:cubicBezTo>
+                  <a:pt x="-655" y="13237"/>
+                  <a:pt x="709" y="4645"/>
+                  <a:pt x="0" y="0"/>
+                </a:cubicBezTo>
+                <a:close/>
+              </a:path>
+              <a:path w="1554480" h="18288" stroke="0" extrusionOk="0">
+                <a:moveTo>
+                  <a:pt x="0" y="0"/>
+                </a:moveTo>
+                <a:cubicBezTo>
+                  <a:pt x="249941" y="-58"/>
+                  <a:pt x="367334" y="23448"/>
+                  <a:pt x="502615" y="0"/>
+                </a:cubicBezTo>
+                <a:cubicBezTo>
+                  <a:pt x="637897" y="-23448"/>
+                  <a:pt x="813653" y="-20418"/>
+                  <a:pt x="974141" y="0"/>
+                </a:cubicBezTo>
+                <a:cubicBezTo>
+                  <a:pt x="1134629" y="20418"/>
+                  <a:pt x="1268772" y="6288"/>
+                  <a:pt x="1554480" y="0"/>
+                </a:cubicBezTo>
+                <a:cubicBezTo>
+                  <a:pt x="1554917" y="7222"/>
+                  <a:pt x="1555359" y="13299"/>
+                  <a:pt x="1554480" y="18288"/>
+                </a:cubicBezTo>
+                <a:cubicBezTo>
+                  <a:pt x="1336087" y="12172"/>
+                  <a:pt x="1310024" y="19759"/>
+                  <a:pt x="1067410" y="18288"/>
+                </a:cubicBezTo>
+                <a:cubicBezTo>
+                  <a:pt x="824796" y="16818"/>
+                  <a:pt x="787902" y="34647"/>
+                  <a:pt x="518160" y="18288"/>
+                </a:cubicBezTo>
+                <a:cubicBezTo>
+                  <a:pt x="248418" y="1930"/>
+                  <a:pt x="133160" y="9205"/>
+                  <a:pt x="0" y="18288"/>
+                </a:cubicBezTo>
+                <a:cubicBezTo>
+                  <a:pt x="-643" y="9451"/>
+                  <a:pt x="-340" y="7114"/>
+                  <a:pt x="0" y="0"/>
+                </a:cubicBezTo>
+                <a:close/>
+              </a:path>
+            </a:pathLst>
+          </a:custGeom>
+          <a:solidFill>
+            <a:schemeClr val="accent2"/>
+          </a:solidFill>
+          <a:ln w="41275" cap="rnd">
+            <a:solidFill>
+              <a:schemeClr val="accent2"/>
+            </a:solidFill>
+            <a:round/>
+            <a:extLst>
+              <a:ext uri="{C807C97D-BFC1-408E-A445-0C87EB9F89A2}">
+                <ask:lineSketchStyleProps xmlns:ask="http://schemas.microsoft.com/office/drawing/2018/sketchyshapes" sd="1219033472">
+                  <a:prstGeom prst="rect">
+                    <a:avLst/>
+                  </a:prstGeom>
+                  <ask:type>
+                    <ask:lineSketchFreehand/>
+                  </ask:type>
+                </ask:lineSketchStyleProps>
+              </a:ext>
+            </a:extLst>
+          </a:ln>
+        </p:spPr>
+        <p:style>
+          <a:lnRef idx="2">
+            <a:schemeClr val="accent1">
+              <a:shade val="50000"/>
+            </a:schemeClr>
+          </a:lnRef>
+          <a:fillRef idx="1">
+            <a:schemeClr val="accent1"/>
+          </a:fillRef>
+          <a:effectRef idx="0">
+            <a:schemeClr val="accent1"/>
+          </a:effectRef>
+          <a:fontRef idx="minor">
+            <a:schemeClr val="lt1"/>
+          </a:fontRef>
+        </p:style>
+        <p:txBody>
+          <a:bodyPr rtlCol="0" anchor="ctr"/>
+          <a:lstStyle/>
+          <a:p>
+            <a:pPr algn="ctr"/>
+            <a:endParaRPr lang="en-US"/>
           </a:p>
         </p:txBody>
       </p:sp>
@@ -13160,8 +14741,8 @@
         </p:nvSpPr>
         <p:spPr>
           <a:xfrm>
-            <a:off x="5351164" y="586822"/>
-            <a:ext cx="6002636" cy="1645920"/>
+            <a:off x="4654295" y="502920"/>
+            <a:ext cx="6894576" cy="1463040"/>
           </a:xfrm>
           <a:prstGeom prst="rect">
             <a:avLst/>
@@ -13184,7 +14765,7 @@
               <a:buChar char="•"/>
             </a:pPr>
             <a:r>
-              <a:rPr lang="en-US"/>
+              <a:rPr lang="en-US" sz="1500"/>
               <a:t>In our case, the USB drive that our driver will support will have the following specifications:</a:t>
             </a:r>
           </a:p>
@@ -13199,7 +14780,7 @@
               <a:buFont typeface="Arial" panose="020B0604020202020204" pitchFamily="34" charset="0"/>
               <a:buChar char="•"/>
             </a:pPr>
-            <a:endParaRPr lang="en-US"/>
+            <a:endParaRPr lang="en-US" sz="1500"/>
           </a:p>
           <a:p>
             <a:pPr indent="-228600">
@@ -13213,7 +14794,7 @@
               <a:buChar char="•"/>
             </a:pPr>
             <a:r>
-              <a:rPr lang="en-US"/>
+              <a:rPr lang="en-US" sz="1500"/>
               <a:t>Vendor ID: 0x05dc Lexar Media, Inc.</a:t>
             </a:r>
           </a:p>
@@ -13229,7 +14810,7 @@
               <a:buChar char="•"/>
             </a:pPr>
             <a:r>
-              <a:rPr lang="en-US"/>
+              <a:rPr lang="en-US" sz="1500"/>
               <a:t>Product ID: 0xa81d LJDTT16G [JumpDrive 16GB]</a:t>
             </a:r>
           </a:p>
@@ -13259,8 +14840,8 @@
         </p:blipFill>
         <p:spPr>
           <a:xfrm>
-            <a:off x="557784" y="3373461"/>
-            <a:ext cx="11164824" cy="2205053"/>
+            <a:off x="630936" y="3192466"/>
+            <a:ext cx="10917936" cy="2156292"/>
           </a:xfrm>
           <a:prstGeom prst="rect">
             <a:avLst/>

</xml_diff>